<commit_message>
Jun 15, 2024. Modifying the motor control according to turn simulation on Colab.
Signed-off-by: Nodang <noj7413@naver.com>
</commit_message>
<xml_diff>
--- a/hara_instruction.pptx
+++ b/hara_instruction.pptx
@@ -1,6 +1,6 @@
 
 <file path=ppt/presentation.xml><?xml version="1.0" encoding="utf-8"?>
-<p:presentation xmlns:a="http://schemas.openxmlformats.org/drawingml/2006/main" xmlns:r="http://schemas.openxmlformats.org/officeDocument/2006/relationships" xmlns:p="http://schemas.openxmlformats.org/presentationml/2006/main" saveSubsetFonts="1">
+<p:presentation xmlns:r="http://schemas.openxmlformats.org/officeDocument/2006/relationships" xmlns:c="http://schemas.openxmlformats.org/drawingml/2006/chart" xmlns:a="http://schemas.openxmlformats.org/drawingml/2006/main" xmlns:dgm="http://schemas.openxmlformats.org/drawingml/2006/diagram" xmlns:dsp="http://schemas.microsoft.com/office/drawing/2008/diagram" xmlns:p="http://schemas.openxmlformats.org/presentationml/2006/main">
   <p:sldMasterIdLst>
     <p:sldMasterId id="2147483648" r:id="rId1"/>
   </p:sldMasterIdLst>
@@ -17,7 +17,9 @@
     <p:sldId id="266" r:id="rId11"/>
     <p:sldId id="267" r:id="rId12"/>
     <p:sldId id="268" r:id="rId13"/>
-    <p:sldId id="269" r:id="rId14"/>
+    <p:sldId id="271" r:id="rId14"/>
+    <p:sldId id="269" r:id="rId15"/>
+    <p:sldId id="270" r:id="rId16"/>
   </p:sldIdLst>
   <p:sldSz cx="12192000" cy="6858000"/>
   <p:notesSz cx="6858000" cy="9144000"/>
@@ -117,8 +119,36 @@
     </a:lvl9pPr>
   </p:defaultTextStyle>
   <p:extLst>
-    <p:ext uri="{EFAFB233-063F-42B5-8137-9DF3F51BA10A}">
-      <p15:sldGuideLst xmlns:p15="http://schemas.microsoft.com/office/powerpoint/2012/main"/>
+    <p:ext uri="{521415D9-36F7-43E2-AB2F-B90AF26B5E84}">
+      <p14:sectionLst xmlns:p14="http://schemas.microsoft.com/office/powerpoint/2010/main">
+        <p14:section id="{9E5726BF-8496-464D-A3B3-A8A6FF068EC9}" name="기본 구역">
+          <p14:sldIdLst>
+            <p14:sldId id="256"/>
+          </p14:sldIdLst>
+        </p14:section>
+        <p14:section id="{D4DF4FB6-A83D-4B9E-A90A-975B69536DB1}" name="HW">
+          <p14:sldIdLst>
+            <p14:sldId id="257"/>
+            <p14:sldId id="260"/>
+            <p14:sldId id="259"/>
+            <p14:sldId id="261"/>
+            <p14:sldId id="264"/>
+            <p14:sldId id="263"/>
+            <p14:sldId id="265"/>
+            <p14:sldId id="262"/>
+            <p14:sldId id="266"/>
+            <p14:sldId id="267"/>
+            <p14:sldId id="268"/>
+          </p14:sldIdLst>
+        </p14:section>
+        <p14:section id="{ADB6ED96-5ADD-4541-A131-ACD28EC879F8}" name="SW">
+          <p14:sldIdLst>
+            <p14:sldId id="271"/>
+            <p14:sldId id="269"/>
+            <p14:sldId id="270"/>
+          </p14:sldIdLst>
+        </p14:section>
+      </p14:sectionLst>
     </p:ext>
   </p:extLst>
 </p:presentation>
@@ -4895,7 +4925,7 @@
 </file>
 
 <file path=ppt/slides/slide13.xml><?xml version="1.0" encoding="utf-8"?>
-<p:sld xmlns:a="http://schemas.openxmlformats.org/drawingml/2006/main" xmlns:r="http://schemas.openxmlformats.org/officeDocument/2006/relationships" xmlns:p="http://schemas.openxmlformats.org/presentationml/2006/main">
+<p:sld xmlns:r="http://schemas.openxmlformats.org/officeDocument/2006/relationships" xmlns:c="http://schemas.openxmlformats.org/drawingml/2006/chart" xmlns:a="http://schemas.openxmlformats.org/drawingml/2006/main" xmlns:dgm="http://schemas.openxmlformats.org/drawingml/2006/diagram" xmlns:dsp="http://schemas.microsoft.com/office/drawing/2008/diagram" xmlns:p="http://schemas.openxmlformats.org/presentationml/2006/main">
   <p:cSld>
     <p:spTree>
       <p:nvGrpSpPr>
@@ -4913,18 +4943,12 @@
       </p:grpSpPr>
       <p:sp>
         <p:nvSpPr>
-          <p:cNvPr id="2" name="제목 1">
-            <a:extLst>
-              <a:ext uri="{FF2B5EF4-FFF2-40B4-BE49-F238E27FC236}">
-                <a16:creationId xmlns:a16="http://schemas.microsoft.com/office/drawing/2014/main" id="{49E05AE7-4592-785D-CFE4-A509A342E3BD}"/>
-              </a:ext>
-            </a:extLst>
-          </p:cNvPr>
-          <p:cNvSpPr>
-            <a:spLocks noGrp="1"/>
-          </p:cNvSpPr>
-          <p:nvPr>
-            <p:ph type="title"/>
+          <p:cNvPr id="2" name="제목 1"/>
+          <p:cNvSpPr>
+            <a:spLocks noGrp="1"/>
+          </p:cNvSpPr>
+          <p:nvPr>
+            <p:ph type="title" idx="0"/>
           </p:nvPr>
         </p:nvSpPr>
         <p:spPr/>
@@ -4932,34 +4956,235 @@
           <a:bodyPr/>
           <a:lstStyle/>
           <a:p>
-            <a:r>
-              <a:rPr lang="ko-KR" altLang="en-US" dirty="0" err="1"/>
-              <a:t>센서부</a:t>
-            </a:r>
-            <a:r>
-              <a:rPr lang="ko-KR" altLang="en-US" dirty="0"/>
+            <a:pPr lvl="0">
+              <a:defRPr/>
+            </a:pPr>
+            <a:r>
+              <a:rPr lang="ko-KR" altLang="en-US"/>
+              <a:t>동작 알고리즘</a:t>
+            </a:r>
+            <a:endParaRPr lang="ko-KR" altLang="en-US"/>
+          </a:p>
+        </p:txBody>
+      </p:sp>
+      <p:sp>
+        <p:nvSpPr>
+          <p:cNvPr id="3" name="내용 개체 틀 2"/>
+          <p:cNvSpPr>
+            <a:spLocks noGrp="1"/>
+          </p:cNvSpPr>
+          <p:nvPr>
+            <p:ph idx="1"/>
+          </p:nvPr>
+        </p:nvSpPr>
+        <p:spPr/>
+        <p:txBody>
+          <a:bodyPr/>
+          <a:lstStyle/>
+          <a:p>
+            <a:pPr marL="518000" lvl="0" indent="-518000">
+              <a:buAutoNum type="arabicPeriod"/>
+              <a:defRPr/>
+            </a:pPr>
+            <a:r>
+              <a:rPr lang="ko-KR" altLang="en-US"/>
+              <a:t>동작 명령과 해당 동작 명령으로 도달할 로봇 포지션 추정 </a:t>
+            </a:r>
+            <a:r>
+              <a:rPr lang="en-US" altLang="ko-KR"/>
+              <a:t>-</a:t>
+            </a:r>
+            <a:r>
+              <a:rPr lang="ko-KR" altLang="en-US"/>
               <a:t> </a:t>
             </a:r>
             <a:r>
-              <a:rPr lang="en-US" altLang="ko-KR" dirty="0"/>
+              <a:rPr lang="en-US" altLang="ko-KR"/>
+              <a:t>P_ebi (Estimated by Input)</a:t>
+            </a:r>
+            <a:endParaRPr lang="en-US" altLang="ko-KR"/>
+          </a:p>
+          <a:p>
+            <a:pPr marL="518000" lvl="0" indent="-518000">
+              <a:buAutoNum type="arabicPeriod"/>
+              <a:defRPr/>
+            </a:pPr>
+            <a:r>
+              <a:rPr lang="ko-KR" altLang="en-US"/>
+              <a:t>센싱</a:t>
+            </a:r>
+            <a:endParaRPr lang="ko-KR" altLang="en-US"/>
+          </a:p>
+          <a:p>
+            <a:pPr marL="518000" lvl="0" indent="-518000">
+              <a:buAutoNum type="arabicPeriod"/>
+              <a:defRPr/>
+            </a:pPr>
+            <a:r>
+              <a:rPr lang="ko-KR" altLang="en-US"/>
+              <a:t>센싱 데이터 기반으로 로봇 포지션 추정</a:t>
+            </a:r>
+            <a:r>
+              <a:rPr lang="en-US" altLang="ko-KR"/>
+              <a:t> - P_sd (Sensor Date)</a:t>
+            </a:r>
+            <a:endParaRPr lang="en-US" altLang="ko-KR"/>
+          </a:p>
+          <a:p>
+            <a:pPr marL="518000" lvl="0" indent="-518000">
+              <a:buAutoNum type="arabicPeriod"/>
+              <a:defRPr/>
+            </a:pPr>
+            <a:r>
+              <a:rPr lang="en-US" altLang="ko-KR"/>
+              <a:t>P_ebi</a:t>
+            </a:r>
+            <a:r>
+              <a:rPr lang="ko-KR" altLang="en-US"/>
+              <a:t>과 </a:t>
+            </a:r>
+            <a:r>
+              <a:rPr lang="en-US" altLang="ko-KR"/>
+              <a:t>P_sd</a:t>
+            </a:r>
+            <a:r>
+              <a:rPr lang="ko-KR" altLang="en-US"/>
+              <a:t> 사이 오차 제어</a:t>
+            </a:r>
+            <a:endParaRPr lang="ko-KR" altLang="en-US"/>
+          </a:p>
+          <a:p>
+            <a:pPr marL="518000" lvl="0" indent="-518000">
+              <a:buAutoNum type="arabicPeriod"/>
+              <a:defRPr/>
+            </a:pPr>
+            <a:r>
+              <a:rPr lang="ko-KR" altLang="en-US"/>
+              <a:t>제어 값 기반 게인</a:t>
+            </a:r>
+            <a:r>
+              <a:rPr lang="en-US" altLang="ko-KR"/>
+              <a:t>,</a:t>
+            </a:r>
+            <a:r>
+              <a:rPr lang="ko-KR" altLang="en-US"/>
+              <a:t> 모터 제어에 반영</a:t>
+            </a:r>
+            <a:endParaRPr lang="ko-KR" altLang="en-US"/>
+          </a:p>
+          <a:p>
+            <a:pPr marL="518000" lvl="0" indent="-518000">
+              <a:buAutoNum type="arabicPeriod"/>
+              <a:defRPr/>
+            </a:pPr>
+            <a:r>
+              <a:rPr lang="ko-KR" altLang="en-US"/>
+              <a:t>동작 명령이 종료될 때까지 </a:t>
+            </a:r>
+            <a:r>
+              <a:rPr lang="en-US" altLang="ko-KR"/>
+              <a:t>1~5</a:t>
+            </a:r>
+            <a:r>
+              <a:rPr lang="ko-KR" altLang="en-US"/>
+              <a:t> 반복</a:t>
+            </a:r>
+            <a:endParaRPr lang="ko-KR" altLang="en-US"/>
+          </a:p>
+          <a:p>
+            <a:pPr marL="518000" lvl="0" indent="-518000">
+              <a:buAutoNum type="arabicPeriod"/>
+              <a:defRPr/>
+            </a:pPr>
+            <a:endParaRPr lang="ko-KR" altLang="en-US"/>
+          </a:p>
+          <a:p>
+            <a:pPr marL="518000" lvl="0" indent="-518000">
+              <a:buAutoNum type="arabicPeriod"/>
+              <a:defRPr/>
+            </a:pPr>
+            <a:endParaRPr lang="ko-KR" altLang="en-US"/>
+          </a:p>
+        </p:txBody>
+      </p:sp>
+    </p:spTree>
+  </p:cSld>
+  <p:clrMapOvr>
+    <a:masterClrMapping/>
+  </p:clrMapOvr>
+  <mc:AlternateContent xmlns:mc="http://schemas.openxmlformats.org/markup-compatibility/2006">
+    <mc:Choice xmlns:p14="http://schemas.microsoft.com/office/powerpoint/2010/main" Requires="p14">
+      <p:transition xmlns:mc="http://schemas.openxmlformats.org/markup-compatibility/2006" xmlns:p14="http://schemas.microsoft.com/office/powerpoint/2010/main" mc:Ignorable="p14" p14:dur="500"/>
+    </mc:Choice>
+    <mc:Fallback>
+      <p:transition/>
+    </mc:Fallback>
+  </mc:AlternateContent>
+</p:sld>
+</file>
+
+<file path=ppt/slides/slide14.xml><?xml version="1.0" encoding="utf-8"?>
+<p:sld xmlns:r="http://schemas.openxmlformats.org/officeDocument/2006/relationships" xmlns:c="http://schemas.openxmlformats.org/drawingml/2006/chart" xmlns:a="http://schemas.openxmlformats.org/drawingml/2006/main" xmlns:dgm="http://schemas.openxmlformats.org/drawingml/2006/diagram" xmlns:dsp="http://schemas.microsoft.com/office/drawing/2008/diagram" xmlns:p="http://schemas.openxmlformats.org/presentationml/2006/main">
+  <p:cSld>
+    <p:spTree>
+      <p:nvGrpSpPr>
+        <p:cNvPr id="1" name=""/>
+        <p:cNvGrpSpPr/>
+        <p:nvPr/>
+      </p:nvGrpSpPr>
+      <p:grpSpPr>
+        <a:xfrm>
+          <a:off x="0" y="0"/>
+          <a:ext cx="0" cy="0"/>
+          <a:chOff x="0" y="0"/>
+          <a:chExt cx="0" cy="0"/>
+        </a:xfrm>
+      </p:grpSpPr>
+      <p:sp>
+        <p:nvSpPr>
+          <p:cNvPr id="2" name="제목 1"/>
+          <p:cNvSpPr>
+            <a:spLocks noGrp="1"/>
+          </p:cNvSpPr>
+          <p:nvPr>
+            <p:ph type="title" idx="0"/>
+          </p:nvPr>
+        </p:nvSpPr>
+        <p:spPr/>
+        <p:txBody>
+          <a:bodyPr/>
+          <a:lstStyle/>
+          <a:p>
+            <a:pPr lvl="0">
+              <a:defRPr/>
+            </a:pPr>
+            <a:r>
+              <a:rPr lang="ko-KR" altLang="en-US"/>
+              <a:t>센서부 </a:t>
+            </a:r>
+            <a:r>
+              <a:rPr lang="en-US" altLang="ko-KR"/>
               <a:t>– </a:t>
             </a:r>
             <a:r>
-              <a:rPr lang="ko-KR" altLang="en-US" dirty="0"/>
+              <a:rPr lang="ko-KR" altLang="en-US"/>
               <a:t>센서 세팅</a:t>
             </a:r>
-          </a:p>
-        </p:txBody>
-      </p:sp>
-      <p:sp>
-        <p:nvSpPr>
-          <p:cNvPr id="3" name="내용 개체 틀 2">
-            <a:extLst>
-              <a:ext uri="{FF2B5EF4-FFF2-40B4-BE49-F238E27FC236}">
-                <a16:creationId xmlns:a16="http://schemas.microsoft.com/office/drawing/2014/main" id="{32C78F82-8503-E654-6988-9D65ECFDC658}"/>
-              </a:ext>
-            </a:extLst>
-          </p:cNvPr>
+            <a:r>
+              <a:rPr lang="en-US" altLang="ko-KR"/>
+              <a:t> </a:t>
+            </a:r>
+            <a:r>
+              <a:rPr lang="ko-KR" altLang="en-US"/>
+              <a:t>시나리오</a:t>
+            </a:r>
+            <a:endParaRPr lang="ko-KR" altLang="en-US"/>
+          </a:p>
+        </p:txBody>
+      </p:sp>
+      <p:sp>
+        <p:nvSpPr>
+          <p:cNvPr id="3" name="내용 개체 틀 2"/>
           <p:cNvSpPr>
             <a:spLocks noGrp="1"/>
           </p:cNvSpPr>
@@ -4979,316 +5204,386 @@
           </a:bodyPr>
           <a:lstStyle/>
           <a:p>
-            <a:pPr>
+            <a:pPr lvl="0">
               <a:lnSpc>
                 <a:spcPct val="120000"/>
               </a:lnSpc>
+              <a:defRPr/>
             </a:pPr>
             <a:r>
-              <a:rPr lang="ko-KR" altLang="en-US" dirty="0"/>
-              <a:t>회로로 </a:t>
-            </a:r>
-            <a:r>
-              <a:rPr lang="en-US" altLang="ko-KR" dirty="0"/>
-              <a:t>HPF(high pass filter) </a:t>
-            </a:r>
-            <a:r>
-              <a:rPr lang="ko-KR" altLang="en-US" dirty="0"/>
-              <a:t>구현</a:t>
-            </a:r>
-            <a:r>
-              <a:rPr lang="en-US" altLang="ko-KR" dirty="0"/>
-              <a:t>, </a:t>
-            </a:r>
-            <a:br>
-              <a:rPr lang="en-US" altLang="ko-KR" dirty="0"/>
-            </a:br>
-            <a:r>
-              <a:rPr lang="ko-KR" altLang="en-US" dirty="0"/>
-              <a:t>코드로 이산</a:t>
-            </a:r>
-            <a:r>
-              <a:rPr lang="en-US" altLang="ko-KR" dirty="0"/>
-              <a:t>(</a:t>
-            </a:r>
-            <a:r>
-              <a:rPr lang="ko-KR" altLang="en-US" dirty="0"/>
-              <a:t>디지털</a:t>
-            </a:r>
-            <a:r>
-              <a:rPr lang="en-US" altLang="ko-KR" dirty="0"/>
-              <a:t>) IIR(infinite impulse response filter) LPF(low pass filter)</a:t>
-            </a:r>
-            <a:r>
-              <a:rPr lang="ko-KR" altLang="en-US" dirty="0"/>
-              <a:t> 구현</a:t>
-            </a:r>
-            <a:r>
-              <a:rPr lang="en-US" altLang="ko-KR" dirty="0"/>
-              <a:t>.</a:t>
-            </a:r>
-          </a:p>
-          <a:p>
-            <a:pPr>
+              <a:rPr lang="en-US" altLang="ko-KR"/>
+              <a:t>side -&gt; front -&gt; 45 -&gt; side</a:t>
+            </a:r>
+            <a:endParaRPr lang="en-US" altLang="ko-KR"/>
+          </a:p>
+          <a:p>
+            <a:pPr lvl="0">
               <a:lnSpc>
                 <a:spcPct val="120000"/>
               </a:lnSpc>
+              <a:defRPr/>
             </a:pPr>
-            <a:endParaRPr lang="en-US" altLang="ko-KR" dirty="0"/>
-          </a:p>
-          <a:p>
-            <a:pPr>
+            <a:r>
+              <a:rPr lang="ko-KR" altLang="en-US"/>
+              <a:t>전제 조건</a:t>
+            </a:r>
+            <a:br>
+              <a:rPr lang="ko-KR" altLang="en-US"/>
+            </a:br>
+            <a:r>
+              <a:rPr lang="ko-KR" altLang="en-US"/>
+              <a:t>한 벽을 제외한 세 벽이 막힌 곳에서 센서 세팅</a:t>
+            </a:r>
+            <a:br>
+              <a:rPr lang="ko-KR" altLang="en-US"/>
+            </a:br>
+            <a:endParaRPr lang="ko-KR" altLang="en-US"/>
+          </a:p>
+          <a:p>
+            <a:pPr lvl="0">
               <a:lnSpc>
                 <a:spcPct val="120000"/>
               </a:lnSpc>
+              <a:defRPr/>
             </a:pPr>
             <a:r>
-              <a:rPr lang="ko-KR" altLang="en-US" dirty="0"/>
-              <a:t>회로에서 </a:t>
-            </a:r>
-            <a:r>
-              <a:rPr lang="en-US" altLang="ko-KR" dirty="0"/>
-              <a:t>HPF</a:t>
-            </a:r>
-            <a:r>
-              <a:rPr lang="ko-KR" altLang="en-US" dirty="0"/>
-              <a:t>를 쓰는 이유</a:t>
+              <a:rPr lang="en-US" altLang="ko-KR"/>
+              <a:t>side1:</a:t>
+            </a:r>
+            <a:r>
+              <a:rPr lang="ko-KR" altLang="en-US"/>
+              <a:t> </a:t>
+            </a:r>
+            <a:r>
+              <a:rPr lang="en-US" altLang="ko-KR"/>
+              <a:t>fixed value setup - auto</a:t>
             </a:r>
             <a:br>
-              <a:rPr lang="en-US" altLang="ko-KR" dirty="0"/>
+              <a:rPr lang="en-US" altLang="ko-KR"/>
             </a:br>
             <a:r>
-              <a:rPr lang="en-US" altLang="ko-KR" dirty="0"/>
-              <a:t>-&gt; </a:t>
-            </a:r>
-            <a:r>
-              <a:rPr lang="ko-KR" altLang="en-US" dirty="0"/>
-              <a:t>강한 빛 아래에서 수광센서가 가지고 있는 </a:t>
-            </a:r>
-            <a:r>
-              <a:rPr lang="en-US" altLang="ko-KR" dirty="0"/>
-              <a:t>DC</a:t>
-            </a:r>
-            <a:r>
-              <a:rPr lang="ko-KR" altLang="en-US" dirty="0"/>
-              <a:t>성분을 제어함</a:t>
-            </a:r>
-            <a:endParaRPr lang="en-US" altLang="ko-KR" dirty="0"/>
-          </a:p>
-          <a:p>
-            <a:pPr>
+              <a:rPr lang="ko-KR" altLang="en-US"/>
+              <a:t>현재 위치에서 </a:t>
+            </a:r>
+            <a:r>
+              <a:rPr lang="en-US" altLang="ko-KR"/>
+              <a:t>side</a:t>
+            </a:r>
+            <a:r>
+              <a:rPr lang="ko-KR" altLang="en-US"/>
+              <a:t> 센서 데이터 수집</a:t>
+            </a:r>
+            <a:br>
+              <a:rPr lang="ko-KR" altLang="en-US"/>
+            </a:br>
+            <a:r>
+              <a:rPr lang="ko-KR" altLang="en-US"/>
+              <a:t>이를 이용하여 전방 센서 데이터 수집할 때 몸체가 틀어지지 않게 보정</a:t>
+            </a:r>
+            <a:endParaRPr lang="ko-KR" altLang="en-US"/>
+          </a:p>
+          <a:p>
+            <a:pPr lvl="0">
               <a:lnSpc>
                 <a:spcPct val="120000"/>
               </a:lnSpc>
+              <a:defRPr/>
             </a:pPr>
             <a:r>
-              <a:rPr lang="ko-KR" altLang="en-US" dirty="0"/>
-              <a:t>강한 빛 아래에서 </a:t>
-            </a:r>
-            <a:r>
-              <a:rPr lang="en-US" altLang="ko-KR" dirty="0"/>
-              <a:t>DC </a:t>
-            </a:r>
-            <a:r>
-              <a:rPr lang="ko-KR" altLang="en-US" dirty="0"/>
-              <a:t>성분이 상승하여 신호를 약하게 만듦</a:t>
+              <a:rPr lang="en-US" altLang="ko-KR"/>
+              <a:t>front: lookup table setup - auto</a:t>
             </a:r>
             <a:br>
-              <a:rPr lang="en-US" altLang="ko-KR" dirty="0"/>
+              <a:rPr lang="en-US" altLang="ko-KR"/>
             </a:br>
             <a:r>
-              <a:rPr lang="en-US" altLang="ko-KR" dirty="0"/>
-              <a:t>-&gt; </a:t>
-            </a:r>
-            <a:r>
-              <a:rPr lang="ko-KR" altLang="en-US" dirty="0"/>
-              <a:t>수동필터만으로는 구분 가능한 신호를 만들기 어려움</a:t>
+              <a:rPr lang="ko-KR" altLang="en-US"/>
+              <a:t>전방을 벽에 붙여놓고 후방으로 이동하면서 </a:t>
+            </a:r>
+            <a:r>
+              <a:rPr lang="en-US" altLang="ko-KR"/>
+              <a:t>table setup</a:t>
             </a:r>
             <a:br>
-              <a:rPr lang="en-US" altLang="ko-KR" dirty="0"/>
+              <a:rPr lang="en-US" altLang="ko-KR"/>
             </a:br>
             <a:r>
-              <a:rPr lang="en-US" altLang="ko-KR" dirty="0">
-                <a:sym typeface="Wingdings" panose="05000000000000000000" pitchFamily="2" charset="2"/>
-              </a:rPr>
-              <a:t> </a:t>
-            </a:r>
-            <a:r>
-              <a:rPr lang="ko-KR" altLang="en-US" dirty="0">
-                <a:sym typeface="Wingdings" panose="05000000000000000000" pitchFamily="2" charset="2"/>
-              </a:rPr>
-              <a:t>능동필터로 신호를 증폭하자</a:t>
-            </a:r>
-            <a:endParaRPr lang="en-US" altLang="ko-KR" dirty="0">
-              <a:sym typeface="Wingdings" panose="05000000000000000000" pitchFamily="2" charset="2"/>
-            </a:endParaRPr>
-          </a:p>
-          <a:p>
-            <a:pPr>
+              <a:rPr lang="ko-KR" altLang="en-US"/>
+              <a:t>후방으로 </a:t>
+            </a:r>
+            <a:r>
+              <a:rPr lang="en-US" altLang="ko-KR"/>
+              <a:t>180mm</a:t>
+            </a:r>
+            <a:r>
+              <a:rPr lang="ko-KR" altLang="en-US"/>
+              <a:t> 이동</a:t>
+            </a:r>
+            <a:br>
+              <a:rPr lang="en-US" altLang="ko-KR"/>
+            </a:br>
+            <a:r>
+              <a:rPr lang="ko-KR" altLang="en-US"/>
+              <a:t>최종적으로 전방 센서 위치가 기존 칸 밖에 나가 있어야 함</a:t>
+            </a:r>
+            <a:endParaRPr lang="ko-KR" altLang="en-US"/>
+          </a:p>
+          <a:p>
+            <a:pPr lvl="0">
               <a:lnSpc>
                 <a:spcPct val="120000"/>
               </a:lnSpc>
+              <a:defRPr/>
             </a:pPr>
             <a:r>
-              <a:rPr lang="ko-KR" altLang="en-US" dirty="0"/>
-              <a:t>하윤이형의 전략 </a:t>
-            </a:r>
-            <a:r>
-              <a:rPr lang="en-US" altLang="ko-KR" dirty="0"/>
-              <a:t>: DC </a:t>
-            </a:r>
-            <a:r>
-              <a:rPr lang="ko-KR" altLang="en-US" dirty="0"/>
-              <a:t>성분이 생겨도 크게 변화가 없는 신호를 만들자</a:t>
+              <a:rPr lang="en-US" altLang="ko-KR"/>
+              <a:t>45: lookup table setup - auto</a:t>
             </a:r>
             <a:br>
-              <a:rPr lang="en-US" altLang="ko-KR" dirty="0"/>
+              <a:rPr lang="ko-KR" altLang="en-US"/>
             </a:br>
             <a:r>
-              <a:rPr lang="en-US" altLang="ko-KR" dirty="0"/>
-              <a:t>-&gt; </a:t>
-            </a:r>
-            <a:r>
-              <a:rPr lang="ko-KR" altLang="en-US" dirty="0"/>
-              <a:t>애초에 센서의 감도를 작게 쓰면 </a:t>
-            </a:r>
-            <a:r>
-              <a:rPr lang="en-US" altLang="ko-KR" dirty="0"/>
-              <a:t>DC </a:t>
-            </a:r>
-            <a:r>
-              <a:rPr lang="ko-KR" altLang="en-US" dirty="0"/>
-              <a:t>성분에 대해 큰 변화가 없을 것</a:t>
+              <a:rPr lang="ko-KR" altLang="en-US"/>
+              <a:t>전방 센서 세팅으로 </a:t>
+            </a:r>
+            <a:r>
+              <a:rPr lang="en-US" altLang="ko-KR"/>
+              <a:t>180mm</a:t>
+            </a:r>
+            <a:r>
+              <a:rPr lang="ko-KR" altLang="en-US"/>
+              <a:t> 빠져있는 상태에서 전방으로 이동하면서 </a:t>
+            </a:r>
+            <a:r>
+              <a:rPr lang="en-US" altLang="ko-KR"/>
+              <a:t>table setup</a:t>
             </a:r>
             <a:br>
-              <a:rPr lang="en-US" altLang="ko-KR" dirty="0"/>
+              <a:rPr lang="ko-KR" altLang="en-US"/>
             </a:br>
             <a:r>
-              <a:rPr lang="en-US" altLang="ko-KR" dirty="0"/>
-              <a:t>-&gt; </a:t>
-            </a:r>
-            <a:r>
-              <a:rPr lang="ko-KR" altLang="en-US" dirty="0"/>
-              <a:t>감도 저항을 크게 사용해 센서의 감도를 떨어뜨리고 </a:t>
-            </a:r>
-            <a:r>
-              <a:rPr lang="en-US" altLang="ko-KR" dirty="0"/>
-              <a:t>OP Amp</a:t>
-            </a:r>
-            <a:r>
-              <a:rPr lang="ko-KR" altLang="en-US" dirty="0"/>
-              <a:t>를 사용하여 크게 증폭하자</a:t>
-            </a:r>
-            <a:endParaRPr lang="en-US" altLang="ko-KR" dirty="0"/>
-          </a:p>
-          <a:p>
-            <a:pPr>
+              <a:rPr lang="ko-KR" altLang="en-US"/>
+              <a:t>전방으로 </a:t>
+            </a:r>
+            <a:r>
+              <a:rPr lang="en-US" altLang="ko-KR"/>
+              <a:t>90mm</a:t>
+            </a:r>
+            <a:r>
+              <a:rPr lang="ko-KR" altLang="en-US"/>
+              <a:t> 이동하면서 </a:t>
+            </a:r>
+            <a:r>
+              <a:rPr lang="en-US" altLang="ko-KR"/>
+              <a:t>side </a:t>
+            </a:r>
+            <a:r>
+              <a:rPr lang="ko-KR" altLang="en-US"/>
+              <a:t>센서 보정 데이터 수집</a:t>
+            </a:r>
+            <a:br>
+              <a:rPr lang="ko-KR" altLang="en-US"/>
+            </a:br>
+            <a:r>
+              <a:rPr lang="ko-KR" altLang="en-US"/>
+              <a:t>또 </a:t>
+            </a:r>
+            <a:r>
+              <a:rPr lang="en-US" altLang="ko-KR"/>
+              <a:t>90mm</a:t>
+            </a:r>
+            <a:r>
+              <a:rPr lang="ko-KR" altLang="en-US"/>
+              <a:t> 이동하면서 </a:t>
+            </a:r>
+            <a:r>
+              <a:rPr lang="en-US" altLang="ko-KR"/>
+              <a:t>45 </a:t>
+            </a:r>
+            <a:r>
+              <a:rPr lang="ko-KR" altLang="en-US"/>
+              <a:t>센서 </a:t>
+            </a:r>
+            <a:r>
+              <a:rPr lang="en-US" altLang="ko-KR"/>
+              <a:t>table setup</a:t>
+            </a:r>
+            <a:endParaRPr lang="en-US" altLang="ko-KR"/>
+          </a:p>
+          <a:p>
+            <a:pPr lvl="0">
               <a:lnSpc>
                 <a:spcPct val="120000"/>
               </a:lnSpc>
+              <a:defRPr/>
             </a:pPr>
-            <a:endParaRPr lang="en-US" altLang="ko-KR" dirty="0"/>
-          </a:p>
-          <a:p>
-            <a:pPr>
-              <a:lnSpc>
-                <a:spcPct val="120000"/>
-              </a:lnSpc>
-            </a:pPr>
-            <a:r>
-              <a:rPr lang="ko-KR" altLang="en-US" dirty="0"/>
-              <a:t>코드에서 </a:t>
-            </a:r>
-            <a:r>
-              <a:rPr lang="en-US" altLang="ko-KR" dirty="0"/>
-              <a:t>IIR</a:t>
-            </a:r>
-            <a:r>
-              <a:rPr lang="ko-KR" altLang="en-US" dirty="0"/>
-              <a:t>를 쓰는 이유</a:t>
+            <a:r>
+              <a:rPr lang="en-US" altLang="ko-KR"/>
+              <a:t>side2: calibaration - calc</a:t>
             </a:r>
             <a:br>
-              <a:rPr lang="en-US" altLang="ko-KR" dirty="0"/>
+              <a:rPr lang="ko-KR" altLang="en-US"/>
             </a:br>
             <a:r>
-              <a:rPr lang="en-US" altLang="ko-KR" dirty="0"/>
-              <a:t>-&gt; </a:t>
-            </a:r>
-            <a:r>
-              <a:rPr lang="ko-KR" altLang="en-US" dirty="0"/>
-              <a:t>사진 참고</a:t>
-            </a:r>
-            <a:br>
-              <a:rPr lang="en-US" altLang="ko-KR" dirty="0"/>
-            </a:br>
-            <a:r>
-              <a:rPr lang="ko-KR" altLang="en-US" dirty="0"/>
-              <a:t>적</a:t>
-            </a:r>
-            <a:r>
-              <a:rPr lang="en-US" altLang="ko-KR" dirty="0"/>
-              <a:t>: </a:t>
-            </a:r>
-            <a:r>
-              <a:rPr lang="ko-KR" altLang="en-US" dirty="0"/>
-              <a:t>원래 신호</a:t>
-            </a:r>
-            <a:br>
-              <a:rPr lang="en-US" altLang="ko-KR" dirty="0"/>
-            </a:br>
-            <a:r>
-              <a:rPr lang="ko-KR" altLang="en-US" dirty="0"/>
-              <a:t>청</a:t>
-            </a:r>
-            <a:r>
-              <a:rPr lang="en-US" altLang="ko-KR" dirty="0"/>
-              <a:t>: </a:t>
-            </a:r>
-            <a:r>
-              <a:rPr lang="ko-KR" altLang="en-US" dirty="0" err="1"/>
-              <a:t>필터링된</a:t>
-            </a:r>
-            <a:r>
-              <a:rPr lang="ko-KR" altLang="en-US" dirty="0"/>
-              <a:t> 신호</a:t>
-            </a:r>
-          </a:p>
-          <a:p>
-            <a:pPr>
-              <a:lnSpc>
-                <a:spcPct val="120000"/>
-              </a:lnSpc>
-            </a:pPr>
-            <a:endParaRPr lang="en-US" altLang="ko-KR" dirty="0"/>
-          </a:p>
-          <a:p>
-            <a:pPr>
-              <a:lnSpc>
-                <a:spcPct val="120000"/>
-              </a:lnSpc>
-            </a:pPr>
-            <a:endParaRPr lang="en-US" altLang="ko-KR" dirty="0"/>
-          </a:p>
-          <a:p>
-            <a:pPr>
-              <a:lnSpc>
-                <a:spcPct val="120000"/>
-              </a:lnSpc>
-            </a:pPr>
-            <a:endParaRPr lang="en-US" altLang="ko-KR" dirty="0"/>
-          </a:p>
-        </p:txBody>
-      </p:sp>
+              <a:rPr lang="en-US" altLang="ko-KR"/>
+              <a:t>45 </a:t>
+            </a:r>
+            <a:r>
+              <a:rPr lang="ko-KR" altLang="en-US"/>
+              <a:t>센서에서 얻은 보정 데이터와 </a:t>
+            </a:r>
+            <a:r>
+              <a:rPr lang="en-US" altLang="ko-KR"/>
+              <a:t>side1</a:t>
+            </a:r>
+            <a:r>
+              <a:rPr lang="ko-KR" altLang="en-US"/>
+              <a:t> 데이터를 토대로 보정 데이터 생성</a:t>
+            </a:r>
+            <a:endParaRPr lang="ko-KR" altLang="en-US"/>
+          </a:p>
+        </p:txBody>
+      </p:sp>
+      <p:pic>
+        <p:nvPicPr>
+          <p:cNvPr id="4" name="그림 3"/>
+          <p:cNvPicPr>
+            <a:picLocks noChangeAspect="1"/>
+          </p:cNvPicPr>
+          <p:nvPr/>
+        </p:nvPicPr>
+        <p:blipFill rotWithShape="1">
+          <a:blip r:embed="rId2"/>
+          <a:stretch>
+            <a:fillRect/>
+          </a:stretch>
+        </p:blipFill>
+        <p:spPr>
+          <a:xfrm>
+            <a:off x="7415281" y="1724751"/>
+            <a:ext cx="3675325" cy="4487997"/>
+          </a:xfrm>
+          <a:prstGeom prst="rect">
+            <a:avLst/>
+          </a:prstGeom>
+        </p:spPr>
+      </p:pic>
     </p:spTree>
-    <p:extLst>
-      <p:ext uri="{BB962C8B-B14F-4D97-AF65-F5344CB8AC3E}">
-        <p14:creationId xmlns:p14="http://schemas.microsoft.com/office/powerpoint/2010/main" val="1372364776"/>
-      </p:ext>
-    </p:extLst>
   </p:cSld>
   <p:clrMapOvr>
     <a:masterClrMapping/>
   </p:clrMapOvr>
+  <mc:AlternateContent xmlns:mc="http://schemas.openxmlformats.org/markup-compatibility/2006">
+    <mc:Choice xmlns:p14="http://schemas.microsoft.com/office/powerpoint/2010/main" Requires="p14">
+      <p:transition xmlns:mc="http://schemas.openxmlformats.org/markup-compatibility/2006" xmlns:p14="http://schemas.microsoft.com/office/powerpoint/2010/main" mc:Ignorable="p14" p14:dur="500"/>
+    </mc:Choice>
+    <mc:Fallback>
+      <p:transition/>
+    </mc:Fallback>
+  </mc:AlternateContent>
+</p:sld>
+</file>
+
+<file path=ppt/slides/slide15.xml><?xml version="1.0" encoding="utf-8"?>
+<p:sld xmlns:r="http://schemas.openxmlformats.org/officeDocument/2006/relationships" xmlns:c="http://schemas.openxmlformats.org/drawingml/2006/chart" xmlns:a="http://schemas.openxmlformats.org/drawingml/2006/main" xmlns:dgm="http://schemas.openxmlformats.org/drawingml/2006/diagram" xmlns:dsp="http://schemas.microsoft.com/office/drawing/2008/diagram" xmlns:p="http://schemas.openxmlformats.org/presentationml/2006/main">
+  <p:cSld>
+    <p:spTree>
+      <p:nvGrpSpPr>
+        <p:cNvPr id="1" name=""/>
+        <p:cNvGrpSpPr/>
+        <p:nvPr/>
+      </p:nvGrpSpPr>
+      <p:grpSpPr>
+        <a:xfrm>
+          <a:off x="0" y="0"/>
+          <a:ext cx="0" cy="0"/>
+          <a:chOff x="0" y="0"/>
+          <a:chExt cx="0" cy="0"/>
+        </a:xfrm>
+      </p:grpSpPr>
+      <p:sp>
+        <p:nvSpPr>
+          <p:cNvPr id="2" name="제목 1"/>
+          <p:cNvSpPr>
+            <a:spLocks noGrp="1"/>
+          </p:cNvSpPr>
+          <p:nvPr>
+            <p:ph type="title" idx="0"/>
+          </p:nvPr>
+        </p:nvSpPr>
+        <p:spPr/>
+        <p:txBody>
+          <a:bodyPr/>
+          <a:lstStyle/>
+          <a:p>
+            <a:pPr lvl="0">
+              <a:defRPr/>
+            </a:pPr>
+            <a:r>
+              <a:rPr lang="ko-KR" altLang="en-US"/>
+              <a:t>센서부 </a:t>
+            </a:r>
+            <a:r>
+              <a:rPr lang="en-US" altLang="ko-KR"/>
+              <a:t>– </a:t>
+            </a:r>
+            <a:r>
+              <a:rPr lang="ko-KR" altLang="en-US"/>
+              <a:t>센서 보정 알고리즘</a:t>
+            </a:r>
+            <a:endParaRPr lang="ko-KR" altLang="en-US"/>
+          </a:p>
+        </p:txBody>
+      </p:sp>
+      <p:sp>
+        <p:nvSpPr>
+          <p:cNvPr id="3" name="내용 개체 틀 2"/>
+          <p:cNvSpPr>
+            <a:spLocks noGrp="1"/>
+          </p:cNvSpPr>
+          <p:nvPr>
+            <p:ph idx="1"/>
+          </p:nvPr>
+        </p:nvSpPr>
+        <p:spPr>
+          <a:xfrm>
+            <a:off x="838200" y="1825625"/>
+            <a:ext cx="5493589" cy="4255998"/>
+          </a:xfrm>
+        </p:spPr>
+        <p:txBody>
+          <a:bodyPr>
+            <a:normAutofit lnSpcReduction="10000"/>
+          </a:bodyPr>
+          <a:lstStyle/>
+          <a:p>
+            <a:pPr lvl="0">
+              <a:lnSpc>
+                <a:spcPct val="120000"/>
+              </a:lnSpc>
+              <a:defRPr/>
+            </a:pPr>
+            <a:r>
+              <a:rPr lang="ko-KR" altLang="en-US"/>
+              <a:t/>
+            </a:r>
+            <a:endParaRPr lang="ko-KR" altLang="en-US"/>
+          </a:p>
+        </p:txBody>
+      </p:sp>
+    </p:spTree>
+  </p:cSld>
+  <p:clrMapOvr>
+    <a:masterClrMapping/>
+  </p:clrMapOvr>
+  <mc:AlternateContent xmlns:mc="http://schemas.openxmlformats.org/markup-compatibility/2006">
+    <mc:Choice xmlns:p14="http://schemas.microsoft.com/office/powerpoint/2010/main" Requires="p14">
+      <p:transition xmlns:mc="http://schemas.openxmlformats.org/markup-compatibility/2006" xmlns:p14="http://schemas.microsoft.com/office/powerpoint/2010/main" mc:Ignorable="p14" p14:dur="500"/>
+    </mc:Choice>
+    <mc:Fallback>
+      <p:transition/>
+    </mc:Fallback>
+  </mc:AlternateContent>
 </p:sld>
 </file>
 
@@ -8048,44 +8343,44 @@
 </file>
 
 <file path=ppt/theme/theme1.xml><?xml version="1.0" encoding="utf-8"?>
-<a:theme xmlns:a="http://schemas.openxmlformats.org/drawingml/2006/main" name="Office 테마">
+<a:theme xmlns:r="http://schemas.openxmlformats.org/officeDocument/2006/relationships" xmlns:c="http://schemas.openxmlformats.org/drawingml/2006/chart" xmlns:dgm="http://schemas.openxmlformats.org/drawingml/2006/diagram" xmlns:dsp="http://schemas.microsoft.com/office/drawing/2008/diagram" xmlns:a="http://schemas.openxmlformats.org/drawingml/2006/main" xmlns:pic="http://schemas.openxmlformats.org/drawingml/2006/picture" xmlns:wp="http://schemas.openxmlformats.org/drawingml/2006/wordprocessingDrawing" xmlns:xdr="http://schemas.openxmlformats.org/drawingml/2006/spreadsheetDrawing" xmlns:lc="http://schemas.openxmlformats.org/drawingml/2006/lockedCanvas" xmlns:p="http://schemas.openxmlformats.org/presentationml/2006/main" name="Office 테마">
   <a:themeElements>
     <a:clrScheme name="Office">
       <a:dk1>
         <a:sysClr val="windowText" lastClr="000000"/>
       </a:dk1>
       <a:lt1>
-        <a:sysClr val="window" lastClr="FFFFFF"/>
+        <a:sysClr val="window" lastClr="ffffff"/>
       </a:lt1>
       <a:dk2>
-        <a:srgbClr val="44546A"/>
+        <a:srgbClr val="44546a"/>
       </a:dk2>
       <a:lt2>
-        <a:srgbClr val="E7E6E6"/>
+        <a:srgbClr val="e7e6e6"/>
       </a:lt2>
       <a:accent1>
-        <a:srgbClr val="4472C4"/>
+        <a:srgbClr val="4472c4"/>
       </a:accent1>
       <a:accent2>
-        <a:srgbClr val="ED7D31"/>
+        <a:srgbClr val="ed7d31"/>
       </a:accent2>
       <a:accent3>
-        <a:srgbClr val="A5A5A5"/>
+        <a:srgbClr val="a5a5a5"/>
       </a:accent3>
       <a:accent4>
-        <a:srgbClr val="FFC000"/>
+        <a:srgbClr val="ffc000"/>
       </a:accent4>
       <a:accent5>
-        <a:srgbClr val="5B9BD5"/>
+        <a:srgbClr val="5b9bd5"/>
       </a:accent5>
       <a:accent6>
-        <a:srgbClr val="70AD47"/>
+        <a:srgbClr val="70ad47"/>
       </a:accent6>
       <a:hlink>
-        <a:srgbClr val="0563C1"/>
+        <a:srgbClr val="0563c1"/>
       </a:hlink>
       <a:folHlink>
-        <a:srgbClr val="954F72"/>
+        <a:srgbClr val="954f72"/>
       </a:folHlink>
     </a:clrScheme>
     <a:fontScheme name="Office">
@@ -8093,7 +8388,7 @@
         <a:latin typeface="맑은 고딕" panose="020F0302020204030204"/>
         <a:ea typeface=""/>
         <a:cs typeface=""/>
-        <a:font script="Jpan" typeface="游ゴシック Light"/>
+        <a:font script="Jpan" typeface="Yu Gothic Light"/>
         <a:font script="Hang" typeface="맑은 고딕"/>
         <a:font script="Hans" typeface="等线 Light"/>
         <a:font script="Hant" typeface="新細明體"/>
@@ -8145,7 +8440,7 @@
         <a:latin typeface="맑은 고딕" panose="020F0502020204030204"/>
         <a:ea typeface=""/>
         <a:cs typeface=""/>
-        <a:font script="Jpan" typeface="游ゴシック"/>
+        <a:font script="Jpan" typeface="Yu Gothic"/>
         <a:font script="Hang" typeface="맑은 고딕"/>
         <a:font script="Hans" typeface="等线"/>
         <a:font script="Hant" typeface="新細明體"/>
@@ -8258,21 +8553,21 @@
             <a:schemeClr val="phClr"/>
           </a:solidFill>
           <a:prstDash val="solid"/>
-          <a:miter lim="800000"/>
+          <a:miter/>
         </a:ln>
         <a:ln w="12700" cap="flat" cmpd="sng" algn="ctr">
           <a:solidFill>
             <a:schemeClr val="phClr"/>
           </a:solidFill>
           <a:prstDash val="solid"/>
-          <a:miter lim="800000"/>
+          <a:miter/>
         </a:ln>
         <a:ln w="19050" cap="flat" cmpd="sng" algn="ctr">
           <a:solidFill>
             <a:schemeClr val="phClr"/>
           </a:solidFill>
           <a:prstDash val="solid"/>
-          <a:miter lim="800000"/>
+          <a:miter/>
         </a:ln>
       </a:lnStyleLst>
       <a:effectStyleLst>
@@ -8332,12 +8627,5 @@
       </a:bgFillStyleLst>
     </a:fmtScheme>
   </a:themeElements>
-  <a:objectDefaults/>
-  <a:extraClrSchemeLst/>
-  <a:extLst>
-    <a:ext uri="{05A4C25C-085E-4340-85A3-A5531E510DB2}">
-      <thm15:themeFamily xmlns:thm15="http://schemas.microsoft.com/office/thememl/2012/main" name="Office Theme" id="{62F939B6-93AF-4DB8-9C6B-D6C7DFDC589F}" vid="{4A3C46E8-61CC-4603-A589-7422A47A8E4A}"/>
-    </a:ext>
-  </a:extLst>
 </a:theme>
 </file>
</xml_diff>

<commit_message>
Jun 29, 2024. Cleaned some codes in cmd.
1. RSVD area was declared(because to prodect a wrong access by someone's modification).
2. Memory effect analysis in ppt when code_section is defined.

Signed-off-by: Nodang <noj7413@naver.com>
</commit_message>
<xml_diff>
--- a/hara_instruction.pptx
+++ b/hara_instruction.pptx
@@ -17,9 +17,10 @@
     <p:sldId id="266" r:id="rId11"/>
     <p:sldId id="267" r:id="rId12"/>
     <p:sldId id="268" r:id="rId13"/>
-    <p:sldId id="271" r:id="rId14"/>
-    <p:sldId id="269" r:id="rId15"/>
-    <p:sldId id="270" r:id="rId16"/>
+    <p:sldId id="272" r:id="rId14"/>
+    <p:sldId id="271" r:id="rId15"/>
+    <p:sldId id="269" r:id="rId16"/>
+    <p:sldId id="270" r:id="rId17"/>
   </p:sldIdLst>
   <p:sldSz cx="12192000" cy="6858000"/>
   <p:notesSz cx="6858000" cy="9144000"/>
@@ -143,6 +144,7 @@
         </p14:section>
         <p14:section id="{ADB6ED96-5ADD-4541-A131-ACD28EC879F8}" name="SW">
           <p14:sldIdLst>
+            <p14:sldId id="272"/>
             <p14:sldId id="271"/>
             <p14:sldId id="269"/>
             <p14:sldId id="270"/>
@@ -4961,148 +4963,537 @@
             </a:pPr>
             <a:r>
               <a:rPr lang="ko-KR" altLang="en-US"/>
-              <a:t>동작 알고리즘</a:t>
+              <a:t>메모리</a:t>
             </a:r>
             <a:endParaRPr lang="ko-KR" altLang="en-US"/>
           </a:p>
         </p:txBody>
       </p:sp>
-      <p:sp>
-        <p:nvSpPr>
-          <p:cNvPr id="3" name="내용 개체 틀 2"/>
-          <p:cNvSpPr>
-            <a:spLocks noGrp="1"/>
-          </p:cNvSpPr>
-          <p:nvPr>
-            <p:ph idx="1"/>
-          </p:nvPr>
-        </p:nvSpPr>
-        <p:spPr/>
-        <p:txBody>
-          <a:bodyPr/>
-          <a:lstStyle/>
-          <a:p>
-            <a:pPr marL="518000" lvl="0" indent="-518000">
-              <a:buAutoNum type="arabicPeriod"/>
+      <p:pic>
+        <p:nvPicPr>
+          <p:cNvPr id="4" name="그림 3"/>
+          <p:cNvPicPr>
+            <a:picLocks noChangeAspect="1"/>
+          </p:cNvPicPr>
+          <p:nvPr/>
+        </p:nvPicPr>
+        <p:blipFill rotWithShape="1">
+          <a:blip r:embed="rId2"/>
+          <a:stretch>
+            <a:fillRect/>
+          </a:stretch>
+        </p:blipFill>
+        <p:spPr>
+          <a:xfrm>
+            <a:off x="6721929" y="2119503"/>
+            <a:ext cx="3858163" cy="514421"/>
+          </a:xfrm>
+          <a:prstGeom prst="rect">
+            <a:avLst/>
+          </a:prstGeom>
+        </p:spPr>
+      </p:pic>
+      <p:pic>
+        <p:nvPicPr>
+          <p:cNvPr id="5" name="그림 4"/>
+          <p:cNvPicPr>
+            <a:picLocks noChangeAspect="1"/>
+          </p:cNvPicPr>
+          <p:nvPr/>
+        </p:nvPicPr>
+        <p:blipFill rotWithShape="1">
+          <a:blip r:embed="rId3"/>
+          <a:stretch>
+            <a:fillRect/>
+          </a:stretch>
+        </p:blipFill>
+        <p:spPr>
+          <a:xfrm>
+            <a:off x="6712857" y="2704571"/>
+            <a:ext cx="4105848" cy="1086001"/>
+          </a:xfrm>
+          <a:prstGeom prst="rect">
+            <a:avLst/>
+          </a:prstGeom>
+        </p:spPr>
+      </p:pic>
+      <p:pic>
+        <p:nvPicPr>
+          <p:cNvPr id="6" name="그림 5"/>
+          <p:cNvPicPr>
+            <a:picLocks noChangeAspect="1"/>
+          </p:cNvPicPr>
+          <p:nvPr/>
+        </p:nvPicPr>
+        <p:blipFill rotWithShape="1">
+          <a:blip r:embed="rId4"/>
+          <a:stretch>
+            <a:fillRect/>
+          </a:stretch>
+        </p:blipFill>
+        <p:spPr>
+          <a:xfrm>
+            <a:off x="6096000" y="3908957"/>
+            <a:ext cx="5734850" cy="2124371"/>
+          </a:xfrm>
+          <a:prstGeom prst="rect">
+            <a:avLst/>
+          </a:prstGeom>
+        </p:spPr>
+      </p:pic>
+      <p:pic>
+        <p:nvPicPr>
+          <p:cNvPr id="7" name="그림 6"/>
+          <p:cNvPicPr>
+            <a:picLocks noChangeAspect="1"/>
+          </p:cNvPicPr>
+          <p:nvPr/>
+        </p:nvPicPr>
+        <p:blipFill rotWithShape="1">
+          <a:blip r:embed="rId5"/>
+          <a:stretch>
+            <a:fillRect/>
+          </a:stretch>
+        </p:blipFill>
+        <p:spPr>
+          <a:xfrm>
+            <a:off x="320310" y="1914071"/>
+            <a:ext cx="5201376" cy="1695686"/>
+          </a:xfrm>
+          <a:prstGeom prst="rect">
+            <a:avLst/>
+          </a:prstGeom>
+        </p:spPr>
+      </p:pic>
+      <p:sp>
+        <p:nvSpPr>
+          <p:cNvPr id="8" name="가로 글상자 7"/>
+          <p:cNvSpPr txBox="1"/>
+          <p:nvPr/>
+        </p:nvSpPr>
+        <p:spPr>
+          <a:xfrm>
+            <a:off x="7874000" y="1610178"/>
+            <a:ext cx="1714500" cy="363220"/>
+          </a:xfrm>
+          <a:prstGeom prst="rect">
+            <a:avLst/>
+          </a:prstGeom>
+        </p:spPr>
+        <p:txBody>
+          <a:bodyPr wrap="square">
+            <a:spAutoFit/>
+          </a:bodyPr>
+          <a:p>
+            <a:pPr lvl="0" algn="ctr">
               <a:defRPr/>
             </a:pPr>
             <a:r>
-              <a:rPr lang="ko-KR" altLang="en-US"/>
-              <a:t>동작 명령과 해당 동작 명령으로 도달할 로봇 포지션 추정 </a:t>
-            </a:r>
+              <a:rPr lang="en-US" altLang="ko-KR"/>
+              <a:t>To Be</a:t>
+            </a:r>
+            <a:endParaRPr lang="en-US" altLang="ko-KR"/>
+          </a:p>
+        </p:txBody>
+      </p:sp>
+      <p:sp>
+        <p:nvSpPr>
+          <p:cNvPr id="9" name="가로 글상자 8"/>
+          <p:cNvSpPr txBox="1"/>
+          <p:nvPr/>
+        </p:nvSpPr>
+        <p:spPr>
+          <a:xfrm>
+            <a:off x="1975757" y="1544863"/>
+            <a:ext cx="1714500" cy="363220"/>
+          </a:xfrm>
+          <a:prstGeom prst="rect">
+            <a:avLst/>
+          </a:prstGeom>
+        </p:spPr>
+        <p:txBody>
+          <a:bodyPr wrap="square">
+            <a:spAutoFit/>
+          </a:bodyPr>
+          <a:p>
+            <a:pPr marL="0" lvl="0" indent="0" algn="ctr" defTabSz="914400" rtl="0" eaLnBrk="1" latinLnBrk="1" hangingPunct="1">
+              <a:lnSpc>
+                <a:spcPct val="100000"/>
+              </a:lnSpc>
+              <a:spcBef>
+                <a:spcPts val="0"/>
+              </a:spcBef>
+              <a:spcAft>
+                <a:spcPts val="0"/>
+              </a:spcAft>
+              <a:buNone/>
+              <a:defRPr/>
+            </a:pPr>
+            <a:r>
+              <a:rPr xmlns:mc="http://schemas.openxmlformats.org/markup-compatibility/2006" xmlns:hp="http://schemas.haansoft.com/office/presentation/8.0" kumimoji="0" lang="en-US" altLang="ko-KR" sz="1800" b="0" i="0" u="none" strike="noStrike" kern="1200" cap="none" spc="0" normalizeH="0" baseline="0" mc:Ignorable="hp" hp:hslEmbossed="0">
+                <a:solidFill>
+                  <a:srgbClr val="000000"/>
+                </a:solidFill>
+                <a:latin typeface="맑은 고딕"/>
+                <a:ea typeface="맑은 고딕"/>
+                <a:cs typeface="맑은 고딕"/>
+              </a:rPr>
+              <a:t>As Is</a:t>
+            </a:r>
+            <a:endParaRPr xmlns:mc="http://schemas.openxmlformats.org/markup-compatibility/2006" xmlns:hp="http://schemas.haansoft.com/office/presentation/8.0" kumimoji="0" lang="en-US" altLang="ko-KR" sz="1800" b="0" i="0" u="none" strike="noStrike" kern="1200" cap="none" spc="0" normalizeH="0" baseline="0" mc:Ignorable="hp" hp:hslEmbossed="0">
+              <a:solidFill>
+                <a:srgbClr val="000000"/>
+              </a:solidFill>
+              <a:latin typeface="맑은 고딕"/>
+              <a:ea typeface="맑은 고딕"/>
+              <a:cs typeface="맑은 고딕"/>
+            </a:endParaRPr>
+          </a:p>
+        </p:txBody>
+      </p:sp>
+      <p:sp>
+        <p:nvSpPr>
+          <p:cNvPr id="10" name="가로 글상자 9"/>
+          <p:cNvSpPr txBox="1"/>
+          <p:nvPr/>
+        </p:nvSpPr>
+        <p:spPr>
+          <a:xfrm>
+            <a:off x="10176328" y="2134507"/>
+            <a:ext cx="1714500" cy="363220"/>
+          </a:xfrm>
+          <a:prstGeom prst="rect">
+            <a:avLst/>
+          </a:prstGeom>
+        </p:spPr>
+        <p:txBody>
+          <a:bodyPr wrap="square">
+            <a:spAutoFit/>
+          </a:bodyPr>
+          <a:p>
+            <a:pPr marL="0" lvl="0" indent="0" algn="ctr" defTabSz="914400" rtl="0" eaLnBrk="1" latinLnBrk="1" hangingPunct="1">
+              <a:lnSpc>
+                <a:spcPct val="100000"/>
+              </a:lnSpc>
+              <a:spcBef>
+                <a:spcPts val="0"/>
+              </a:spcBef>
+              <a:spcAft>
+                <a:spcPts val="0"/>
+              </a:spcAft>
+              <a:buNone/>
+              <a:defRPr/>
+            </a:pPr>
+            <a:r>
+              <a:rPr xmlns:mc="http://schemas.openxmlformats.org/markup-compatibility/2006" xmlns:hp="http://schemas.haansoft.com/office/presentation/8.0" kumimoji="0" lang="en-US" altLang="ko-KR" sz="1800" b="0" i="0" u="none" strike="noStrike" kern="1200" cap="none" spc="0" normalizeH="0" baseline="0" mc:Ignorable="hp" hp:hslEmbossed="0">
+                <a:solidFill>
+                  <a:srgbClr val="000000"/>
+                </a:solidFill>
+                <a:latin typeface="맑은 고딕"/>
+                <a:ea typeface="맑은 고딕"/>
+                <a:cs typeface="맑은 고딕"/>
+              </a:rPr>
+              <a:t>.cmd</a:t>
+            </a:r>
+            <a:endParaRPr xmlns:mc="http://schemas.openxmlformats.org/markup-compatibility/2006" xmlns:hp="http://schemas.haansoft.com/office/presentation/8.0" kumimoji="0" lang="en-US" altLang="ko-KR" sz="1800" b="0" i="0" u="none" strike="noStrike" kern="1200" cap="none" spc="0" normalizeH="0" baseline="0" mc:Ignorable="hp" hp:hslEmbossed="0">
+              <a:solidFill>
+                <a:srgbClr val="000000"/>
+              </a:solidFill>
+              <a:latin typeface="맑은 고딕"/>
+              <a:ea typeface="맑은 고딕"/>
+              <a:cs typeface="맑은 고딕"/>
+            </a:endParaRPr>
+          </a:p>
+        </p:txBody>
+      </p:sp>
+      <p:sp>
+        <p:nvSpPr>
+          <p:cNvPr id="11" name="가로 글상자 10"/>
+          <p:cNvSpPr txBox="1"/>
+          <p:nvPr/>
+        </p:nvSpPr>
+        <p:spPr>
+          <a:xfrm>
+            <a:off x="10256156" y="2813050"/>
+            <a:ext cx="1714500" cy="366395"/>
+          </a:xfrm>
+          <a:prstGeom prst="rect">
+            <a:avLst/>
+          </a:prstGeom>
+        </p:spPr>
+        <p:txBody>
+          <a:bodyPr wrap="square">
+            <a:spAutoFit/>
+          </a:bodyPr>
+          <a:p>
+            <a:pPr marL="0" lvl="0" indent="0" algn="ctr" defTabSz="914400" rtl="0" eaLnBrk="1" latinLnBrk="1" hangingPunct="1">
+              <a:lnSpc>
+                <a:spcPct val="100000"/>
+              </a:lnSpc>
+              <a:spcBef>
+                <a:spcPts val="0"/>
+              </a:spcBef>
+              <a:spcAft>
+                <a:spcPts val="0"/>
+              </a:spcAft>
+              <a:buNone/>
+              <a:defRPr/>
+            </a:pPr>
+            <a:r>
+              <a:rPr xmlns:mc="http://schemas.openxmlformats.org/markup-compatibility/2006" xmlns:hp="http://schemas.haansoft.com/office/presentation/8.0" kumimoji="0" lang="en-US" altLang="ko-KR" sz="1800" b="0" i="0" u="none" strike="noStrike" kern="1200" cap="none" spc="0" normalizeH="0" baseline="0" mc:Ignorable="hp" hp:hslEmbossed="0">
+                <a:solidFill>
+                  <a:srgbClr val="000000"/>
+                </a:solidFill>
+                <a:latin typeface="맑은 고딕"/>
+                <a:ea typeface="맑은 고딕"/>
+                <a:cs typeface="맑은 고딕"/>
+              </a:rPr>
+              <a:t>menu.c</a:t>
+            </a:r>
+            <a:endParaRPr xmlns:mc="http://schemas.openxmlformats.org/markup-compatibility/2006" xmlns:hp="http://schemas.haansoft.com/office/presentation/8.0" kumimoji="0" lang="en-US" altLang="ko-KR" sz="1800" b="0" i="0" u="none" strike="noStrike" kern="1200" cap="none" spc="0" normalizeH="0" baseline="0" mc:Ignorable="hp" hp:hslEmbossed="0">
+              <a:solidFill>
+                <a:srgbClr val="000000"/>
+              </a:solidFill>
+              <a:latin typeface="맑은 고딕"/>
+              <a:ea typeface="맑은 고딕"/>
+              <a:cs typeface="맑은 고딕"/>
+            </a:endParaRPr>
+          </a:p>
+        </p:txBody>
+      </p:sp>
+      <p:sp>
+        <p:nvSpPr>
+          <p:cNvPr id="12" name="가로 글상자 11"/>
+          <p:cNvSpPr txBox="1"/>
+          <p:nvPr/>
+        </p:nvSpPr>
+        <p:spPr>
+          <a:xfrm>
+            <a:off x="10477500" y="3754664"/>
+            <a:ext cx="1714500" cy="366395"/>
+          </a:xfrm>
+          <a:prstGeom prst="rect">
+            <a:avLst/>
+          </a:prstGeom>
+        </p:spPr>
+        <p:txBody>
+          <a:bodyPr wrap="square">
+            <a:spAutoFit/>
+          </a:bodyPr>
+          <a:p>
+            <a:pPr marL="0" lvl="0" indent="0" algn="ctr" defTabSz="914400" rtl="0" eaLnBrk="1" latinLnBrk="1" hangingPunct="1">
+              <a:lnSpc>
+                <a:spcPct val="100000"/>
+              </a:lnSpc>
+              <a:spcBef>
+                <a:spcPts val="0"/>
+              </a:spcBef>
+              <a:spcAft>
+                <a:spcPts val="0"/>
+              </a:spcAft>
+              <a:buNone/>
+              <a:defRPr/>
+            </a:pPr>
+            <a:r>
+              <a:rPr xmlns:mc="http://schemas.openxmlformats.org/markup-compatibility/2006" xmlns:hp="http://schemas.haansoft.com/office/presentation/8.0" kumimoji="0" lang="en-US" altLang="ko-KR" sz="1800" b="0" i="0" u="none" strike="noStrike" kern="1200" cap="none" spc="0" normalizeH="0" baseline="0" mc:Ignorable="hp" hp:hslEmbossed="0">
+                <a:solidFill>
+                  <a:srgbClr val="000000"/>
+                </a:solidFill>
+                <a:latin typeface="맑은 고딕"/>
+                <a:ea typeface="맑은 고딕"/>
+                <a:cs typeface="맑은 고딕"/>
+              </a:rPr>
+              <a:t>.map</a:t>
+            </a:r>
+            <a:endParaRPr xmlns:mc="http://schemas.openxmlformats.org/markup-compatibility/2006" xmlns:hp="http://schemas.haansoft.com/office/presentation/8.0" kumimoji="0" lang="en-US" altLang="ko-KR" sz="1800" b="0" i="0" u="none" strike="noStrike" kern="1200" cap="none" spc="0" normalizeH="0" baseline="0" mc:Ignorable="hp" hp:hslEmbossed="0">
+              <a:solidFill>
+                <a:srgbClr val="000000"/>
+              </a:solidFill>
+              <a:latin typeface="맑은 고딕"/>
+              <a:ea typeface="맑은 고딕"/>
+              <a:cs typeface="맑은 고딕"/>
+            </a:endParaRPr>
+          </a:p>
+        </p:txBody>
+      </p:sp>
+      <p:sp>
+        <p:nvSpPr>
+          <p:cNvPr id="13" name="가로 글상자 12"/>
+          <p:cNvSpPr txBox="1"/>
+          <p:nvPr/>
+        </p:nvSpPr>
+        <p:spPr>
+          <a:xfrm>
+            <a:off x="4036785" y="1748063"/>
+            <a:ext cx="1714500" cy="366395"/>
+          </a:xfrm>
+          <a:prstGeom prst="rect">
+            <a:avLst/>
+          </a:prstGeom>
+        </p:spPr>
+        <p:txBody>
+          <a:bodyPr wrap="square">
+            <a:spAutoFit/>
+          </a:bodyPr>
+          <a:p>
+            <a:pPr marL="0" lvl="0" indent="0" algn="ctr" defTabSz="914400" rtl="0" eaLnBrk="1" latinLnBrk="1" hangingPunct="1">
+              <a:lnSpc>
+                <a:spcPct val="100000"/>
+              </a:lnSpc>
+              <a:spcBef>
+                <a:spcPts val="0"/>
+              </a:spcBef>
+              <a:spcAft>
+                <a:spcPts val="0"/>
+              </a:spcAft>
+              <a:buNone/>
+              <a:defRPr/>
+            </a:pPr>
+            <a:r>
+              <a:rPr xmlns:mc="http://schemas.openxmlformats.org/markup-compatibility/2006" xmlns:hp="http://schemas.haansoft.com/office/presentation/8.0" kumimoji="0" lang="en-US" altLang="ko-KR" sz="1800" b="0" i="0" u="none" strike="noStrike" kern="1200" cap="none" spc="0" normalizeH="0" baseline="0" mc:Ignorable="hp" hp:hslEmbossed="0">
+                <a:solidFill>
+                  <a:srgbClr val="000000"/>
+                </a:solidFill>
+                <a:latin typeface="맑은 고딕"/>
+                <a:ea typeface="맑은 고딕"/>
+                <a:cs typeface="맑은 고딕"/>
+              </a:rPr>
+              <a:t>.map</a:t>
+            </a:r>
+            <a:endParaRPr xmlns:mc="http://schemas.openxmlformats.org/markup-compatibility/2006" xmlns:hp="http://schemas.haansoft.com/office/presentation/8.0" kumimoji="0" lang="en-US" altLang="ko-KR" sz="1800" b="0" i="0" u="none" strike="noStrike" kern="1200" cap="none" spc="0" normalizeH="0" baseline="0" mc:Ignorable="hp" hp:hslEmbossed="0">
+              <a:solidFill>
+                <a:srgbClr val="000000"/>
+              </a:solidFill>
+              <a:latin typeface="맑은 고딕"/>
+              <a:ea typeface="맑은 고딕"/>
+              <a:cs typeface="맑은 고딕"/>
+            </a:endParaRPr>
+          </a:p>
+        </p:txBody>
+      </p:sp>
+      <p:sp>
+        <p:nvSpPr>
+          <p:cNvPr id="14" name="가로 글상자 13"/>
+          <p:cNvSpPr txBox="1"/>
+          <p:nvPr/>
+        </p:nvSpPr>
+        <p:spPr>
+          <a:xfrm>
+            <a:off x="263070" y="3805464"/>
+            <a:ext cx="5651501" cy="2553517"/>
+          </a:xfrm>
+          <a:prstGeom prst="rect">
+            <a:avLst/>
+          </a:prstGeom>
+        </p:spPr>
+        <p:txBody>
+          <a:bodyPr wrap="square">
+            <a:spAutoFit/>
+          </a:bodyPr>
+          <a:p>
+            <a:pPr lvl="0">
+              <a:defRPr/>
+            </a:pPr>
             <a:r>
               <a:rPr lang="en-US" altLang="ko-KR"/>
               <a:t>-</a:t>
             </a:r>
             <a:r>
               <a:rPr lang="ko-KR" altLang="en-US"/>
-              <a:t> </a:t>
-            </a:r>
-            <a:r>
-              <a:rPr lang="en-US" altLang="ko-KR"/>
-              <a:t>P_ebi (Estimated by Input)</a:t>
-            </a:r>
-            <a:endParaRPr lang="en-US" altLang="ko-KR"/>
-          </a:p>
-          <a:p>
-            <a:pPr marL="518000" lvl="0" indent="-518000">
-              <a:buAutoNum type="arabicPeriod"/>
+              <a:t> 행동</a:t>
+            </a:r>
+            <a:endParaRPr lang="ko-KR" altLang="en-US"/>
+          </a:p>
+          <a:p>
+            <a:pPr lvl="0">
               <a:defRPr/>
             </a:pPr>
             <a:r>
               <a:rPr lang="ko-KR" altLang="en-US"/>
-              <a:t>센싱</a:t>
+              <a:t>어떠한 함수를 임의로 </a:t>
+            </a:r>
+            <a:r>
+              <a:rPr lang="en-US" altLang="ko-KR"/>
+              <a:t>Flash</a:t>
+            </a:r>
+            <a:r>
+              <a:rPr lang="ko-KR" altLang="en-US"/>
+              <a:t>에서 실행되도록 설정</a:t>
             </a:r>
             <a:endParaRPr lang="ko-KR" altLang="en-US"/>
           </a:p>
           <a:p>
-            <a:pPr marL="518000" lvl="0" indent="-518000">
-              <a:buAutoNum type="arabicPeriod"/>
-              <a:defRPr/>
-            </a:pPr>
-            <a:r>
-              <a:rPr lang="ko-KR" altLang="en-US"/>
-              <a:t>센싱 데이터 기반으로 로봇 포지션 추정</a:t>
-            </a:r>
-            <a:r>
-              <a:rPr lang="en-US" altLang="ko-KR"/>
-              <a:t> - P_sd (Sensor Date)</a:t>
-            </a:r>
-            <a:endParaRPr lang="en-US" altLang="ko-KR"/>
-          </a:p>
-          <a:p>
-            <a:pPr marL="518000" lvl="0" indent="-518000">
-              <a:buAutoNum type="arabicPeriod"/>
-              <a:defRPr/>
-            </a:pPr>
-            <a:r>
-              <a:rPr lang="en-US" altLang="ko-KR"/>
-              <a:t>P_ebi</a:t>
-            </a:r>
-            <a:r>
-              <a:rPr lang="ko-KR" altLang="en-US"/>
-              <a:t>과 </a:t>
-            </a:r>
-            <a:r>
-              <a:rPr lang="en-US" altLang="ko-KR"/>
-              <a:t>P_sd</a:t>
-            </a:r>
-            <a:r>
-              <a:rPr lang="ko-KR" altLang="en-US"/>
-              <a:t> 사이 오차 제어</a:t>
-            </a:r>
-            <a:endParaRPr lang="ko-KR" altLang="en-US"/>
-          </a:p>
-          <a:p>
-            <a:pPr marL="518000" lvl="0" indent="-518000">
-              <a:buAutoNum type="arabicPeriod"/>
-              <a:defRPr/>
-            </a:pPr>
-            <a:r>
-              <a:rPr lang="ko-KR" altLang="en-US"/>
-              <a:t>제어 값 기반 게인</a:t>
-            </a:r>
-            <a:r>
-              <a:rPr lang="en-US" altLang="ko-KR"/>
-              <a:t>,</a:t>
-            </a:r>
-            <a:r>
-              <a:rPr lang="ko-KR" altLang="en-US"/>
-              <a:t> 모터 제어에 반영</a:t>
-            </a:r>
-            <a:endParaRPr lang="ko-KR" altLang="en-US"/>
-          </a:p>
-          <a:p>
-            <a:pPr marL="518000" lvl="0" indent="-518000">
-              <a:buAutoNum type="arabicPeriod"/>
-              <a:defRPr/>
-            </a:pPr>
-            <a:r>
-              <a:rPr lang="ko-KR" altLang="en-US"/>
-              <a:t>동작 명령이 종료될 때까지 </a:t>
-            </a:r>
-            <a:r>
-              <a:rPr lang="en-US" altLang="ko-KR"/>
-              <a:t>1~5</a:t>
-            </a:r>
-            <a:r>
-              <a:rPr lang="ko-KR" altLang="en-US"/>
-              <a:t> 반복</a:t>
-            </a:r>
-            <a:endParaRPr lang="ko-KR" altLang="en-US"/>
-          </a:p>
-          <a:p>
-            <a:pPr marL="518000" lvl="0" indent="-518000">
-              <a:buAutoNum type="arabicPeriod"/>
+            <a:pPr lvl="0">
               <a:defRPr/>
             </a:pPr>
             <a:endParaRPr lang="ko-KR" altLang="en-US"/>
           </a:p>
           <a:p>
-            <a:pPr marL="518000" lvl="0" indent="-518000">
-              <a:buAutoNum type="arabicPeriod"/>
+            <a:pPr lvl="0">
               <a:defRPr/>
             </a:pPr>
+            <a:r>
+              <a:rPr lang="en-US" altLang="ko-KR"/>
+              <a:t>-</a:t>
+            </a:r>
+            <a:r>
+              <a:rPr lang="ko-KR" altLang="en-US"/>
+              <a:t> 결과</a:t>
+            </a:r>
+            <a:endParaRPr lang="ko-KR" altLang="en-US"/>
+          </a:p>
+          <a:p>
+            <a:pPr lvl="0">
+              <a:defRPr/>
+            </a:pPr>
+            <a:r>
+              <a:rPr lang="ko-KR" altLang="en-US"/>
+              <a:t>램 영역은 변화하지 않음</a:t>
+            </a:r>
+            <a:endParaRPr lang="ko-KR" altLang="en-US"/>
+          </a:p>
+          <a:p>
+            <a:pPr lvl="0">
+              <a:defRPr/>
+            </a:pPr>
+            <a:r>
+              <a:rPr lang="en-US" altLang="ko-KR"/>
+              <a:t>.text </a:t>
+            </a:r>
+            <a:r>
+              <a:rPr lang="ko-KR" altLang="en-US"/>
+              <a:t>데이터 영역만 변화함</a:t>
+            </a:r>
+            <a:endParaRPr lang="ko-KR" altLang="en-US"/>
+          </a:p>
+          <a:p>
+            <a:pPr lvl="0">
+              <a:defRPr/>
+            </a:pPr>
+            <a:endParaRPr lang="ko-KR" altLang="en-US"/>
+          </a:p>
+          <a:p>
+            <a:pPr lvl="0">
+              <a:defRPr/>
+            </a:pPr>
+            <a:r>
+              <a:rPr lang="en-US" altLang="ko-KR"/>
+              <a:t>-</a:t>
+            </a:r>
+            <a:r>
+              <a:rPr lang="ko-KR" altLang="en-US"/>
+              <a:t> 결론</a:t>
+            </a:r>
+            <a:endParaRPr lang="ko-KR" altLang="en-US"/>
+          </a:p>
+          <a:p>
+            <a:pPr lvl="0">
+              <a:defRPr/>
+            </a:pPr>
+            <a:r>
+              <a:rPr lang="ko-KR" altLang="en-US"/>
+              <a:t>의미 없음</a:t>
+            </a:r>
             <a:endParaRPr lang="ko-KR" altLang="en-US"/>
           </a:p>
         </p:txBody>
@@ -5124,6 +5515,205 @@
 </file>
 
 <file path=ppt/slides/slide14.xml><?xml version="1.0" encoding="utf-8"?>
+<p:sld xmlns:r="http://schemas.openxmlformats.org/officeDocument/2006/relationships" xmlns:c="http://schemas.openxmlformats.org/drawingml/2006/chart" xmlns:a="http://schemas.openxmlformats.org/drawingml/2006/main" xmlns:dgm="http://schemas.openxmlformats.org/drawingml/2006/diagram" xmlns:dsp="http://schemas.microsoft.com/office/drawing/2008/diagram" xmlns:p="http://schemas.openxmlformats.org/presentationml/2006/main">
+  <p:cSld>
+    <p:spTree>
+      <p:nvGrpSpPr>
+        <p:cNvPr id="1" name=""/>
+        <p:cNvGrpSpPr/>
+        <p:nvPr/>
+      </p:nvGrpSpPr>
+      <p:grpSpPr>
+        <a:xfrm>
+          <a:off x="0" y="0"/>
+          <a:ext cx="0" cy="0"/>
+          <a:chOff x="0" y="0"/>
+          <a:chExt cx="0" cy="0"/>
+        </a:xfrm>
+      </p:grpSpPr>
+      <p:sp>
+        <p:nvSpPr>
+          <p:cNvPr id="2" name="제목 1"/>
+          <p:cNvSpPr>
+            <a:spLocks noGrp="1"/>
+          </p:cNvSpPr>
+          <p:nvPr>
+            <p:ph type="title" idx="0"/>
+          </p:nvPr>
+        </p:nvSpPr>
+        <p:spPr/>
+        <p:txBody>
+          <a:bodyPr/>
+          <a:lstStyle/>
+          <a:p>
+            <a:pPr lvl="0">
+              <a:defRPr/>
+            </a:pPr>
+            <a:r>
+              <a:rPr lang="ko-KR" altLang="en-US"/>
+              <a:t>동작 알고리즘</a:t>
+            </a:r>
+            <a:endParaRPr lang="ko-KR" altLang="en-US"/>
+          </a:p>
+        </p:txBody>
+      </p:sp>
+      <p:sp>
+        <p:nvSpPr>
+          <p:cNvPr id="3" name="내용 개체 틀 2"/>
+          <p:cNvSpPr>
+            <a:spLocks noGrp="1"/>
+          </p:cNvSpPr>
+          <p:nvPr>
+            <p:ph idx="1"/>
+          </p:nvPr>
+        </p:nvSpPr>
+        <p:spPr/>
+        <p:txBody>
+          <a:bodyPr/>
+          <a:lstStyle/>
+          <a:p>
+            <a:pPr marL="518000" lvl="0" indent="-518000">
+              <a:buAutoNum type="arabicPeriod"/>
+              <a:defRPr/>
+            </a:pPr>
+            <a:r>
+              <a:rPr lang="ko-KR" altLang="en-US"/>
+              <a:t>동작 명령과 해당 동작 명령으로 도달할 로봇 포지션 추정 </a:t>
+            </a:r>
+            <a:r>
+              <a:rPr lang="en-US" altLang="ko-KR"/>
+              <a:t>-</a:t>
+            </a:r>
+            <a:r>
+              <a:rPr lang="ko-KR" altLang="en-US"/>
+              <a:t> </a:t>
+            </a:r>
+            <a:r>
+              <a:rPr lang="en-US" altLang="ko-KR"/>
+              <a:t>P_ebi (Estimated by Input)</a:t>
+            </a:r>
+            <a:endParaRPr lang="en-US" altLang="ko-KR"/>
+          </a:p>
+          <a:p>
+            <a:pPr marL="518000" lvl="0" indent="-518000">
+              <a:buAutoNum type="arabicPeriod"/>
+              <a:defRPr/>
+            </a:pPr>
+            <a:r>
+              <a:rPr lang="ko-KR" altLang="en-US"/>
+              <a:t>센싱</a:t>
+            </a:r>
+            <a:endParaRPr lang="ko-KR" altLang="en-US"/>
+          </a:p>
+          <a:p>
+            <a:pPr marL="518000" lvl="0" indent="-518000">
+              <a:buAutoNum type="arabicPeriod"/>
+              <a:defRPr/>
+            </a:pPr>
+            <a:r>
+              <a:rPr lang="ko-KR" altLang="en-US"/>
+              <a:t>센싱 데이터 기반으로 로봇 포지션 추정</a:t>
+            </a:r>
+            <a:r>
+              <a:rPr lang="en-US" altLang="ko-KR"/>
+              <a:t> - P_sd (Sensor Date)</a:t>
+            </a:r>
+            <a:endParaRPr lang="en-US" altLang="ko-KR"/>
+          </a:p>
+          <a:p>
+            <a:pPr marL="518000" lvl="0" indent="-518000">
+              <a:buAutoNum type="arabicPeriod"/>
+              <a:defRPr/>
+            </a:pPr>
+            <a:r>
+              <a:rPr lang="en-US" altLang="ko-KR"/>
+              <a:t>P_ebi</a:t>
+            </a:r>
+            <a:r>
+              <a:rPr lang="ko-KR" altLang="en-US"/>
+              <a:t>과 </a:t>
+            </a:r>
+            <a:r>
+              <a:rPr lang="en-US" altLang="ko-KR"/>
+              <a:t>P_sd</a:t>
+            </a:r>
+            <a:r>
+              <a:rPr lang="ko-KR" altLang="en-US"/>
+              <a:t> 사이 오차 제어</a:t>
+            </a:r>
+            <a:endParaRPr lang="ko-KR" altLang="en-US"/>
+          </a:p>
+          <a:p>
+            <a:pPr marL="518000" lvl="0" indent="-518000">
+              <a:buAutoNum type="arabicPeriod"/>
+              <a:defRPr/>
+            </a:pPr>
+            <a:r>
+              <a:rPr lang="ko-KR" altLang="en-US"/>
+              <a:t>제어 값 기반 게인</a:t>
+            </a:r>
+            <a:r>
+              <a:rPr lang="en-US" altLang="ko-KR"/>
+              <a:t>,</a:t>
+            </a:r>
+            <a:r>
+              <a:rPr lang="ko-KR" altLang="en-US"/>
+              <a:t> 모터 제어에 반영</a:t>
+            </a:r>
+            <a:endParaRPr lang="ko-KR" altLang="en-US"/>
+          </a:p>
+          <a:p>
+            <a:pPr marL="518000" lvl="0" indent="-518000">
+              <a:buAutoNum type="arabicPeriod"/>
+              <a:defRPr/>
+            </a:pPr>
+            <a:r>
+              <a:rPr lang="ko-KR" altLang="en-US"/>
+              <a:t>동작 명령이 종료될 때까지 </a:t>
+            </a:r>
+            <a:r>
+              <a:rPr lang="en-US" altLang="ko-KR"/>
+              <a:t>1~5</a:t>
+            </a:r>
+            <a:r>
+              <a:rPr lang="ko-KR" altLang="en-US"/>
+              <a:t> 반복</a:t>
+            </a:r>
+            <a:endParaRPr lang="ko-KR" altLang="en-US"/>
+          </a:p>
+          <a:p>
+            <a:pPr marL="518000" lvl="0" indent="-518000">
+              <a:buAutoNum type="arabicPeriod"/>
+              <a:defRPr/>
+            </a:pPr>
+            <a:endParaRPr lang="ko-KR" altLang="en-US"/>
+          </a:p>
+          <a:p>
+            <a:pPr marL="518000" lvl="0" indent="-518000">
+              <a:buAutoNum type="arabicPeriod"/>
+              <a:defRPr/>
+            </a:pPr>
+            <a:endParaRPr lang="ko-KR" altLang="en-US"/>
+          </a:p>
+        </p:txBody>
+      </p:sp>
+    </p:spTree>
+  </p:cSld>
+  <p:clrMapOvr>
+    <a:masterClrMapping/>
+  </p:clrMapOvr>
+  <mc:AlternateContent xmlns:mc="http://schemas.openxmlformats.org/markup-compatibility/2006">
+    <mc:Choice xmlns:p14="http://schemas.microsoft.com/office/powerpoint/2010/main" Requires="p14">
+      <p:transition xmlns:mc="http://schemas.openxmlformats.org/markup-compatibility/2006" xmlns:p14="http://schemas.microsoft.com/office/powerpoint/2010/main" mc:Ignorable="p14" p14:dur="500"/>
+    </mc:Choice>
+    <mc:Fallback>
+      <p:transition/>
+    </mc:Fallback>
+  </mc:AlternateContent>
+</p:sld>
+</file>
+
+<file path=ppt/slides/slide15.xml><?xml version="1.0" encoding="utf-8"?>
 <p:sld xmlns:r="http://schemas.openxmlformats.org/officeDocument/2006/relationships" xmlns:c="http://schemas.openxmlformats.org/drawingml/2006/chart" xmlns:a="http://schemas.openxmlformats.org/drawingml/2006/main" xmlns:dgm="http://schemas.openxmlformats.org/drawingml/2006/diagram" xmlns:dsp="http://schemas.microsoft.com/office/drawing/2008/diagram" xmlns:p="http://schemas.openxmlformats.org/presentationml/2006/main">
   <p:cSld>
     <p:spTree>
@@ -5484,7 +6074,7 @@
 </p:sld>
 </file>
 
-<file path=ppt/slides/slide15.xml><?xml version="1.0" encoding="utf-8"?>
+<file path=ppt/slides/slide16.xml><?xml version="1.0" encoding="utf-8"?>
 <p:sld xmlns:r="http://schemas.openxmlformats.org/officeDocument/2006/relationships" xmlns:c="http://schemas.openxmlformats.org/drawingml/2006/chart" xmlns:a="http://schemas.openxmlformats.org/drawingml/2006/main" xmlns:dgm="http://schemas.openxmlformats.org/drawingml/2006/diagram" xmlns:dsp="http://schemas.microsoft.com/office/drawing/2008/diagram" xmlns:p="http://schemas.openxmlformats.org/presentationml/2006/main">
   <p:cSld>
     <p:spTree>

</xml_diff>

<commit_message>
Jul 6, 2024. Added distance estimation depends on sensor data
Signed-off-by: Nodang <noj7413@naver.com>
</commit_message>
<xml_diff>
--- a/hara_instruction.pptx
+++ b/hara_instruction.pptx
@@ -18,9 +18,9 @@
     <p:sldId id="267" r:id="rId12"/>
     <p:sldId id="268" r:id="rId13"/>
     <p:sldId id="272" r:id="rId14"/>
-    <p:sldId id="271" r:id="rId15"/>
-    <p:sldId id="269" r:id="rId16"/>
-    <p:sldId id="270" r:id="rId17"/>
+    <p:sldId id="269" r:id="rId15"/>
+    <p:sldId id="271" r:id="rId16"/>
+    <p:sldId id="273" r:id="rId17"/>
   </p:sldIdLst>
   <p:sldSz cx="12192000" cy="6858000"/>
   <p:notesSz cx="6858000" cy="9144000"/>
@@ -145,9 +145,9 @@
         <p14:section id="{ADB6ED96-5ADD-4541-A131-ACD28EC879F8}" name="SW">
           <p14:sldIdLst>
             <p14:sldId id="272"/>
+            <p14:sldId id="269"/>
             <p14:sldId id="271"/>
-            <p14:sldId id="269"/>
-            <p14:sldId id="270"/>
+            <p14:sldId id="273"/>
           </p14:sldIdLst>
         </p14:section>
       </p14:sectionLst>
@@ -5551,7 +5551,23 @@
             </a:pPr>
             <a:r>
               <a:rPr lang="ko-KR" altLang="en-US"/>
-              <a:t>동작 알고리즘</a:t>
+              <a:t>센서부 </a:t>
+            </a:r>
+            <a:r>
+              <a:rPr lang="en-US" altLang="ko-KR"/>
+              <a:t>– </a:t>
+            </a:r>
+            <a:r>
+              <a:rPr lang="ko-KR" altLang="en-US"/>
+              <a:t>센서 세팅</a:t>
+            </a:r>
+            <a:r>
+              <a:rPr lang="en-US" altLang="ko-KR"/>
+              <a:t> </a:t>
+            </a:r>
+            <a:r>
+              <a:rPr lang="ko-KR" altLang="en-US"/>
+              <a:t>시나리오</a:t>
             </a:r>
             <a:endParaRPr lang="ko-KR" altLang="en-US"/>
           </a:p>
@@ -5567,136 +5583,270 @@
             <p:ph idx="1"/>
           </p:nvPr>
         </p:nvSpPr>
-        <p:spPr/>
-        <p:txBody>
-          <a:bodyPr/>
+        <p:spPr>
+          <a:xfrm>
+            <a:off x="838200" y="1825625"/>
+            <a:ext cx="6837671" cy="4255998"/>
+          </a:xfrm>
+        </p:spPr>
+        <p:txBody>
+          <a:bodyPr>
+            <a:normAutofit/>
+          </a:bodyPr>
           <a:lstStyle/>
           <a:p>
-            <a:pPr marL="518000" lvl="0" indent="-518000">
-              <a:buAutoNum type="arabicPeriod"/>
+            <a:pPr lvl="0">
+              <a:lnSpc>
+                <a:spcPct val="120000"/>
+              </a:lnSpc>
               <a:defRPr/>
             </a:pPr>
             <a:r>
-              <a:rPr lang="ko-KR" altLang="en-US"/>
-              <a:t>동작 명령과 해당 동작 명령으로 도달할 로봇 포지션 추정 </a:t>
-            </a:r>
-            <a:r>
-              <a:rPr lang="en-US" altLang="ko-KR"/>
-              <a:t>-</a:t>
-            </a:r>
-            <a:r>
-              <a:rPr lang="ko-KR" altLang="en-US"/>
+              <a:rPr lang="en-US" altLang="ko-KR" sz="1000"/>
+              <a:t>side -&gt; 45</a:t>
+            </a:r>
+            <a:r>
+              <a:rPr lang="ko-KR" altLang="en-US" sz="1000"/>
               <a:t> </a:t>
             </a:r>
             <a:r>
-              <a:rPr lang="en-US" altLang="ko-KR"/>
-              <a:t>P_ebi (Estimated by Input)</a:t>
-            </a:r>
-            <a:endParaRPr lang="en-US" altLang="ko-KR"/>
-          </a:p>
-          <a:p>
-            <a:pPr marL="518000" lvl="0" indent="-518000">
-              <a:buAutoNum type="arabicPeriod"/>
+              <a:rPr lang="en-US" altLang="ko-KR" sz="1000"/>
+              <a:t>&amp;</a:t>
+            </a:r>
+            <a:r>
+              <a:rPr lang="ko-KR" altLang="en-US" sz="1000"/>
+              <a:t> </a:t>
+            </a:r>
+            <a:r>
+              <a:rPr lang="en-US" altLang="ko-KR" sz="1000"/>
+              <a:t>front</a:t>
+            </a:r>
+            <a:endParaRPr lang="en-US" altLang="ko-KR" sz="1000"/>
+          </a:p>
+          <a:p>
+            <a:pPr lvl="0">
+              <a:lnSpc>
+                <a:spcPct val="120000"/>
+              </a:lnSpc>
               <a:defRPr/>
             </a:pPr>
             <a:r>
-              <a:rPr lang="ko-KR" altLang="en-US"/>
-              <a:t>센싱</a:t>
-            </a:r>
-            <a:endParaRPr lang="ko-KR" altLang="en-US"/>
-          </a:p>
-          <a:p>
-            <a:pPr marL="518000" lvl="0" indent="-518000">
-              <a:buAutoNum type="arabicPeriod"/>
+              <a:rPr lang="ko-KR" altLang="en-US" sz="1000"/>
+              <a:t>전제 조건</a:t>
+            </a:r>
+            <a:br>
+              <a:rPr lang="ko-KR" altLang="en-US" sz="1000"/>
+            </a:br>
+            <a:r>
+              <a:rPr lang="ko-KR" altLang="en-US" sz="1000"/>
+              <a:t>한 벽을 제외한 세 벽이 막힌 곳</a:t>
+            </a:r>
+            <a:br>
+              <a:rPr lang="ko-KR" altLang="en-US" sz="1000"/>
+            </a:br>
+            <a:endParaRPr lang="ko-KR" altLang="en-US" sz="1000"/>
+          </a:p>
+          <a:p>
+            <a:pPr lvl="0">
+              <a:lnSpc>
+                <a:spcPct val="120000"/>
+              </a:lnSpc>
               <a:defRPr/>
             </a:pPr>
             <a:r>
-              <a:rPr lang="ko-KR" altLang="en-US"/>
-              <a:t>센싱 데이터 기반으로 로봇 포지션 추정</a:t>
-            </a:r>
-            <a:r>
-              <a:rPr lang="en-US" altLang="ko-KR"/>
-              <a:t> - P_sd (Sensor Date)</a:t>
-            </a:r>
-            <a:endParaRPr lang="en-US" altLang="ko-KR"/>
-          </a:p>
-          <a:p>
-            <a:pPr marL="518000" lvl="0" indent="-518000">
-              <a:buAutoNum type="arabicPeriod"/>
+              <a:rPr lang="en-US" altLang="ko-KR" sz="1000"/>
+              <a:t>side - </a:t>
+            </a:r>
+            <a:r>
+              <a:rPr lang="ko-KR" altLang="en-US" sz="1000"/>
+              <a:t>수동</a:t>
+            </a:r>
+            <a:br>
+              <a:rPr lang="ko-KR" altLang="en-US" sz="1000"/>
+            </a:br>
+            <a:r>
+              <a:rPr lang="ko-KR" altLang="en-US" sz="1000"/>
+              <a:t>오른쪽부터 중간 왼쪽 벽 순으로 로봇을 이동시키면서 센서 데이터 수집</a:t>
+            </a:r>
+            <a:br>
+              <a:rPr lang="ko-KR" altLang="en-US" sz="1000"/>
+            </a:br>
+            <a:r>
+              <a:rPr lang="ko-KR" altLang="en-US" sz="1000"/>
+              <a:t>각 시퀀스는 스위치를 올리면 시작 내리면 종료</a:t>
+            </a:r>
+            <a:br>
+              <a:rPr lang="en-US" altLang="ko-KR" sz="1000"/>
+            </a:br>
+            <a:endParaRPr lang="en-US" altLang="ko-KR" sz="1000"/>
+          </a:p>
+          <a:p>
+            <a:pPr lvl="0">
+              <a:lnSpc>
+                <a:spcPct val="120000"/>
+              </a:lnSpc>
               <a:defRPr/>
             </a:pPr>
             <a:r>
-              <a:rPr lang="en-US" altLang="ko-KR"/>
-              <a:t>P_ebi</a:t>
-            </a:r>
-            <a:r>
-              <a:rPr lang="ko-KR" altLang="en-US"/>
-              <a:t>과 </a:t>
-            </a:r>
-            <a:r>
-              <a:rPr lang="en-US" altLang="ko-KR"/>
-              <a:t>P_sd</a:t>
-            </a:r>
-            <a:r>
-              <a:rPr lang="ko-KR" altLang="en-US"/>
-              <a:t> 사이 오차 제어</a:t>
-            </a:r>
-            <a:endParaRPr lang="ko-KR" altLang="en-US"/>
-          </a:p>
-          <a:p>
-            <a:pPr marL="518000" lvl="0" indent="-518000">
-              <a:buAutoNum type="arabicPeriod"/>
-              <a:defRPr/>
-            </a:pPr>
-            <a:r>
-              <a:rPr lang="ko-KR" altLang="en-US"/>
-              <a:t>제어 값 기반 게인</a:t>
-            </a:r>
-            <a:r>
-              <a:rPr lang="en-US" altLang="ko-KR"/>
-              <a:t>,</a:t>
-            </a:r>
-            <a:r>
-              <a:rPr lang="ko-KR" altLang="en-US"/>
-              <a:t> 모터 제어에 반영</a:t>
-            </a:r>
-            <a:endParaRPr lang="ko-KR" altLang="en-US"/>
-          </a:p>
-          <a:p>
-            <a:pPr marL="518000" lvl="0" indent="-518000">
-              <a:buAutoNum type="arabicPeriod"/>
-              <a:defRPr/>
-            </a:pPr>
-            <a:r>
-              <a:rPr lang="ko-KR" altLang="en-US"/>
-              <a:t>동작 명령이 종료될 때까지 </a:t>
-            </a:r>
-            <a:r>
-              <a:rPr lang="en-US" altLang="ko-KR"/>
-              <a:t>1~5</a:t>
-            </a:r>
-            <a:r>
-              <a:rPr lang="ko-KR" altLang="en-US"/>
-              <a:t> 반복</a:t>
-            </a:r>
-            <a:endParaRPr lang="ko-KR" altLang="en-US"/>
-          </a:p>
-          <a:p>
-            <a:pPr marL="518000" lvl="0" indent="-518000">
-              <a:buAutoNum type="arabicPeriod"/>
-              <a:defRPr/>
-            </a:pPr>
-            <a:endParaRPr lang="ko-KR" altLang="en-US"/>
-          </a:p>
-          <a:p>
-            <a:pPr marL="518000" lvl="0" indent="-518000">
-              <a:buAutoNum type="arabicPeriod"/>
-              <a:defRPr/>
-            </a:pPr>
-            <a:endParaRPr lang="ko-KR" altLang="en-US"/>
-          </a:p>
-        </p:txBody>
-      </p:sp>
+              <a:rPr lang="en-US" altLang="ko-KR" sz="1000"/>
+              <a:t>45 &amp; front - auto</a:t>
+            </a:r>
+            <a:br>
+              <a:rPr lang="en-US" altLang="ko-KR" sz="1000"/>
+            </a:br>
+            <a:r>
+              <a:rPr lang="ko-KR" altLang="en-US" sz="1000"/>
+              <a:t>로봇 앞을 딱 붙여놓고 스위치를 내리면 시작</a:t>
+            </a:r>
+            <a:br>
+              <a:rPr lang="ko-KR" altLang="en-US" sz="1000"/>
+            </a:br>
+            <a:r>
+              <a:rPr lang="ko-KR" altLang="en-US" sz="1000"/>
+              <a:t>뒷쪽으로 </a:t>
+            </a:r>
+            <a:r>
+              <a:rPr lang="en-US" altLang="ko-KR" sz="1000"/>
+              <a:t>168/2-108/2 +180</a:t>
+            </a:r>
+            <a:r>
+              <a:rPr lang="ko-KR" altLang="en-US" sz="1000"/>
+              <a:t> </a:t>
+            </a:r>
+            <a:r>
+              <a:rPr lang="en-US" altLang="ko-KR" sz="1000"/>
+              <a:t>=</a:t>
+            </a:r>
+            <a:r>
+              <a:rPr lang="ko-KR" altLang="en-US" sz="1000"/>
+              <a:t> </a:t>
+            </a:r>
+            <a:r>
+              <a:rPr lang="en-US" altLang="ko-KR" sz="1000"/>
+              <a:t>210mm</a:t>
+            </a:r>
+            <a:r>
+              <a:rPr lang="ko-KR" altLang="en-US" sz="1000"/>
+              <a:t> 이동하면서 센서 데이터 수집</a:t>
+            </a:r>
+            <a:endParaRPr lang="ko-KR" altLang="en-US" sz="1000"/>
+          </a:p>
+        </p:txBody>
+      </p:sp>
+      <p:pic>
+        <p:nvPicPr>
+          <p:cNvPr id="4" name="그림 3"/>
+          <p:cNvPicPr>
+            <a:picLocks noChangeAspect="1"/>
+          </p:cNvPicPr>
+          <p:nvPr/>
+        </p:nvPicPr>
+        <p:blipFill rotWithShape="1">
+          <a:blip r:embed="rId2"/>
+          <a:stretch>
+            <a:fillRect/>
+          </a:stretch>
+        </p:blipFill>
+        <p:spPr>
+          <a:xfrm>
+            <a:off x="8516675" y="888667"/>
+            <a:ext cx="3675325" cy="4487997"/>
+          </a:xfrm>
+          <a:prstGeom prst="rect">
+            <a:avLst/>
+          </a:prstGeom>
+        </p:spPr>
+      </p:pic>
+      <p:graphicFrame>
+        <p:nvGraphicFramePr>
+          <p:cNvPr id="7" name="개체 6"/>
+          <p:cNvGraphicFramePr/>
+          <p:nvPr/>
+        </p:nvGraphicFramePr>
+        <p:xfrm>
+          <a:off x="10941050" y="276453"/>
+          <a:ext cx="914400" cy="771525"/>
+        </p:xfrm>
+        <a:graphic>
+          <a:graphicData uri="http://schemas.openxmlformats.org/presentationml/2006/ole">
+            <p:oleObj spid="_x0000_s4101" showAsIcon="1" r:id="rId4" imgW="923925" imgH="781050" progId="">
+              <p:embed/>
+            </p:oleObj>
+          </a:graphicData>
+        </a:graphic>
+      </p:graphicFrame>
+      <p:pic>
+        <p:nvPicPr>
+          <p:cNvPr id="8" name="그림 7"/>
+          <p:cNvPicPr>
+            <a:picLocks noChangeAspect="1"/>
+          </p:cNvPicPr>
+          <p:nvPr/>
+        </p:nvPicPr>
+        <p:blipFill rotWithShape="1">
+          <a:blip r:embed="rId5"/>
+          <a:stretch>
+            <a:fillRect/>
+          </a:stretch>
+        </p:blipFill>
+        <p:spPr>
+          <a:xfrm>
+            <a:off x="-116343" y="4822252"/>
+            <a:ext cx="7059010" cy="600158"/>
+          </a:xfrm>
+          <a:prstGeom prst="rect">
+            <a:avLst/>
+          </a:prstGeom>
+        </p:spPr>
+      </p:pic>
+      <p:pic>
+        <p:nvPicPr>
+          <p:cNvPr id="9" name="그림 8"/>
+          <p:cNvPicPr>
+            <a:picLocks noChangeAspect="1"/>
+          </p:cNvPicPr>
+          <p:nvPr/>
+        </p:nvPicPr>
+        <p:blipFill rotWithShape="1">
+          <a:blip r:embed="rId6"/>
+          <a:stretch>
+            <a:fillRect/>
+          </a:stretch>
+        </p:blipFill>
+        <p:spPr>
+          <a:xfrm>
+            <a:off x="222249" y="5440812"/>
+            <a:ext cx="8754697" cy="581106"/>
+          </a:xfrm>
+          <a:prstGeom prst="rect">
+            <a:avLst/>
+          </a:prstGeom>
+        </p:spPr>
+      </p:pic>
+      <p:pic>
+        <p:nvPicPr>
+          <p:cNvPr id="10" name="그림 9"/>
+          <p:cNvPicPr>
+            <a:picLocks noChangeAspect="1"/>
+          </p:cNvPicPr>
+          <p:nvPr/>
+        </p:nvPicPr>
+        <p:blipFill rotWithShape="1">
+          <a:blip r:embed="rId7"/>
+          <a:stretch>
+            <a:fillRect/>
+          </a:stretch>
+        </p:blipFill>
+        <p:spPr>
+          <a:xfrm>
+            <a:off x="179916" y="6017635"/>
+            <a:ext cx="7354326" cy="685895"/>
+          </a:xfrm>
+          <a:prstGeom prst="rect">
+            <a:avLst/>
+          </a:prstGeom>
+        </p:spPr>
+      </p:pic>
     </p:spTree>
   </p:cSld>
   <p:clrMapOvr>
@@ -5750,23 +5900,7 @@
             </a:pPr>
             <a:r>
               <a:rPr lang="ko-KR" altLang="en-US"/>
-              <a:t>센서부 </a:t>
-            </a:r>
-            <a:r>
-              <a:rPr lang="en-US" altLang="ko-KR"/>
-              <a:t>– </a:t>
-            </a:r>
-            <a:r>
-              <a:rPr lang="ko-KR" altLang="en-US"/>
-              <a:t>센서 세팅</a:t>
-            </a:r>
-            <a:r>
-              <a:rPr lang="en-US" altLang="ko-KR"/>
-              <a:t> </a:t>
-            </a:r>
-            <a:r>
-              <a:rPr lang="ko-KR" altLang="en-US"/>
-              <a:t>시나리오</a:t>
+              <a:t>동작 알고리즘</a:t>
             </a:r>
             <a:endParaRPr lang="ko-KR" altLang="en-US"/>
           </a:p>
@@ -5782,282 +5916,136 @@
             <p:ph idx="1"/>
           </p:nvPr>
         </p:nvSpPr>
-        <p:spPr>
-          <a:xfrm>
-            <a:off x="838200" y="1825625"/>
-            <a:ext cx="5493589" cy="4255998"/>
-          </a:xfrm>
-        </p:spPr>
-        <p:txBody>
-          <a:bodyPr>
-            <a:normAutofit fontScale="40000" lnSpcReduction="20000"/>
-          </a:bodyPr>
+        <p:spPr/>
+        <p:txBody>
+          <a:bodyPr/>
           <a:lstStyle/>
           <a:p>
-            <a:pPr lvl="0">
-              <a:lnSpc>
-                <a:spcPct val="120000"/>
-              </a:lnSpc>
+            <a:pPr marL="518000" lvl="0" indent="-518000">
+              <a:buAutoNum type="arabicPeriod"/>
               <a:defRPr/>
             </a:pPr>
             <a:r>
+              <a:rPr lang="ko-KR" altLang="en-US"/>
+              <a:t>동작 명령과 해당 동작 명령으로 도달할 로봇 포지션 추정 </a:t>
+            </a:r>
+            <a:r>
               <a:rPr lang="en-US" altLang="ko-KR"/>
-              <a:t>side -&gt; front -&gt; 45 -&gt; side</a:t>
+              <a:t>-</a:t>
+            </a:r>
+            <a:r>
+              <a:rPr lang="ko-KR" altLang="en-US"/>
+              <a:t> </a:t>
+            </a:r>
+            <a:r>
+              <a:rPr lang="en-US" altLang="ko-KR"/>
+              <a:t>P_ebi (Estimated by Input)</a:t>
             </a:r>
             <a:endParaRPr lang="en-US" altLang="ko-KR"/>
           </a:p>
           <a:p>
-            <a:pPr lvl="0">
-              <a:lnSpc>
-                <a:spcPct val="120000"/>
-              </a:lnSpc>
+            <a:pPr marL="518000" lvl="0" indent="-518000">
+              <a:buAutoNum type="arabicPeriod"/>
               <a:defRPr/>
             </a:pPr>
             <a:r>
               <a:rPr lang="ko-KR" altLang="en-US"/>
-              <a:t>전제 조건</a:t>
-            </a:r>
-            <a:br>
-              <a:rPr lang="ko-KR" altLang="en-US"/>
-            </a:br>
-            <a:r>
-              <a:rPr lang="ko-KR" altLang="en-US"/>
-              <a:t>한 벽을 제외한 세 벽이 막힌 곳에서 센서 세팅</a:t>
-            </a:r>
-            <a:br>
-              <a:rPr lang="ko-KR" altLang="en-US"/>
-            </a:br>
+              <a:t>센싱</a:t>
+            </a:r>
             <a:endParaRPr lang="ko-KR" altLang="en-US"/>
           </a:p>
           <a:p>
-            <a:pPr lvl="0">
-              <a:lnSpc>
-                <a:spcPct val="120000"/>
-              </a:lnSpc>
+            <a:pPr marL="518000" lvl="0" indent="-518000">
+              <a:buAutoNum type="arabicPeriod"/>
               <a:defRPr/>
             </a:pPr>
             <a:r>
+              <a:rPr lang="ko-KR" altLang="en-US"/>
+              <a:t>센싱 데이터 기반으로 로봇 포지션 추정</a:t>
+            </a:r>
+            <a:r>
               <a:rPr lang="en-US" altLang="ko-KR"/>
-              <a:t>side1:</a:t>
-            </a:r>
-            <a:r>
-              <a:rPr lang="ko-KR" altLang="en-US"/>
-              <a:t> </a:t>
-            </a:r>
-            <a:r>
-              <a:rPr lang="en-US" altLang="ko-KR"/>
-              <a:t>fixed value setup - auto</a:t>
-            </a:r>
-            <a:br>
-              <a:rPr lang="en-US" altLang="ko-KR"/>
-            </a:br>
-            <a:r>
-              <a:rPr lang="ko-KR" altLang="en-US"/>
-              <a:t>현재 위치에서 </a:t>
-            </a:r>
-            <a:r>
-              <a:rPr lang="en-US" altLang="ko-KR"/>
-              <a:t>side</a:t>
-            </a:r>
-            <a:r>
-              <a:rPr lang="ko-KR" altLang="en-US"/>
-              <a:t> 센서 데이터 수집</a:t>
-            </a:r>
-            <a:br>
-              <a:rPr lang="ko-KR" altLang="en-US"/>
-            </a:br>
-            <a:r>
-              <a:rPr lang="ko-KR" altLang="en-US"/>
-              <a:t>이를 이용하여 전방 센서 데이터 수집할 때 몸체가 틀어지지 않게 보정</a:t>
-            </a:r>
-            <a:endParaRPr lang="ko-KR" altLang="en-US"/>
-          </a:p>
-          <a:p>
-            <a:pPr lvl="0">
-              <a:lnSpc>
-                <a:spcPct val="120000"/>
-              </a:lnSpc>
+              <a:t> - P_sd (Sensor Date)</a:t>
+            </a:r>
+            <a:endParaRPr lang="en-US" altLang="ko-KR"/>
+          </a:p>
+          <a:p>
+            <a:pPr marL="518000" lvl="0" indent="-518000">
+              <a:buAutoNum type="arabicPeriod"/>
               <a:defRPr/>
             </a:pPr>
             <a:r>
               <a:rPr lang="en-US" altLang="ko-KR"/>
-              <a:t>front: lookup table setup - auto</a:t>
-            </a:r>
-            <a:br>
+              <a:t>P_ebi</a:t>
+            </a:r>
+            <a:r>
+              <a:rPr lang="ko-KR" altLang="en-US"/>
+              <a:t>과 </a:t>
+            </a:r>
+            <a:r>
               <a:rPr lang="en-US" altLang="ko-KR"/>
-            </a:br>
+              <a:t>P_sd</a:t>
+            </a:r>
             <a:r>
               <a:rPr lang="ko-KR" altLang="en-US"/>
-              <a:t>전방을 벽에 붙여놓고 후방으로 이동하면서 </a:t>
-            </a:r>
-            <a:r>
-              <a:rPr lang="en-US" altLang="ko-KR"/>
-              <a:t>table setup</a:t>
-            </a:r>
-            <a:br>
-              <a:rPr lang="en-US" altLang="ko-KR"/>
-            </a:br>
-            <a:r>
-              <a:rPr lang="ko-KR" altLang="en-US"/>
-              <a:t>후방으로 </a:t>
-            </a:r>
-            <a:r>
-              <a:rPr lang="en-US" altLang="ko-KR"/>
-              <a:t>180mm</a:t>
-            </a:r>
-            <a:r>
-              <a:rPr lang="ko-KR" altLang="en-US"/>
-              <a:t> 이동</a:t>
-            </a:r>
-            <a:br>
-              <a:rPr lang="en-US" altLang="ko-KR"/>
-            </a:br>
-            <a:r>
-              <a:rPr lang="ko-KR" altLang="en-US"/>
-              <a:t>최종적으로 전방 센서 위치가 기존 칸 밖에 나가 있어야 함</a:t>
+              <a:t> 사이 오차 제어</a:t>
             </a:r>
             <a:endParaRPr lang="ko-KR" altLang="en-US"/>
           </a:p>
           <a:p>
-            <a:pPr lvl="0">
-              <a:lnSpc>
-                <a:spcPct val="120000"/>
-              </a:lnSpc>
+            <a:pPr marL="518000" lvl="0" indent="-518000">
+              <a:buAutoNum type="arabicPeriod"/>
               <a:defRPr/>
             </a:pPr>
             <a:r>
+              <a:rPr lang="ko-KR" altLang="en-US"/>
+              <a:t>제어 값 기반 게인</a:t>
+            </a:r>
+            <a:r>
               <a:rPr lang="en-US" altLang="ko-KR"/>
-              <a:t>45: lookup table setup - auto</a:t>
-            </a:r>
-            <a:br>
+              <a:t>,</a:t>
+            </a:r>
+            <a:r>
               <a:rPr lang="ko-KR" altLang="en-US"/>
-            </a:br>
-            <a:r>
-              <a:rPr lang="ko-KR" altLang="en-US"/>
-              <a:t>전방 센서 세팅으로 </a:t>
-            </a:r>
-            <a:r>
-              <a:rPr lang="en-US" altLang="ko-KR"/>
-              <a:t>180mm</a:t>
-            </a:r>
-            <a:r>
-              <a:rPr lang="ko-KR" altLang="en-US"/>
-              <a:t> 빠져있는 상태에서 전방으로 이동하면서 </a:t>
-            </a:r>
-            <a:r>
-              <a:rPr lang="en-US" altLang="ko-KR"/>
-              <a:t>table setup</a:t>
-            </a:r>
-            <a:br>
-              <a:rPr lang="ko-KR" altLang="en-US"/>
-            </a:br>
-            <a:r>
-              <a:rPr lang="ko-KR" altLang="en-US"/>
-              <a:t>전방으로 </a:t>
-            </a:r>
-            <a:r>
-              <a:rPr lang="en-US" altLang="ko-KR"/>
-              <a:t>90mm</a:t>
-            </a:r>
-            <a:r>
-              <a:rPr lang="ko-KR" altLang="en-US"/>
-              <a:t> 이동하면서 </a:t>
-            </a:r>
-            <a:r>
-              <a:rPr lang="en-US" altLang="ko-KR"/>
-              <a:t>side </a:t>
-            </a:r>
-            <a:r>
-              <a:rPr lang="ko-KR" altLang="en-US"/>
-              <a:t>센서 보정 데이터 수집</a:t>
-            </a:r>
-            <a:br>
-              <a:rPr lang="ko-KR" altLang="en-US"/>
-            </a:br>
-            <a:r>
-              <a:rPr lang="ko-KR" altLang="en-US"/>
-              <a:t>또 </a:t>
-            </a:r>
-            <a:r>
-              <a:rPr lang="en-US" altLang="ko-KR"/>
-              <a:t>90mm</a:t>
-            </a:r>
-            <a:r>
-              <a:rPr lang="ko-KR" altLang="en-US"/>
-              <a:t> 이동하면서 </a:t>
-            </a:r>
-            <a:r>
-              <a:rPr lang="en-US" altLang="ko-KR"/>
-              <a:t>45 </a:t>
-            </a:r>
-            <a:r>
-              <a:rPr lang="ko-KR" altLang="en-US"/>
-              <a:t>센서 </a:t>
-            </a:r>
-            <a:r>
-              <a:rPr lang="en-US" altLang="ko-KR"/>
-              <a:t>table setup</a:t>
-            </a:r>
-            <a:endParaRPr lang="en-US" altLang="ko-KR"/>
-          </a:p>
-          <a:p>
-            <a:pPr lvl="0">
-              <a:lnSpc>
-                <a:spcPct val="120000"/>
-              </a:lnSpc>
+              <a:t> 모터 제어에 반영</a:t>
+            </a:r>
+            <a:endParaRPr lang="ko-KR" altLang="en-US"/>
+          </a:p>
+          <a:p>
+            <a:pPr marL="518000" lvl="0" indent="-518000">
+              <a:buAutoNum type="arabicPeriod"/>
               <a:defRPr/>
             </a:pPr>
             <a:r>
+              <a:rPr lang="ko-KR" altLang="en-US"/>
+              <a:t>동작 명령이 종료될 때까지 </a:t>
+            </a:r>
+            <a:r>
               <a:rPr lang="en-US" altLang="ko-KR"/>
-              <a:t>side2: calibaration - calc</a:t>
-            </a:r>
-            <a:br>
+              <a:t>1~5</a:t>
+            </a:r>
+            <a:r>
               <a:rPr lang="ko-KR" altLang="en-US"/>
-            </a:br>
-            <a:r>
-              <a:rPr lang="en-US" altLang="ko-KR"/>
-              <a:t>45 </a:t>
-            </a:r>
-            <a:r>
-              <a:rPr lang="ko-KR" altLang="en-US"/>
-              <a:t>센서에서 얻은 보정 데이터와 </a:t>
-            </a:r>
-            <a:r>
-              <a:rPr lang="en-US" altLang="ko-KR"/>
-              <a:t>side1</a:t>
-            </a:r>
-            <a:r>
-              <a:rPr lang="ko-KR" altLang="en-US"/>
-              <a:t> 데이터를 토대로 보정 데이터 생성</a:t>
+              <a:t> 반복</a:t>
             </a:r>
             <a:endParaRPr lang="ko-KR" altLang="en-US"/>
           </a:p>
-        </p:txBody>
-      </p:sp>
-      <p:pic>
-        <p:nvPicPr>
-          <p:cNvPr id="4" name="그림 3"/>
-          <p:cNvPicPr>
-            <a:picLocks noChangeAspect="1"/>
-          </p:cNvPicPr>
-          <p:nvPr/>
-        </p:nvPicPr>
-        <p:blipFill rotWithShape="1">
-          <a:blip r:embed="rId2"/>
-          <a:stretch>
-            <a:fillRect/>
-          </a:stretch>
-        </p:blipFill>
-        <p:spPr>
-          <a:xfrm>
-            <a:off x="7415281" y="1724751"/>
-            <a:ext cx="3675325" cy="4487997"/>
-          </a:xfrm>
-          <a:prstGeom prst="rect">
-            <a:avLst/>
-          </a:prstGeom>
-        </p:spPr>
-      </p:pic>
+          <a:p>
+            <a:pPr marL="518000" lvl="0" indent="-518000">
+              <a:buAutoNum type="arabicPeriod"/>
+              <a:defRPr/>
+            </a:pPr>
+            <a:endParaRPr lang="ko-KR" altLang="en-US"/>
+          </a:p>
+          <a:p>
+            <a:pPr marL="518000" lvl="0" indent="-518000">
+              <a:buAutoNum type="arabicPeriod"/>
+              <a:defRPr/>
+            </a:pPr>
+            <a:endParaRPr lang="ko-KR" altLang="en-US"/>
+          </a:p>
+        </p:txBody>
+      </p:sp>
     </p:spTree>
   </p:cSld>
   <p:clrMapOvr>
@@ -6111,15 +6099,7 @@
             </a:pPr>
             <a:r>
               <a:rPr lang="ko-KR" altLang="en-US"/>
-              <a:t>센서부 </a:t>
-            </a:r>
-            <a:r>
-              <a:rPr lang="en-US" altLang="ko-KR"/>
-              <a:t>– </a:t>
-            </a:r>
-            <a:r>
-              <a:rPr lang="ko-KR" altLang="en-US"/>
-              <a:t>센서 보정 알고리즘</a:t>
+              <a:t/>
             </a:r>
             <a:endParaRPr lang="ko-KR" altLang="en-US"/>
           </a:p>
@@ -6135,22 +6115,12 @@
             <p:ph idx="1"/>
           </p:nvPr>
         </p:nvSpPr>
-        <p:spPr>
-          <a:xfrm>
-            <a:off x="838200" y="1825625"/>
-            <a:ext cx="5493589" cy="4255998"/>
-          </a:xfrm>
-        </p:spPr>
-        <p:txBody>
-          <a:bodyPr>
-            <a:normAutofit lnSpcReduction="10000"/>
-          </a:bodyPr>
+        <p:spPr/>
+        <p:txBody>
+          <a:bodyPr/>
           <a:lstStyle/>
           <a:p>
             <a:pPr lvl="0">
-              <a:lnSpc>
-                <a:spcPct val="120000"/>
-              </a:lnSpc>
               <a:defRPr/>
             </a:pPr>
             <a:r>

</xml_diff>

<commit_message>
Nov 15, 2024. Specified Description of Race source files.
Signed-off-by: Nodang <noj7413@naver.com>
</commit_message>
<xml_diff>
--- a/hara_instruction.pptx
+++ b/hara_instruction.pptx
@@ -5927,21 +5927,9 @@
             </a:pPr>
             <a:r>
               <a:rPr lang="ko-KR" altLang="en-US"/>
-              <a:t>동작 명령과 해당 동작 명령으로 도달할 로봇 포지션 추정 </a:t>
-            </a:r>
-            <a:r>
-              <a:rPr lang="en-US" altLang="ko-KR"/>
-              <a:t>-</a:t>
-            </a:r>
-            <a:r>
-              <a:rPr lang="ko-KR" altLang="en-US"/>
-              <a:t> </a:t>
-            </a:r>
-            <a:r>
-              <a:rPr lang="en-US" altLang="ko-KR"/>
-              <a:t>P_ebi (Estimated by Input)</a:t>
-            </a:r>
-            <a:endParaRPr lang="en-US" altLang="ko-KR"/>
+              <a:t>센싱</a:t>
+            </a:r>
+            <a:endParaRPr lang="ko-KR" altLang="en-US"/>
           </a:p>
           <a:p>
             <a:pPr marL="518000" lvl="0" indent="-518000">
@@ -5950,7 +5938,116 @@
             </a:pPr>
             <a:r>
               <a:rPr lang="ko-KR" altLang="en-US"/>
-              <a:t>센싱</a:t>
+              <a:t>로봇 포지션 추정 </a:t>
+            </a:r>
+            <a:r>
+              <a:rPr lang="en-US" altLang="ko-KR"/>
+              <a:t>(</a:t>
+            </a:r>
+            <a:r>
+              <a:rPr lang="ko-KR" altLang="en-US"/>
+              <a:t>입력</a:t>
+            </a:r>
+            <a:r>
+              <a:rPr lang="en-US" altLang="ko-KR"/>
+              <a:t>:</a:t>
+            </a:r>
+            <a:r>
+              <a:rPr lang="ko-KR" altLang="en-US"/>
+              <a:t> </a:t>
+            </a:r>
+            <a:r>
+              <a:rPr lang="en-US" altLang="ko-KR"/>
+              <a:t>v, w, </a:t>
+            </a:r>
+            <a:r>
+              <a:rPr lang="ko-KR" altLang="en-US"/>
+              <a:t>센서 데이터</a:t>
+            </a:r>
+            <a:r>
+              <a:rPr lang="en-US" altLang="ko-KR"/>
+              <a:t>)</a:t>
+            </a:r>
+            <a:r>
+              <a:rPr lang="ko-KR" altLang="en-US"/>
+              <a:t> </a:t>
+            </a:r>
+            <a:r>
+              <a:rPr lang="en-US" altLang="ko-KR"/>
+              <a:t>(</a:t>
+            </a:r>
+            <a:r>
+              <a:rPr lang="ko-KR" altLang="en-US"/>
+              <a:t>출력</a:t>
+            </a:r>
+            <a:r>
+              <a:rPr lang="en-US" altLang="ko-KR"/>
+              <a:t>:</a:t>
+            </a:r>
+            <a:r>
+              <a:rPr lang="ko-KR" altLang="en-US"/>
+              <a:t> </a:t>
+            </a:r>
+            <a:r>
+              <a:rPr lang="en-US" altLang="ko-KR"/>
+              <a:t>v’, w’)</a:t>
+            </a:r>
+            <a:endParaRPr lang="en-US" altLang="ko-KR"/>
+          </a:p>
+          <a:p>
+            <a:pPr marL="975200" lvl="1" indent="-518000">
+              <a:buAutoNum type="arabicPeriod"/>
+              <a:defRPr/>
+            </a:pPr>
+            <a:r>
+              <a:rPr lang="en-US" altLang="ko-KR"/>
+              <a:t>v, w </a:t>
+            </a:r>
+            <a:r>
+              <a:rPr lang="ko-KR" altLang="en-US"/>
+              <a:t>토대로 위치 예측 </a:t>
+            </a:r>
+            <a:r>
+              <a:rPr lang="en-US" altLang="ko-KR"/>
+              <a:t>_1</a:t>
+            </a:r>
+            <a:endParaRPr lang="en-US" altLang="ko-KR"/>
+          </a:p>
+          <a:p>
+            <a:pPr marL="975200" lvl="1" indent="-518000">
+              <a:buAutoNum type="arabicPeriod"/>
+              <a:defRPr/>
+            </a:pPr>
+            <a:r>
+              <a:rPr lang="ko-KR" altLang="en-US"/>
+              <a:t>센서 데이터로 위치 예측 </a:t>
+            </a:r>
+            <a:r>
+              <a:rPr lang="en-US" altLang="ko-KR"/>
+              <a:t>_2</a:t>
+            </a:r>
+            <a:endParaRPr lang="en-US" altLang="ko-KR"/>
+          </a:p>
+          <a:p>
+            <a:pPr marL="975200" lvl="1" indent="-518000">
+              <a:buAutoNum type="arabicPeriod"/>
+              <a:defRPr/>
+            </a:pPr>
+            <a:r>
+              <a:rPr lang="en-US" altLang="ko-KR"/>
+              <a:t>1</a:t>
+            </a:r>
+            <a:r>
+              <a:rPr lang="ko-KR" altLang="en-US"/>
+              <a:t>과 </a:t>
+            </a:r>
+            <a:r>
+              <a:rPr lang="en-US" altLang="ko-KR"/>
+              <a:t>2</a:t>
+            </a:r>
+            <a:r>
+              <a:rPr lang="ko-KR" altLang="en-US"/>
+              <a:t>를 융합</a:t>
             </a:r>
             <a:endParaRPr lang="ko-KR" altLang="en-US"/>
           </a:p>
@@ -5960,14 +6057,30 @@
               <a:defRPr/>
             </a:pPr>
             <a:r>
-              <a:rPr lang="ko-KR" altLang="en-US"/>
-              <a:t>센싱 데이터 기반으로 로봇 포지션 추정</a:t>
-            </a:r>
-            <a:r>
               <a:rPr lang="en-US" altLang="ko-KR"/>
-              <a:t> - P_sd (Sensor Date)</a:t>
-            </a:r>
-            <a:endParaRPr lang="en-US" altLang="ko-KR"/>
+              <a:t>v’,</a:t>
+            </a:r>
+            <a:r>
+              <a:rPr lang="ko-KR" altLang="en-US"/>
+              <a:t> </a:t>
+            </a:r>
+            <a:r>
+              <a:rPr lang="en-US" altLang="ko-KR"/>
+              <a:t>w’</a:t>
+            </a:r>
+            <a:r>
+              <a:rPr lang="ko-KR" altLang="en-US"/>
+              <a:t> 기반으로 </a:t>
+            </a:r>
+            <a:r>
+              <a:rPr lang="en-US" altLang="ko-KR"/>
+              <a:t>V_left, V_right </a:t>
+            </a:r>
+            <a:r>
+              <a:rPr lang="ko-KR" altLang="en-US"/>
+              <a:t>계산</a:t>
+            </a:r>
+            <a:endParaRPr lang="ko-KR" altLang="en-US"/>
           </a:p>
           <a:p>
             <a:pPr marL="518000" lvl="0" indent="-518000">
@@ -5975,39 +6088,8 @@
               <a:defRPr/>
             </a:pPr>
             <a:r>
-              <a:rPr lang="en-US" altLang="ko-KR"/>
-              <a:t>P_ebi</a:t>
-            </a:r>
-            <a:r>
-              <a:rPr lang="ko-KR" altLang="en-US"/>
-              <a:t>과 </a:t>
-            </a:r>
-            <a:r>
-              <a:rPr lang="en-US" altLang="ko-KR"/>
-              <a:t>P_sd</a:t>
-            </a:r>
-            <a:r>
-              <a:rPr lang="ko-KR" altLang="en-US"/>
-              <a:t> 사이 오차 제어</a:t>
-            </a:r>
-            <a:endParaRPr lang="ko-KR" altLang="en-US"/>
-          </a:p>
-          <a:p>
-            <a:pPr marL="518000" lvl="0" indent="-518000">
-              <a:buAutoNum type="arabicPeriod"/>
-              <a:defRPr/>
-            </a:pPr>
-            <a:r>
-              <a:rPr lang="ko-KR" altLang="en-US"/>
-              <a:t>제어 값 기반 게인</a:t>
-            </a:r>
-            <a:r>
-              <a:rPr lang="en-US" altLang="ko-KR"/>
-              <a:t>,</a:t>
-            </a:r>
-            <a:r>
-              <a:rPr lang="ko-KR" altLang="en-US"/>
-              <a:t> 모터 제어에 반영</a:t>
+              <a:rPr lang="ko-KR" altLang="en-US"/>
+              <a:t>모터 제어</a:t>
             </a:r>
             <a:endParaRPr lang="ko-KR" altLang="en-US"/>
           </a:p>

</xml_diff>

<commit_message>
July 27, 2025. Updated the instuction pptx file for analysis of motor torque.
Signed-off-by: Nodang <noj7413@naver.com>
</commit_message>
<xml_diff>
--- a/hara_instruction.pptx
+++ b/hara_instruction.pptx
@@ -13,14 +13,17 @@
     <p:sldId id="264" r:id="rId7"/>
     <p:sldId id="263" r:id="rId8"/>
     <p:sldId id="265" r:id="rId9"/>
-    <p:sldId id="262" r:id="rId10"/>
-    <p:sldId id="266" r:id="rId11"/>
-    <p:sldId id="267" r:id="rId12"/>
-    <p:sldId id="268" r:id="rId13"/>
-    <p:sldId id="272" r:id="rId14"/>
-    <p:sldId id="269" r:id="rId15"/>
-    <p:sldId id="271" r:id="rId16"/>
-    <p:sldId id="273" r:id="rId17"/>
+    <p:sldId id="277" r:id="rId10"/>
+    <p:sldId id="262" r:id="rId11"/>
+    <p:sldId id="266" r:id="rId12"/>
+    <p:sldId id="267" r:id="rId13"/>
+    <p:sldId id="268" r:id="rId14"/>
+    <p:sldId id="272" r:id="rId15"/>
+    <p:sldId id="269" r:id="rId16"/>
+    <p:sldId id="276" r:id="rId17"/>
+    <p:sldId id="274" r:id="rId18"/>
+    <p:sldId id="275" r:id="rId19"/>
+    <p:sldId id="273" r:id="rId20"/>
   </p:sldIdLst>
   <p:sldSz cx="12192000" cy="6858000"/>
   <p:notesSz cx="6858000" cy="9144000"/>
@@ -136,6 +139,7 @@
             <p14:sldId id="264"/>
             <p14:sldId id="263"/>
             <p14:sldId id="265"/>
+            <p14:sldId id="277"/>
             <p14:sldId id="262"/>
             <p14:sldId id="266"/>
             <p14:sldId id="267"/>
@@ -146,7 +150,9 @@
           <p14:sldIdLst>
             <p14:sldId id="272"/>
             <p14:sldId id="269"/>
-            <p14:sldId id="271"/>
+            <p14:sldId id="276"/>
+            <p14:sldId id="274"/>
+            <p14:sldId id="275"/>
             <p14:sldId id="273"/>
           </p14:sldIdLst>
         </p14:section>
@@ -3477,6 +3483,342 @@
           <p:cNvPr id="2" name="제목 1">
             <a:extLst>
               <a:ext uri="{FF2B5EF4-FFF2-40B4-BE49-F238E27FC236}">
+                <a16:creationId xmlns:a16="http://schemas.microsoft.com/office/drawing/2014/main" id="{5222A7DB-9D64-FFE0-C4E7-DC0AA261BFBB}"/>
+              </a:ext>
+            </a:extLst>
+          </p:cNvPr>
+          <p:cNvSpPr>
+            <a:spLocks noGrp="1"/>
+          </p:cNvSpPr>
+          <p:nvPr>
+            <p:ph type="title"/>
+          </p:nvPr>
+        </p:nvSpPr>
+        <p:spPr/>
+        <p:txBody>
+          <a:bodyPr/>
+          <a:lstStyle/>
+          <a:p>
+            <a:r>
+              <a:rPr lang="ko-KR" altLang="en-US" dirty="0" err="1"/>
+              <a:t>모터부</a:t>
+            </a:r>
+            <a:r>
+              <a:rPr lang="ko-KR" altLang="en-US" dirty="0"/>
+              <a:t> </a:t>
+            </a:r>
+            <a:r>
+              <a:rPr lang="en-US" altLang="ko-KR" dirty="0"/>
+              <a:t>– </a:t>
+            </a:r>
+            <a:r>
+              <a:rPr lang="ko-KR" altLang="en-US" dirty="0"/>
+              <a:t>모터 인터럽트</a:t>
+            </a:r>
+          </a:p>
+        </p:txBody>
+      </p:sp>
+      <p:sp>
+        <p:nvSpPr>
+          <p:cNvPr id="3" name="내용 개체 틀 2">
+            <a:extLst>
+              <a:ext uri="{FF2B5EF4-FFF2-40B4-BE49-F238E27FC236}">
+                <a16:creationId xmlns:a16="http://schemas.microsoft.com/office/drawing/2014/main" id="{30E96F0A-B593-4249-20AA-422EE9735F3E}"/>
+              </a:ext>
+            </a:extLst>
+          </p:cNvPr>
+          <p:cNvSpPr>
+            <a:spLocks noGrp="1"/>
+          </p:cNvSpPr>
+          <p:nvPr>
+            <p:ph idx="1"/>
+          </p:nvPr>
+        </p:nvSpPr>
+        <p:spPr>
+          <a:xfrm>
+            <a:off x="397163" y="1551706"/>
+            <a:ext cx="11360727" cy="2789381"/>
+          </a:xfrm>
+        </p:spPr>
+        <p:txBody>
+          <a:bodyPr>
+            <a:normAutofit fontScale="55000" lnSpcReduction="20000"/>
+          </a:bodyPr>
+          <a:lstStyle/>
+          <a:p>
+            <a:r>
+              <a:rPr lang="en-US" altLang="ko-KR" dirty="0" err="1"/>
+              <a:t>Qep</a:t>
+            </a:r>
+            <a:r>
+              <a:rPr lang="ko-KR" altLang="en-US" dirty="0"/>
+              <a:t>값 받고 </a:t>
+            </a:r>
+            <a:r>
+              <a:rPr lang="en-US" altLang="ko-KR" dirty="0" err="1"/>
+              <a:t>qep</a:t>
+            </a:r>
+            <a:r>
+              <a:rPr lang="en-US" altLang="ko-KR" dirty="0"/>
+              <a:t> </a:t>
+            </a:r>
+            <a:r>
+              <a:rPr lang="ko-KR" altLang="en-US" dirty="0"/>
+              <a:t>카운터 초기화</a:t>
+            </a:r>
+            <a:endParaRPr lang="en-US" altLang="ko-KR" dirty="0"/>
+          </a:p>
+          <a:p>
+            <a:endParaRPr lang="en-US" altLang="ko-KR" dirty="0"/>
+          </a:p>
+          <a:p>
+            <a:r>
+              <a:rPr lang="ko-KR" altLang="en-US" dirty="0"/>
+              <a:t>값 변환 기준이 </a:t>
+            </a:r>
+            <a:r>
+              <a:rPr lang="en-US" altLang="ko-KR" dirty="0"/>
+              <a:t>1024</a:t>
+            </a:r>
+            <a:r>
+              <a:rPr lang="ko-KR" altLang="en-US" dirty="0"/>
+              <a:t>로 되어 있지만</a:t>
+            </a:r>
+            <a:r>
+              <a:rPr lang="en-US" altLang="ko-KR" dirty="0"/>
+              <a:t>, </a:t>
+            </a:r>
+            <a:r>
+              <a:rPr lang="ko-KR" altLang="en-US" dirty="0"/>
+              <a:t>계산해보면 어떤 </a:t>
+            </a:r>
+            <a:r>
+              <a:rPr lang="ko-KR" altLang="en-US" dirty="0" err="1"/>
+              <a:t>숫자든</a:t>
+            </a:r>
+            <a:r>
+              <a:rPr lang="ko-KR" altLang="en-US" dirty="0"/>
+              <a:t> 상관없다</a:t>
+            </a:r>
+            <a:r>
+              <a:rPr lang="en-US" altLang="ko-KR" dirty="0"/>
+              <a:t>.</a:t>
+            </a:r>
+          </a:p>
+          <a:p>
+            <a:endParaRPr lang="en-US" altLang="ko-KR" dirty="0"/>
+          </a:p>
+          <a:p>
+            <a:r>
+              <a:rPr lang="en-US" altLang="ko-KR" dirty="0"/>
+              <a:t>1717 </a:t>
+            </a:r>
+            <a:r>
+              <a:rPr lang="ko-KR" altLang="en-US" dirty="0"/>
+              <a:t>모터 기준 최대 </a:t>
+            </a:r>
+            <a:r>
+              <a:rPr lang="en-US" altLang="ko-KR" dirty="0"/>
+              <a:t>rpm == 14000</a:t>
+            </a:r>
+          </a:p>
+          <a:p>
+            <a:r>
+              <a:rPr lang="en-US" altLang="ko-KR" dirty="0"/>
+              <a:t>14000 [rev/min]</a:t>
+            </a:r>
+            <a:r>
+              <a:rPr lang="ko-KR" altLang="en-US" dirty="0"/>
+              <a:t> </a:t>
+            </a:r>
+            <a:r>
+              <a:rPr lang="en-US" altLang="ko-KR" dirty="0"/>
+              <a:t>*</a:t>
+            </a:r>
+            <a:r>
+              <a:rPr lang="ko-KR" altLang="en-US" dirty="0"/>
+              <a:t> </a:t>
+            </a:r>
+            <a:r>
+              <a:rPr lang="en-US" altLang="ko-KR" dirty="0"/>
+              <a:t>1/60 [min/sec] * 0.0005 [sec/motor interrupt] * encoder </a:t>
+            </a:r>
+            <a:r>
+              <a:rPr lang="en-US" altLang="ko-KR" dirty="0" err="1"/>
+              <a:t>cnt</a:t>
+            </a:r>
+            <a:r>
+              <a:rPr lang="ko-KR" altLang="en-US" dirty="0"/>
+              <a:t> </a:t>
+            </a:r>
+            <a:r>
+              <a:rPr lang="en-US" altLang="ko-KR" dirty="0"/>
+              <a:t>* 4 =  238.933333 [</a:t>
+            </a:r>
+            <a:r>
+              <a:rPr lang="en-US" altLang="ko-KR" dirty="0" err="1"/>
+              <a:t>cnt</a:t>
+            </a:r>
+            <a:r>
+              <a:rPr lang="en-US" altLang="ko-KR" dirty="0"/>
+              <a:t>/motor</a:t>
+            </a:r>
+            <a:r>
+              <a:rPr lang="ko-KR" altLang="en-US" dirty="0"/>
+              <a:t> </a:t>
+            </a:r>
+            <a:r>
+              <a:rPr lang="en-US" altLang="ko-KR" dirty="0"/>
+              <a:t>interrupt]</a:t>
+            </a:r>
+          </a:p>
+          <a:p>
+            <a:r>
+              <a:rPr lang="ko-KR" altLang="en-US" dirty="0"/>
+              <a:t>모터 </a:t>
+            </a:r>
+            <a:r>
+              <a:rPr lang="ko-KR" altLang="en-US" dirty="0" err="1"/>
+              <a:t>인터럽드</a:t>
+            </a:r>
+            <a:r>
+              <a:rPr lang="ko-KR" altLang="en-US" dirty="0"/>
+              <a:t> </a:t>
+            </a:r>
+            <a:r>
+              <a:rPr lang="en-US" altLang="ko-KR" dirty="0"/>
+              <a:t>500us </a:t>
+            </a:r>
+            <a:r>
+              <a:rPr lang="ko-KR" altLang="en-US" dirty="0"/>
+              <a:t>마다 받을 수 있는 최대 </a:t>
+            </a:r>
+            <a:r>
+              <a:rPr lang="en-US" altLang="ko-KR" dirty="0"/>
+              <a:t>238.9333 </a:t>
+            </a:r>
+            <a:r>
+              <a:rPr lang="ko-KR" altLang="en-US" dirty="0"/>
+              <a:t>카운터가 최대라는 것</a:t>
+            </a:r>
+            <a:r>
+              <a:rPr lang="en-US" altLang="ko-KR" dirty="0"/>
+              <a:t>. </a:t>
+            </a:r>
+            <a:r>
+              <a:rPr lang="ko-KR" altLang="en-US" dirty="0"/>
+              <a:t>이 숫자보다 크면 기준은 상관없다</a:t>
+            </a:r>
+            <a:r>
+              <a:rPr lang="en-US" altLang="ko-KR" dirty="0"/>
+              <a:t>.</a:t>
+            </a:r>
+          </a:p>
+          <a:p>
+            <a:r>
+              <a:rPr lang="en-US" altLang="ko-KR" dirty="0"/>
+              <a:t>encoder </a:t>
+            </a:r>
+            <a:r>
+              <a:rPr lang="en-US" altLang="ko-KR" dirty="0" err="1"/>
+              <a:t>cnt</a:t>
+            </a:r>
+            <a:r>
+              <a:rPr lang="ko-KR" altLang="en-US" dirty="0"/>
+              <a:t>에 </a:t>
+            </a:r>
+            <a:r>
+              <a:rPr lang="en-US" altLang="ko-KR" dirty="0"/>
+              <a:t>4</a:t>
+            </a:r>
+            <a:r>
+              <a:rPr lang="ko-KR" altLang="en-US" dirty="0"/>
+              <a:t>를 곱하는 이유는 </a:t>
+            </a:r>
+            <a:r>
+              <a:rPr lang="en-US" altLang="ko-KR" dirty="0" err="1"/>
+              <a:t>qep</a:t>
+            </a:r>
+            <a:r>
+              <a:rPr lang="en-US" altLang="ko-KR" dirty="0"/>
+              <a:t> </a:t>
+            </a:r>
+            <a:r>
+              <a:rPr lang="ko-KR" altLang="en-US" dirty="0"/>
+              <a:t>공부를 할 것</a:t>
+            </a:r>
+            <a:r>
+              <a:rPr lang="en-US" altLang="ko-KR" dirty="0"/>
+              <a:t>.</a:t>
+            </a:r>
+          </a:p>
+        </p:txBody>
+      </p:sp>
+      <p:pic>
+        <p:nvPicPr>
+          <p:cNvPr id="7" name="그림 6">
+            <a:extLst>
+              <a:ext uri="{FF2B5EF4-FFF2-40B4-BE49-F238E27FC236}">
+                <a16:creationId xmlns:a16="http://schemas.microsoft.com/office/drawing/2014/main" id="{A6C49963-E767-F56D-4CE2-3072EFE6B2ED}"/>
+              </a:ext>
+            </a:extLst>
+          </p:cNvPr>
+          <p:cNvPicPr>
+            <a:picLocks noChangeAspect="1"/>
+          </p:cNvPicPr>
+          <p:nvPr/>
+        </p:nvPicPr>
+        <p:blipFill>
+          <a:blip r:embed="rId2"/>
+          <a:stretch>
+            <a:fillRect/>
+          </a:stretch>
+        </p:blipFill>
+        <p:spPr>
+          <a:xfrm>
+            <a:off x="2449234" y="3837214"/>
+            <a:ext cx="7293531" cy="2730462"/>
+          </a:xfrm>
+          <a:prstGeom prst="rect">
+            <a:avLst/>
+          </a:prstGeom>
+        </p:spPr>
+      </p:pic>
+    </p:spTree>
+    <p:extLst>
+      <p:ext uri="{BB962C8B-B14F-4D97-AF65-F5344CB8AC3E}">
+        <p14:creationId xmlns:p14="http://schemas.microsoft.com/office/powerpoint/2010/main" val="2708574857"/>
+      </p:ext>
+    </p:extLst>
+  </p:cSld>
+  <p:clrMapOvr>
+    <a:masterClrMapping/>
+  </p:clrMapOvr>
+</p:sld>
+</file>
+
+<file path=ppt/slides/slide11.xml><?xml version="1.0" encoding="utf-8"?>
+<p:sld xmlns:a="http://schemas.openxmlformats.org/drawingml/2006/main" xmlns:r="http://schemas.openxmlformats.org/officeDocument/2006/relationships" xmlns:p="http://schemas.openxmlformats.org/presentationml/2006/main">
+  <p:cSld>
+    <p:spTree>
+      <p:nvGrpSpPr>
+        <p:cNvPr id="1" name=""/>
+        <p:cNvGrpSpPr/>
+        <p:nvPr/>
+      </p:nvGrpSpPr>
+      <p:grpSpPr>
+        <a:xfrm>
+          <a:off x="0" y="0"/>
+          <a:ext cx="0" cy="0"/>
+          <a:chOff x="0" y="0"/>
+          <a:chExt cx="0" cy="0"/>
+        </a:xfrm>
+      </p:grpSpPr>
+      <p:sp>
+        <p:nvSpPr>
+          <p:cNvPr id="2" name="제목 1">
+            <a:extLst>
+              <a:ext uri="{FF2B5EF4-FFF2-40B4-BE49-F238E27FC236}">
                 <a16:creationId xmlns:a16="http://schemas.microsoft.com/office/drawing/2014/main" id="{681ABB23-03BB-0A19-E4A7-51D97E0F34E0}"/>
               </a:ext>
             </a:extLst>
@@ -3866,7 +4208,7 @@
 </p:sld>
 </file>
 
-<file path=ppt/slides/slide11.xml><?xml version="1.0" encoding="utf-8"?>
+<file path=ppt/slides/slide12.xml><?xml version="1.0" encoding="utf-8"?>
 <p:sld xmlns:a="http://schemas.openxmlformats.org/drawingml/2006/main" xmlns:r="http://schemas.openxmlformats.org/officeDocument/2006/relationships" xmlns:p="http://schemas.openxmlformats.org/presentationml/2006/main">
   <p:cSld>
     <p:spTree>
@@ -4468,7 +4810,7 @@
 </p:sld>
 </file>
 
-<file path=ppt/slides/slide12.xml><?xml version="1.0" encoding="utf-8"?>
+<file path=ppt/slides/slide13.xml><?xml version="1.0" encoding="utf-8"?>
 <p:sld xmlns:a="http://schemas.openxmlformats.org/drawingml/2006/main" xmlns:r="http://schemas.openxmlformats.org/officeDocument/2006/relationships" xmlns:p="http://schemas.openxmlformats.org/presentationml/2006/main">
   <p:cSld>
     <p:spTree>
@@ -4926,7 +5268,7 @@
 </p:sld>
 </file>
 
-<file path=ppt/slides/slide13.xml><?xml version="1.0" encoding="utf-8"?>
+<file path=ppt/slides/slide14.xml><?xml version="1.0" encoding="utf-8"?>
 <p:sld xmlns:r="http://schemas.openxmlformats.org/officeDocument/2006/relationships" xmlns:c="http://schemas.openxmlformats.org/drawingml/2006/chart" xmlns:a="http://schemas.openxmlformats.org/drawingml/2006/main" xmlns:dgm="http://schemas.openxmlformats.org/drawingml/2006/diagram" xmlns:dsp="http://schemas.microsoft.com/office/drawing/2008/diagram" xmlns:p="http://schemas.openxmlformats.org/presentationml/2006/main">
   <p:cSld>
     <p:spTree>
@@ -5514,7 +5856,7 @@
 </p:sld>
 </file>
 
-<file path=ppt/slides/slide14.xml><?xml version="1.0" encoding="utf-8"?>
+<file path=ppt/slides/slide15.xml><?xml version="1.0" encoding="utf-8"?>
 <p:sld xmlns:r="http://schemas.openxmlformats.org/officeDocument/2006/relationships" xmlns:c="http://schemas.openxmlformats.org/drawingml/2006/chart" xmlns:a="http://schemas.openxmlformats.org/drawingml/2006/main" xmlns:dgm="http://schemas.openxmlformats.org/drawingml/2006/diagram" xmlns:dsp="http://schemas.microsoft.com/office/drawing/2008/diagram" xmlns:p="http://schemas.openxmlformats.org/presentationml/2006/main">
   <p:cSld>
     <p:spTree>
@@ -5863,7 +6205,7 @@
 </p:sld>
 </file>
 
-<file path=ppt/slides/slide15.xml><?xml version="1.0" encoding="utf-8"?>
+<file path=ppt/slides/slide16.xml><?xml version="1.0" encoding="utf-8"?>
 <p:sld xmlns:r="http://schemas.openxmlformats.org/officeDocument/2006/relationships" xmlns:c="http://schemas.openxmlformats.org/drawingml/2006/chart" xmlns:a="http://schemas.openxmlformats.org/drawingml/2006/main" xmlns:dgm="http://schemas.openxmlformats.org/drawingml/2006/diagram" xmlns:dsp="http://schemas.microsoft.com/office/drawing/2008/diagram" xmlns:p="http://schemas.openxmlformats.org/presentationml/2006/main">
   <p:cSld>
     <p:spTree>
@@ -5900,7 +6242,7 @@
             </a:pPr>
             <a:r>
               <a:rPr lang="ko-KR" altLang="en-US"/>
-              <a:t>동작 알고리즘</a:t>
+              <a:t>탐색 동작 알고리즘</a:t>
             </a:r>
             <a:endParaRPr lang="ko-KR" altLang="en-US"/>
           </a:p>
@@ -5918,7 +6260,9 @@
         </p:nvSpPr>
         <p:spPr/>
         <p:txBody>
-          <a:bodyPr/>
+          <a:bodyPr>
+            <a:normAutofit lnSpcReduction="10000"/>
+          </a:bodyPr>
           <a:lstStyle/>
           <a:p>
             <a:pPr marL="518000" lvl="0" indent="-518000">
@@ -5929,7 +6273,27 @@
               <a:rPr lang="ko-KR" altLang="en-US"/>
               <a:t>센싱</a:t>
             </a:r>
-            <a:endParaRPr lang="ko-KR" altLang="en-US"/>
+            <a:r>
+              <a:rPr lang="en-US" altLang="ko-KR"/>
+              <a:t>(IR </a:t>
+            </a:r>
+            <a:r>
+              <a:rPr lang="ko-KR" altLang="en-US"/>
+              <a:t>데이터</a:t>
+            </a:r>
+            <a:r>
+              <a:rPr lang="en-US" altLang="ko-KR"/>
+              <a:t>, v1, w1)</a:t>
+            </a:r>
+            <a:r>
+              <a:rPr lang="ko-KR" altLang="en-US"/>
+              <a:t>과 백업</a:t>
+            </a:r>
+            <a:r>
+              <a:rPr lang="en-US" altLang="ko-KR"/>
+              <a:t>(x2, y2, th2, v2, w2 -&gt; x0, y0, th0, v0, w0)</a:t>
+            </a:r>
+            <a:endParaRPr lang="en-US" altLang="ko-KR"/>
           </a:p>
           <a:p>
             <a:pPr marL="518000" lvl="0" indent="-518000">
@@ -5938,7 +6302,7 @@
             </a:pPr>
             <a:r>
               <a:rPr lang="ko-KR" altLang="en-US"/>
-              <a:t>로봇 포지션 추정 </a:t>
+              <a:t>로봇 위치 추정 </a:t>
             </a:r>
             <a:r>
               <a:rPr lang="en-US" altLang="ko-KR"/>
@@ -5958,11 +6322,11 @@
             </a:r>
             <a:r>
               <a:rPr lang="en-US" altLang="ko-KR"/>
-              <a:t>v, w, </a:t>
-            </a:r>
-            <a:r>
-              <a:rPr lang="ko-KR" altLang="en-US"/>
-              <a:t>센서 데이터</a:t>
+              <a:t>IR</a:t>
+            </a:r>
+            <a:r>
+              <a:rPr lang="ko-KR" altLang="en-US"/>
+              <a:t> 데이터</a:t>
             </a:r>
             <a:r>
               <a:rPr lang="en-US" altLang="ko-KR"/>
@@ -5982,74 +6346,9 @@
             </a:r>
             <a:r>
               <a:rPr lang="en-US" altLang="ko-KR"/>
-              <a:t>:</a:t>
-            </a:r>
-            <a:r>
-              <a:rPr lang="ko-KR" altLang="en-US"/>
-              <a:t> </a:t>
-            </a:r>
-            <a:r>
-              <a:rPr lang="en-US" altLang="ko-KR"/>
-              <a:t>v’, w’)</a:t>
+              <a:t>: x1, y1, th1)</a:t>
             </a:r>
             <a:endParaRPr lang="en-US" altLang="ko-KR"/>
-          </a:p>
-          <a:p>
-            <a:pPr marL="975200" lvl="1" indent="-518000">
-              <a:buAutoNum type="arabicPeriod"/>
-              <a:defRPr/>
-            </a:pPr>
-            <a:r>
-              <a:rPr lang="en-US" altLang="ko-KR"/>
-              <a:t>v, w </a:t>
-            </a:r>
-            <a:r>
-              <a:rPr lang="ko-KR" altLang="en-US"/>
-              <a:t>토대로 위치 예측 </a:t>
-            </a:r>
-            <a:r>
-              <a:rPr lang="en-US" altLang="ko-KR"/>
-              <a:t>_1</a:t>
-            </a:r>
-            <a:endParaRPr lang="en-US" altLang="ko-KR"/>
-          </a:p>
-          <a:p>
-            <a:pPr marL="975200" lvl="1" indent="-518000">
-              <a:buAutoNum type="arabicPeriod"/>
-              <a:defRPr/>
-            </a:pPr>
-            <a:r>
-              <a:rPr lang="ko-KR" altLang="en-US"/>
-              <a:t>센서 데이터로 위치 예측 </a:t>
-            </a:r>
-            <a:r>
-              <a:rPr lang="en-US" altLang="ko-KR"/>
-              <a:t>_2</a:t>
-            </a:r>
-            <a:endParaRPr lang="en-US" altLang="ko-KR"/>
-          </a:p>
-          <a:p>
-            <a:pPr marL="975200" lvl="1" indent="-518000">
-              <a:buAutoNum type="arabicPeriod"/>
-              <a:defRPr/>
-            </a:pPr>
-            <a:r>
-              <a:rPr lang="en-US" altLang="ko-KR"/>
-              <a:t>1</a:t>
-            </a:r>
-            <a:r>
-              <a:rPr lang="ko-KR" altLang="en-US"/>
-              <a:t>과 </a:t>
-            </a:r>
-            <a:r>
-              <a:rPr lang="en-US" altLang="ko-KR"/>
-              <a:t>2</a:t>
-            </a:r>
-            <a:r>
-              <a:rPr lang="ko-KR" altLang="en-US"/>
-              <a:t>를 융합</a:t>
-            </a:r>
-            <a:endParaRPr lang="ko-KR" altLang="en-US"/>
           </a:p>
           <a:p>
             <a:pPr marL="518000" lvl="0" indent="-518000">
@@ -6057,8 +6356,20 @@
               <a:defRPr/>
             </a:pPr>
             <a:r>
+              <a:rPr lang="ko-KR" altLang="en-US"/>
+              <a:t>로봇 포지션 추정 </a:t>
+            </a:r>
+            <a:r>
               <a:rPr lang="en-US" altLang="ko-KR"/>
-              <a:t>v’,</a:t>
+              <a:t>(</a:t>
+            </a:r>
+            <a:r>
+              <a:rPr lang="ko-KR" altLang="en-US"/>
+              <a:t>입력</a:t>
+            </a:r>
+            <a:r>
+              <a:rPr lang="en-US" altLang="ko-KR"/>
+              <a:t>:</a:t>
             </a:r>
             <a:r>
               <a:rPr lang="ko-KR" altLang="en-US"/>
@@ -6066,21 +6377,33 @@
             </a:r>
             <a:r>
               <a:rPr lang="en-US" altLang="ko-KR"/>
-              <a:t>w’</a:t>
-            </a:r>
-            <a:r>
-              <a:rPr lang="ko-KR" altLang="en-US"/>
-              <a:t> 기반으로 </a:t>
+              <a:t>x0, y0, th0, v0, w0, x1, y1, th1, v1, w1)</a:t>
+            </a:r>
+            <a:r>
+              <a:rPr lang="ko-KR" altLang="en-US"/>
+              <a:t> </a:t>
             </a:r>
             <a:r>
               <a:rPr lang="en-US" altLang="ko-KR"/>
-              <a:t>V_left, V_right </a:t>
-            </a:r>
-            <a:r>
-              <a:rPr lang="ko-KR" altLang="en-US"/>
-              <a:t>계산</a:t>
-            </a:r>
-            <a:endParaRPr lang="ko-KR" altLang="en-US"/>
+              <a:t>(</a:t>
+            </a:r>
+            <a:r>
+              <a:rPr lang="ko-KR" altLang="en-US"/>
+              <a:t>출력</a:t>
+            </a:r>
+            <a:r>
+              <a:rPr lang="en-US" altLang="ko-KR"/>
+              <a:t>:</a:t>
+            </a:r>
+            <a:r>
+              <a:rPr lang="ko-KR" altLang="en-US"/>
+              <a:t> </a:t>
+            </a:r>
+            <a:r>
+              <a:rPr lang="en-US" altLang="ko-KR"/>
+              <a:t>x2, y2, th2, v2, w2)</a:t>
+            </a:r>
+            <a:endParaRPr lang="en-US" altLang="ko-KR"/>
           </a:p>
           <a:p>
             <a:pPr marL="518000" lvl="0" indent="-518000">
@@ -6088,10 +6411,77 @@
               <a:defRPr/>
             </a:pPr>
             <a:r>
+              <a:rPr lang="en-US" altLang="ko-KR"/>
+              <a:t>v2,</a:t>
+            </a:r>
+            <a:r>
+              <a:rPr lang="ko-KR" altLang="en-US"/>
+              <a:t> </a:t>
+            </a:r>
+            <a:r>
+              <a:rPr lang="en-US" altLang="ko-KR"/>
+              <a:t>w2</a:t>
+            </a:r>
+            <a:r>
+              <a:rPr lang="ko-KR" altLang="en-US"/>
+              <a:t> </a:t>
+            </a:r>
+            <a:r>
+              <a:rPr lang="en-US" altLang="ko-KR"/>
+              <a:t>-&gt; vl, vr </a:t>
+            </a:r>
+            <a:r>
+              <a:rPr lang="ko-KR" altLang="en-US"/>
+              <a:t>계산</a:t>
+            </a:r>
+            <a:endParaRPr lang="ko-KR" altLang="en-US"/>
+          </a:p>
+          <a:p>
+            <a:pPr marL="518000" lvl="0" indent="-518000">
+              <a:buAutoNum type="arabicPeriod"/>
+              <a:defRPr/>
+            </a:pPr>
+            <a:r>
               <a:rPr lang="ko-KR" altLang="en-US"/>
               <a:t>모터 제어</a:t>
             </a:r>
-            <a:endParaRPr lang="ko-KR" altLang="en-US"/>
+            <a:r>
+              <a:rPr lang="en-US" altLang="ko-KR"/>
+              <a:t> (</a:t>
+            </a:r>
+            <a:r>
+              <a:rPr lang="ko-KR" altLang="en-US"/>
+              <a:t>입력</a:t>
+            </a:r>
+            <a:r>
+              <a:rPr lang="en-US" altLang="ko-KR"/>
+              <a:t>:</a:t>
+            </a:r>
+            <a:r>
+              <a:rPr lang="ko-KR" altLang="en-US"/>
+              <a:t> </a:t>
+            </a:r>
+            <a:r>
+              <a:rPr lang="en-US" altLang="ko-KR"/>
+              <a:t>vl, vr, a) (</a:t>
+            </a:r>
+            <a:r>
+              <a:rPr lang="ko-KR" altLang="en-US"/>
+              <a:t>출력</a:t>
+            </a:r>
+            <a:r>
+              <a:rPr lang="en-US" altLang="ko-KR"/>
+              <a:t>:</a:t>
+            </a:r>
+            <a:r>
+              <a:rPr lang="ko-KR" altLang="en-US"/>
+              <a:t> </a:t>
+            </a:r>
+            <a:r>
+              <a:rPr lang="en-US" altLang="ko-KR"/>
+              <a:t>lpwm, rpwm)</a:t>
+            </a:r>
+            <a:endParaRPr lang="en-US" altLang="ko-KR"/>
           </a:p>
           <a:p>
             <a:pPr marL="518000" lvl="0" indent="-518000">
@@ -6144,7 +6534,450 @@
 </p:sld>
 </file>
 
-<file path=ppt/slides/slide16.xml><?xml version="1.0" encoding="utf-8"?>
+<file path=ppt/slides/slide17.xml><?xml version="1.0" encoding="utf-8"?>
+<p:sld xmlns:r="http://schemas.openxmlformats.org/officeDocument/2006/relationships" xmlns:c="http://schemas.openxmlformats.org/drawingml/2006/chart" xmlns:a="http://schemas.openxmlformats.org/drawingml/2006/main" xmlns:dgm="http://schemas.openxmlformats.org/drawingml/2006/diagram" xmlns:dsp="http://schemas.microsoft.com/office/drawing/2008/diagram" xmlns:p="http://schemas.openxmlformats.org/presentationml/2006/main">
+  <p:cSld>
+    <p:spTree>
+      <p:nvGrpSpPr>
+        <p:cNvPr id="1" name=""/>
+        <p:cNvGrpSpPr/>
+        <p:nvPr/>
+      </p:nvGrpSpPr>
+      <p:grpSpPr>
+        <a:xfrm>
+          <a:off x="0" y="0"/>
+          <a:ext cx="0" cy="0"/>
+          <a:chOff x="0" y="0"/>
+          <a:chExt cx="0" cy="0"/>
+        </a:xfrm>
+      </p:grpSpPr>
+      <p:sp>
+        <p:nvSpPr>
+          <p:cNvPr id="2" name="제목 1"/>
+          <p:cNvSpPr>
+            <a:spLocks noGrp="1"/>
+          </p:cNvSpPr>
+          <p:nvPr>
+            <p:ph type="title" idx="0"/>
+          </p:nvPr>
+        </p:nvSpPr>
+        <p:spPr/>
+        <p:txBody>
+          <a:bodyPr/>
+          <a:lstStyle/>
+          <a:p>
+            <a:pPr lvl="0">
+              <a:defRPr/>
+            </a:pPr>
+            <a:r>
+              <a:rPr lang="ko-KR" altLang="en-US"/>
+              <a:t>패스트런 동작 알고리즘</a:t>
+            </a:r>
+            <a:endParaRPr lang="ko-KR" altLang="en-US"/>
+          </a:p>
+        </p:txBody>
+      </p:sp>
+      <p:sp>
+        <p:nvSpPr>
+          <p:cNvPr id="3" name="내용 개체 틀 2"/>
+          <p:cNvSpPr>
+            <a:spLocks noGrp="1"/>
+          </p:cNvSpPr>
+          <p:nvPr>
+            <p:ph idx="1"/>
+          </p:nvPr>
+        </p:nvSpPr>
+        <p:spPr/>
+        <p:txBody>
+          <a:bodyPr>
+            <a:normAutofit lnSpcReduction="10000"/>
+          </a:bodyPr>
+          <a:lstStyle/>
+          <a:p>
+            <a:pPr marL="518000" lvl="0" indent="-518000">
+              <a:buAutoNum type="arabicPeriod"/>
+              <a:defRPr/>
+            </a:pPr>
+            <a:r>
+              <a:rPr lang="ko-KR" altLang="en-US"/>
+              <a:t>센싱</a:t>
+            </a:r>
+            <a:r>
+              <a:rPr lang="en-US" altLang="ko-KR"/>
+              <a:t>(IR </a:t>
+            </a:r>
+            <a:r>
+              <a:rPr lang="ko-KR" altLang="en-US"/>
+              <a:t>데이터</a:t>
+            </a:r>
+            <a:r>
+              <a:rPr lang="en-US" altLang="ko-KR"/>
+              <a:t>, v1, w1)</a:t>
+            </a:r>
+            <a:r>
+              <a:rPr lang="ko-KR" altLang="en-US"/>
+              <a:t>과 백업</a:t>
+            </a:r>
+            <a:r>
+              <a:rPr lang="en-US" altLang="ko-KR"/>
+              <a:t>(x2, y2, th2, v2, w2 -&gt; x0, y0, th0, v0, w0)</a:t>
+            </a:r>
+            <a:endParaRPr lang="en-US" altLang="ko-KR"/>
+          </a:p>
+          <a:p>
+            <a:pPr marL="518000" lvl="0" indent="-518000">
+              <a:buAutoNum type="arabicPeriod"/>
+              <a:defRPr/>
+            </a:pPr>
+            <a:r>
+              <a:rPr lang="ko-KR" altLang="en-US"/>
+              <a:t>로봇 위치 추정 </a:t>
+            </a:r>
+            <a:r>
+              <a:rPr lang="en-US" altLang="ko-KR"/>
+              <a:t>(</a:t>
+            </a:r>
+            <a:r>
+              <a:rPr lang="ko-KR" altLang="en-US"/>
+              <a:t>입력</a:t>
+            </a:r>
+            <a:r>
+              <a:rPr lang="en-US" altLang="ko-KR"/>
+              <a:t>:</a:t>
+            </a:r>
+            <a:r>
+              <a:rPr lang="ko-KR" altLang="en-US"/>
+              <a:t> </a:t>
+            </a:r>
+            <a:r>
+              <a:rPr lang="en-US" altLang="ko-KR"/>
+              <a:t>IR</a:t>
+            </a:r>
+            <a:r>
+              <a:rPr lang="ko-KR" altLang="en-US"/>
+              <a:t> 데이터</a:t>
+            </a:r>
+            <a:r>
+              <a:rPr lang="en-US" altLang="ko-KR"/>
+              <a:t>)</a:t>
+            </a:r>
+            <a:r>
+              <a:rPr lang="ko-KR" altLang="en-US"/>
+              <a:t> </a:t>
+            </a:r>
+            <a:r>
+              <a:rPr lang="en-US" altLang="ko-KR"/>
+              <a:t>(</a:t>
+            </a:r>
+            <a:r>
+              <a:rPr lang="ko-KR" altLang="en-US"/>
+              <a:t>출력</a:t>
+            </a:r>
+            <a:r>
+              <a:rPr lang="en-US" altLang="ko-KR"/>
+              <a:t>: x1, y1, th1)</a:t>
+            </a:r>
+            <a:endParaRPr lang="en-US" altLang="ko-KR"/>
+          </a:p>
+          <a:p>
+            <a:pPr marL="518000" lvl="0" indent="-518000">
+              <a:buAutoNum type="arabicPeriod"/>
+              <a:defRPr/>
+            </a:pPr>
+            <a:r>
+              <a:rPr lang="ko-KR" altLang="en-US"/>
+              <a:t>로봇 포지션 추정 </a:t>
+            </a:r>
+            <a:r>
+              <a:rPr lang="en-US" altLang="ko-KR"/>
+              <a:t>(</a:t>
+            </a:r>
+            <a:r>
+              <a:rPr lang="ko-KR" altLang="en-US"/>
+              <a:t>입력</a:t>
+            </a:r>
+            <a:r>
+              <a:rPr lang="en-US" altLang="ko-KR"/>
+              <a:t>:</a:t>
+            </a:r>
+            <a:r>
+              <a:rPr lang="ko-KR" altLang="en-US"/>
+              <a:t> </a:t>
+            </a:r>
+            <a:r>
+              <a:rPr lang="en-US" altLang="ko-KR"/>
+              <a:t>x0, y0, th0, v0, w0, x1, y1, th1, v1, w1)</a:t>
+            </a:r>
+            <a:r>
+              <a:rPr lang="ko-KR" altLang="en-US"/>
+              <a:t> </a:t>
+            </a:r>
+            <a:r>
+              <a:rPr lang="en-US" altLang="ko-KR"/>
+              <a:t>(</a:t>
+            </a:r>
+            <a:r>
+              <a:rPr lang="ko-KR" altLang="en-US"/>
+              <a:t>출력</a:t>
+            </a:r>
+            <a:r>
+              <a:rPr lang="en-US" altLang="ko-KR"/>
+              <a:t>:</a:t>
+            </a:r>
+            <a:r>
+              <a:rPr lang="ko-KR" altLang="en-US"/>
+              <a:t> </a:t>
+            </a:r>
+            <a:r>
+              <a:rPr lang="en-US" altLang="ko-KR"/>
+              <a:t>x2, y2, th2, v2, w2)</a:t>
+            </a:r>
+            <a:endParaRPr lang="en-US" altLang="ko-KR"/>
+          </a:p>
+          <a:p>
+            <a:pPr marL="518000" lvl="0" indent="-518000">
+              <a:buAutoNum type="arabicPeriod"/>
+              <a:defRPr/>
+            </a:pPr>
+            <a:r>
+              <a:rPr lang="en-US" altLang="ko-KR"/>
+              <a:t>v2,</a:t>
+            </a:r>
+            <a:r>
+              <a:rPr lang="ko-KR" altLang="en-US"/>
+              <a:t> </a:t>
+            </a:r>
+            <a:r>
+              <a:rPr lang="en-US" altLang="ko-KR"/>
+              <a:t>w2</a:t>
+            </a:r>
+            <a:r>
+              <a:rPr lang="ko-KR" altLang="en-US"/>
+              <a:t> </a:t>
+            </a:r>
+            <a:r>
+              <a:rPr lang="en-US" altLang="ko-KR"/>
+              <a:t>-&gt; vl, vr </a:t>
+            </a:r>
+            <a:r>
+              <a:rPr lang="ko-KR" altLang="en-US"/>
+              <a:t>계산</a:t>
+            </a:r>
+            <a:endParaRPr lang="ko-KR" altLang="en-US"/>
+          </a:p>
+          <a:p>
+            <a:pPr marL="518000" lvl="0" indent="-518000">
+              <a:buAutoNum type="arabicPeriod"/>
+              <a:defRPr/>
+            </a:pPr>
+            <a:r>
+              <a:rPr lang="ko-KR" altLang="en-US"/>
+              <a:t>모터 제어</a:t>
+            </a:r>
+            <a:r>
+              <a:rPr lang="en-US" altLang="ko-KR"/>
+              <a:t> (</a:t>
+            </a:r>
+            <a:r>
+              <a:rPr lang="ko-KR" altLang="en-US"/>
+              <a:t>입력</a:t>
+            </a:r>
+            <a:r>
+              <a:rPr lang="en-US" altLang="ko-KR"/>
+              <a:t>:</a:t>
+            </a:r>
+            <a:r>
+              <a:rPr lang="ko-KR" altLang="en-US"/>
+              <a:t> </a:t>
+            </a:r>
+            <a:r>
+              <a:rPr lang="en-US" altLang="ko-KR"/>
+              <a:t>vl, vr, a) (</a:t>
+            </a:r>
+            <a:r>
+              <a:rPr lang="ko-KR" altLang="en-US"/>
+              <a:t>출력</a:t>
+            </a:r>
+            <a:r>
+              <a:rPr lang="en-US" altLang="ko-KR"/>
+              <a:t>:</a:t>
+            </a:r>
+            <a:r>
+              <a:rPr lang="ko-KR" altLang="en-US"/>
+              <a:t> </a:t>
+            </a:r>
+            <a:r>
+              <a:rPr lang="en-US" altLang="ko-KR"/>
+              <a:t>lpwm, rpwm)</a:t>
+            </a:r>
+            <a:endParaRPr lang="en-US" altLang="ko-KR"/>
+          </a:p>
+          <a:p>
+            <a:pPr marL="518000" lvl="0" indent="-518000">
+              <a:buAutoNum type="arabicPeriod"/>
+              <a:defRPr/>
+            </a:pPr>
+            <a:r>
+              <a:rPr lang="ko-KR" altLang="en-US"/>
+              <a:t>동작 명령이 종료될 때까지 </a:t>
+            </a:r>
+            <a:r>
+              <a:rPr lang="en-US" altLang="ko-KR"/>
+              <a:t>1~5</a:t>
+            </a:r>
+            <a:r>
+              <a:rPr lang="ko-KR" altLang="en-US"/>
+              <a:t> 반복</a:t>
+            </a:r>
+            <a:endParaRPr lang="ko-KR" altLang="en-US"/>
+          </a:p>
+          <a:p>
+            <a:pPr marL="518000" lvl="0" indent="-518000">
+              <a:buAutoNum type="arabicPeriod"/>
+              <a:defRPr/>
+            </a:pPr>
+            <a:endParaRPr lang="ko-KR" altLang="en-US"/>
+          </a:p>
+          <a:p>
+            <a:pPr marL="518000" lvl="0" indent="-518000">
+              <a:buAutoNum type="arabicPeriod"/>
+              <a:defRPr/>
+            </a:pPr>
+            <a:endParaRPr lang="ko-KR" altLang="en-US"/>
+          </a:p>
+        </p:txBody>
+      </p:sp>
+    </p:spTree>
+  </p:cSld>
+  <p:clrMapOvr>
+    <a:masterClrMapping/>
+  </p:clrMapOvr>
+  <mc:AlternateContent xmlns:mc="http://schemas.openxmlformats.org/markup-compatibility/2006">
+    <mc:Choice xmlns:p14="http://schemas.microsoft.com/office/powerpoint/2010/main" Requires="p14">
+      <p:transition xmlns:mc="http://schemas.openxmlformats.org/markup-compatibility/2006" xmlns:p14="http://schemas.microsoft.com/office/powerpoint/2010/main" mc:Ignorable="p14" p14:dur="500"/>
+    </mc:Choice>
+    <mc:Fallback>
+      <p:transition/>
+    </mc:Fallback>
+  </mc:AlternateContent>
+</p:sld>
+</file>
+
+<file path=ppt/slides/slide18.xml><?xml version="1.0" encoding="utf-8"?>
+<p:sld xmlns:r="http://schemas.openxmlformats.org/officeDocument/2006/relationships" xmlns:c="http://schemas.openxmlformats.org/drawingml/2006/chart" xmlns:a="http://schemas.openxmlformats.org/drawingml/2006/main" xmlns:dgm="http://schemas.openxmlformats.org/drawingml/2006/diagram" xmlns:dsp="http://schemas.microsoft.com/office/drawing/2008/diagram" xmlns:p="http://schemas.openxmlformats.org/presentationml/2006/main">
+  <p:cSld>
+    <p:spTree>
+      <p:nvGrpSpPr>
+        <p:cNvPr id="1" name=""/>
+        <p:cNvGrpSpPr/>
+        <p:nvPr/>
+      </p:nvGrpSpPr>
+      <p:grpSpPr>
+        <a:xfrm>
+          <a:off x="0" y="0"/>
+          <a:ext cx="0" cy="0"/>
+          <a:chOff x="0" y="0"/>
+          <a:chExt cx="0" cy="0"/>
+        </a:xfrm>
+      </p:grpSpPr>
+      <p:sp>
+        <p:nvSpPr>
+          <p:cNvPr id="2" name="제목 1"/>
+          <p:cNvSpPr>
+            <a:spLocks noGrp="1"/>
+          </p:cNvSpPr>
+          <p:nvPr>
+            <p:ph type="title" idx="0"/>
+          </p:nvPr>
+        </p:nvSpPr>
+        <p:spPr/>
+        <p:txBody>
+          <a:bodyPr/>
+          <a:lstStyle/>
+          <a:p>
+            <a:pPr lvl="0">
+              <a:defRPr/>
+            </a:pPr>
+            <a:r>
+              <a:rPr lang="ko-KR" altLang="en-US"/>
+              <a:t>로봇 위치 추정</a:t>
+            </a:r>
+            <a:endParaRPr lang="ko-KR" altLang="en-US"/>
+          </a:p>
+        </p:txBody>
+      </p:sp>
+      <p:sp>
+        <p:nvSpPr>
+          <p:cNvPr id="3" name="내용 개체 틀 2"/>
+          <p:cNvSpPr>
+            <a:spLocks noGrp="1"/>
+          </p:cNvSpPr>
+          <p:nvPr>
+            <p:ph idx="1"/>
+          </p:nvPr>
+        </p:nvSpPr>
+        <p:spPr/>
+        <p:txBody>
+          <a:bodyPr>
+            <a:normAutofit lnSpcReduction="10000"/>
+          </a:bodyPr>
+          <a:lstStyle/>
+          <a:p>
+            <a:pPr marL="0" lvl="0" indent="0">
+              <a:buNone/>
+              <a:defRPr/>
+            </a:pPr>
+            <a:r>
+              <a:rPr lang="ko-KR" altLang="en-US"/>
+              <a:t>센서는 총 </a:t>
+            </a:r>
+            <a:r>
+              <a:rPr lang="en-US" altLang="ko-KR"/>
+              <a:t>8</a:t>
+            </a:r>
+            <a:r>
+              <a:rPr lang="ko-KR" altLang="en-US"/>
+              <a:t>개 </a:t>
+            </a:r>
+            <a:r>
+              <a:rPr lang="en-US" altLang="ko-KR"/>
+              <a:t>(LRS, LFS, L45, LF, RF, R45, RFS, RLS)</a:t>
+            </a:r>
+            <a:endParaRPr lang="en-US" altLang="ko-KR"/>
+          </a:p>
+          <a:p>
+            <a:pPr marL="518000" lvl="0" indent="-518000">
+              <a:buAutoNum type="arabicPeriod"/>
+              <a:defRPr/>
+            </a:pPr>
+            <a:endParaRPr lang="ko-KR" altLang="en-US"/>
+          </a:p>
+          <a:p>
+            <a:pPr marL="518000" lvl="0" indent="-518000">
+              <a:buAutoNum type="arabicPeriod"/>
+              <a:defRPr/>
+            </a:pPr>
+            <a:endParaRPr lang="ko-KR" altLang="en-US"/>
+          </a:p>
+        </p:txBody>
+      </p:sp>
+    </p:spTree>
+  </p:cSld>
+  <p:clrMapOvr>
+    <a:masterClrMapping/>
+  </p:clrMapOvr>
+  <mc:AlternateContent xmlns:mc="http://schemas.openxmlformats.org/markup-compatibility/2006">
+    <mc:Choice xmlns:p14="http://schemas.microsoft.com/office/powerpoint/2010/main" Requires="p14">
+      <p:transition xmlns:mc="http://schemas.openxmlformats.org/markup-compatibility/2006" xmlns:p14="http://schemas.microsoft.com/office/powerpoint/2010/main" mc:Ignorable="p14" p14:dur="500"/>
+    </mc:Choice>
+    <mc:Fallback>
+      <p:transition/>
+    </mc:Fallback>
+  </mc:AlternateContent>
+</p:sld>
+</file>
+
+<file path=ppt/slides/slide19.xml><?xml version="1.0" encoding="utf-8"?>
 <p:sld xmlns:r="http://schemas.openxmlformats.org/officeDocument/2006/relationships" xmlns:c="http://schemas.openxmlformats.org/drawingml/2006/chart" xmlns:a="http://schemas.openxmlformats.org/drawingml/2006/main" xmlns:dgm="http://schemas.openxmlformats.org/drawingml/2006/diagram" xmlns:dsp="http://schemas.microsoft.com/office/drawing/2008/diagram" xmlns:p="http://schemas.openxmlformats.org/presentationml/2006/main">
   <p:cSld>
     <p:spTree>
@@ -8649,7 +9482,7 @@
 </file>
 
 <file path=ppt/slides/slide9.xml><?xml version="1.0" encoding="utf-8"?>
-<p:sld xmlns:a="http://schemas.openxmlformats.org/drawingml/2006/main" xmlns:r="http://schemas.openxmlformats.org/officeDocument/2006/relationships" xmlns:p="http://schemas.openxmlformats.org/presentationml/2006/main">
+<p:sld xmlns:r="http://schemas.openxmlformats.org/officeDocument/2006/relationships" xmlns:c="http://schemas.openxmlformats.org/drawingml/2006/chart" xmlns:a="http://schemas.openxmlformats.org/drawingml/2006/main" xmlns:dgm="http://schemas.openxmlformats.org/drawingml/2006/diagram" xmlns:dsp="http://schemas.microsoft.com/office/drawing/2008/diagram" xmlns:p="http://schemas.openxmlformats.org/presentationml/2006/main">
   <p:cSld>
     <p:spTree>
       <p:nvGrpSpPr>
@@ -8667,18 +9500,12 @@
       </p:grpSpPr>
       <p:sp>
         <p:nvSpPr>
-          <p:cNvPr id="2" name="제목 1">
-            <a:extLst>
-              <a:ext uri="{FF2B5EF4-FFF2-40B4-BE49-F238E27FC236}">
-                <a16:creationId xmlns:a16="http://schemas.microsoft.com/office/drawing/2014/main" id="{5222A7DB-9D64-FFE0-C4E7-DC0AA261BFBB}"/>
-              </a:ext>
-            </a:extLst>
-          </p:cNvPr>
+          <p:cNvPr id="2" name="제목 1"/>
           <p:cNvSpPr>
             <a:spLocks noGrp="1"/>
           </p:cNvSpPr>
           <p:nvPr>
-            <p:ph type="title"/>
+            <p:ph type="title" idx="0"/>
           </p:nvPr>
         </p:nvSpPr>
         <p:spPr/>
@@ -8686,34 +9513,28 @@
           <a:bodyPr/>
           <a:lstStyle/>
           <a:p>
-            <a:r>
-              <a:rPr lang="ko-KR" altLang="en-US" dirty="0" err="1"/>
-              <a:t>모터부</a:t>
-            </a:r>
-            <a:r>
-              <a:rPr lang="ko-KR" altLang="en-US" dirty="0"/>
-              <a:t> </a:t>
-            </a:r>
-            <a:r>
-              <a:rPr lang="en-US" altLang="ko-KR" dirty="0"/>
-              <a:t>– </a:t>
-            </a:r>
-            <a:r>
-              <a:rPr lang="ko-KR" altLang="en-US" dirty="0"/>
-              <a:t>모터 인터럽트</a:t>
-            </a:r>
-          </a:p>
-        </p:txBody>
-      </p:sp>
-      <p:sp>
-        <p:nvSpPr>
-          <p:cNvPr id="3" name="내용 개체 틀 2">
-            <a:extLst>
-              <a:ext uri="{FF2B5EF4-FFF2-40B4-BE49-F238E27FC236}">
-                <a16:creationId xmlns:a16="http://schemas.microsoft.com/office/drawing/2014/main" id="{30E96F0A-B593-4249-20AA-422EE9735F3E}"/>
-              </a:ext>
-            </a:extLst>
-          </p:cNvPr>
+            <a:pPr lvl="0">
+              <a:defRPr/>
+            </a:pPr>
+            <a:r>
+              <a:rPr lang="ko-KR" altLang="en-US"/>
+              <a:t>모터부 </a:t>
+            </a:r>
+            <a:r>
+              <a:rPr lang="en-US" altLang="ko-KR"/>
+              <a:t>- </a:t>
+            </a:r>
+            <a:r>
+              <a:rPr lang="ko-KR" altLang="en-US"/>
+              <a:t>모터</a:t>
+            </a:r>
+            <a:endParaRPr lang="ko-KR" altLang="en-US"/>
+          </a:p>
+        </p:txBody>
+      </p:sp>
+      <p:sp>
+        <p:nvSpPr>
+          <p:cNvPr id="3" name="내용 개체 틀 2"/>
           <p:cNvSpPr>
             <a:spLocks noGrp="1"/>
           </p:cNvSpPr>
@@ -8723,239 +9544,223 @@
         </p:nvSpPr>
         <p:spPr>
           <a:xfrm>
-            <a:off x="397163" y="1551706"/>
-            <a:ext cx="11360727" cy="2789381"/>
+            <a:off x="838200" y="1825625"/>
+            <a:ext cx="5395911" cy="4351338"/>
           </a:xfrm>
         </p:spPr>
         <p:txBody>
           <a:bodyPr>
-            <a:normAutofit fontScale="55000" lnSpcReduction="20000"/>
+            <a:normAutofit fontScale="92500" lnSpcReduction="10000"/>
           </a:bodyPr>
           <a:lstStyle/>
           <a:p>
-            <a:r>
-              <a:rPr lang="en-US" altLang="ko-KR" dirty="0" err="1"/>
-              <a:t>Qep</a:t>
-            </a:r>
-            <a:r>
-              <a:rPr lang="ko-KR" altLang="en-US" dirty="0"/>
-              <a:t>값 받고 </a:t>
-            </a:r>
-            <a:r>
-              <a:rPr lang="en-US" altLang="ko-KR" dirty="0" err="1"/>
-              <a:t>qep</a:t>
-            </a:r>
-            <a:r>
-              <a:rPr lang="en-US" altLang="ko-KR" dirty="0"/>
+            <a:pPr marL="0" lvl="0" indent="0">
+              <a:buNone/>
+              <a:defRPr/>
+            </a:pPr>
+            <a:r>
+              <a:rPr lang="en-US" altLang="ko-KR" sz="2000"/>
+              <a:t>250727</a:t>
+            </a:r>
+            <a:endParaRPr lang="en-US" altLang="ko-KR" sz="2000"/>
+          </a:p>
+          <a:p>
+            <a:pPr lvl="0">
+              <a:defRPr/>
+            </a:pPr>
+            <a:r>
+              <a:rPr lang="en-US" altLang="ko-KR" sz="2000"/>
+              <a:t>1717</a:t>
+            </a:r>
+            <a:r>
+              <a:rPr lang="ko-KR" altLang="en-US" sz="2000"/>
+              <a:t>은 스톨 토크가 </a:t>
+            </a:r>
+            <a:r>
+              <a:rPr lang="en-US" altLang="ko-KR" sz="2000"/>
+              <a:t>5.33 mNm</a:t>
+            </a:r>
+            <a:r>
+              <a:rPr lang="ko-KR" altLang="en-US" sz="2000"/>
+              <a:t>이고 이것에 </a:t>
+            </a:r>
+            <a:r>
+              <a:rPr lang="en-US" altLang="ko-KR" sz="2000"/>
+              <a:t>30%</a:t>
+            </a:r>
+            <a:r>
+              <a:rPr lang="ko-KR" altLang="en-US" sz="2000"/>
+              <a:t>를 보통 사용한다고 하고 기어비 </a:t>
+            </a:r>
+            <a:r>
+              <a:rPr lang="en-US" altLang="ko-KR" sz="2000"/>
+              <a:t>4</a:t>
+            </a:r>
+            <a:r>
+              <a:rPr lang="ko-KR" altLang="en-US" sz="2000"/>
+              <a:t>배를 해주면 </a:t>
+            </a:r>
+            <a:r>
+              <a:rPr lang="en-US" altLang="ko-KR" sz="2000"/>
+              <a:t>6.396</a:t>
+            </a:r>
+            <a:r>
+              <a:rPr lang="ko-KR" altLang="en-US" sz="2000"/>
               <a:t> </a:t>
             </a:r>
             <a:r>
-              <a:rPr lang="ko-KR" altLang="en-US" dirty="0"/>
-              <a:t>카운터 초기화</a:t>
-            </a:r>
-            <a:endParaRPr lang="en-US" altLang="ko-KR" dirty="0"/>
-          </a:p>
-          <a:p>
-            <a:endParaRPr lang="en-US" altLang="ko-KR" dirty="0"/>
-          </a:p>
-          <a:p>
-            <a:r>
-              <a:rPr lang="ko-KR" altLang="en-US" dirty="0"/>
-              <a:t>값 변환 기준이 </a:t>
-            </a:r>
-            <a:r>
-              <a:rPr lang="en-US" altLang="ko-KR" dirty="0"/>
-              <a:t>1024</a:t>
-            </a:r>
-            <a:r>
-              <a:rPr lang="ko-KR" altLang="en-US" dirty="0"/>
-              <a:t>로 되어 있지만</a:t>
-            </a:r>
-            <a:r>
-              <a:rPr lang="en-US" altLang="ko-KR" dirty="0"/>
+              <a:rPr lang="en-US" altLang="ko-KR" sz="2000"/>
+              <a:t>mNm</a:t>
+            </a:r>
+            <a:r>
+              <a:rPr lang="ko-KR" altLang="en-US" sz="2000"/>
+              <a:t> </a:t>
+            </a:r>
+            <a:r>
+              <a:rPr lang="en-US" altLang="ko-KR" sz="2000"/>
+              <a:t>-&gt; </a:t>
+            </a:r>
+            <a:r>
+              <a:rPr lang="ko-KR" altLang="en-US" sz="2000"/>
+              <a:t>해당 수치가 </a:t>
+            </a:r>
+            <a:r>
+              <a:rPr lang="en-US" altLang="ko-KR" sz="2000"/>
+              <a:t>1717</a:t>
+            </a:r>
+            <a:r>
+              <a:rPr lang="ko-KR" altLang="en-US" sz="2000"/>
+              <a:t>이 현재 설계에서 최대 </a:t>
+            </a:r>
+            <a:r>
+              <a:rPr lang="en-US" altLang="ko-KR" sz="2000"/>
+              <a:t>rpm</a:t>
+            </a:r>
+            <a:r>
+              <a:rPr lang="ko-KR" altLang="en-US" sz="2000"/>
+              <a:t>에 근접하게 사용할 수 있는 수치로 봐야 한다</a:t>
+            </a:r>
+            <a:r>
+              <a:rPr lang="en-US" altLang="ko-KR" sz="2000"/>
+              <a:t>.</a:t>
+            </a:r>
+            <a:endParaRPr lang="en-US" altLang="ko-KR" sz="2000"/>
+          </a:p>
+          <a:p>
+            <a:pPr lvl="0">
+              <a:defRPr/>
+            </a:pPr>
+            <a:endParaRPr lang="en-US" altLang="ko-KR" sz="2000"/>
+          </a:p>
+          <a:p>
+            <a:pPr lvl="0">
+              <a:defRPr/>
+            </a:pPr>
+            <a:r>
+              <a:rPr lang="en-US" altLang="ko-KR" sz="2000"/>
+              <a:t>DC</a:t>
+            </a:r>
+            <a:r>
+              <a:rPr lang="ko-KR" altLang="en-US" sz="2000"/>
+              <a:t> 모터 시뮬레이션에 제어기를 설계해서 테스트해본 결과</a:t>
+            </a:r>
+            <a:r>
+              <a:rPr lang="en-US" altLang="ko-KR" sz="2000"/>
+              <a:t>,</a:t>
+            </a:r>
+            <a:r>
+              <a:rPr lang="ko-KR" altLang="en-US" sz="2000"/>
+              <a:t> 최대 </a:t>
+            </a:r>
+            <a:r>
+              <a:rPr lang="en-US" altLang="ko-KR" sz="2000"/>
+              <a:t>14000</a:t>
+            </a:r>
+            <a:r>
+              <a:rPr lang="ko-KR" altLang="en-US" sz="2000"/>
+              <a:t>에 못미치는 </a:t>
+            </a:r>
+            <a:r>
+              <a:rPr lang="en-US" altLang="ko-KR" sz="2000"/>
+              <a:t>13000</a:t>
+            </a:r>
+            <a:r>
+              <a:rPr lang="ko-KR" altLang="en-US" sz="2000"/>
+              <a:t>정도까지 가속할 수 있는 것으로 확인된다</a:t>
+            </a:r>
+            <a:r>
+              <a:rPr lang="en-US" altLang="ko-KR" sz="2000"/>
+              <a:t>.</a:t>
+            </a:r>
+            <a:endParaRPr lang="en-US" altLang="ko-KR" sz="2000"/>
+          </a:p>
+          <a:p>
+            <a:pPr lvl="0">
+              <a:defRPr/>
+            </a:pPr>
+            <a:endParaRPr lang="en-US" altLang="ko-KR" sz="2000"/>
+          </a:p>
+          <a:p>
+            <a:pPr lvl="0">
+              <a:defRPr/>
+            </a:pPr>
+            <a:r>
+              <a:rPr lang="ko-KR" altLang="en-US" sz="2000"/>
+              <a:t>이를 검토해보면 기어비는 </a:t>
+            </a:r>
+            <a:r>
+              <a:rPr lang="en-US" altLang="ko-KR" sz="2000" b="1"/>
+              <a:t>8</a:t>
+            </a:r>
+            <a:r>
+              <a:rPr lang="ko-KR" altLang="en-US" sz="2000" b="1"/>
+              <a:t>배 이상</a:t>
+            </a:r>
+            <a:r>
+              <a:rPr lang="ko-KR" altLang="en-US" sz="2000"/>
+              <a:t>으로 올려야 할 것으로 검토되며</a:t>
+            </a:r>
+            <a:r>
+              <a:rPr lang="en-US" altLang="ko-KR" sz="2000"/>
               <a:t>, </a:t>
             </a:r>
             <a:r>
-              <a:rPr lang="ko-KR" altLang="en-US" dirty="0"/>
-              <a:t>계산해보면 어떤 </a:t>
-            </a:r>
-            <a:r>
-              <a:rPr lang="ko-KR" altLang="en-US" dirty="0" err="1"/>
-              <a:t>숫자든</a:t>
-            </a:r>
-            <a:r>
-              <a:rPr lang="ko-KR" altLang="en-US" dirty="0"/>
-              <a:t> 상관없다</a:t>
-            </a:r>
-            <a:r>
-              <a:rPr lang="en-US" altLang="ko-KR" dirty="0"/>
+              <a:rPr lang="ko-KR" altLang="en-US" sz="2000"/>
+              <a:t>추후 모터의 토크를 계산할 수 있는 </a:t>
+            </a:r>
+            <a:r>
+              <a:rPr lang="ko-KR" altLang="en-US" sz="2000" b="1"/>
+              <a:t>코드를 탑재</a:t>
+            </a:r>
+            <a:r>
+              <a:rPr lang="ko-KR" altLang="en-US" sz="2000"/>
+              <a:t>하여 </a:t>
+            </a:r>
+            <a:r>
+              <a:rPr lang="ko-KR" altLang="en-US" sz="2000" b="1"/>
+              <a:t>실제 로드 시 모터에 걸리는 토크를 확인</a:t>
+            </a:r>
+            <a:r>
+              <a:rPr lang="ko-KR" altLang="en-US" sz="2000"/>
+              <a:t>해봐야 한다</a:t>
+            </a:r>
+            <a:r>
+              <a:rPr lang="en-US" altLang="ko-KR" sz="2000"/>
               <a:t>.</a:t>
             </a:r>
-          </a:p>
-          <a:p>
-            <a:endParaRPr lang="en-US" altLang="ko-KR" dirty="0"/>
-          </a:p>
-          <a:p>
-            <a:r>
-              <a:rPr lang="en-US" altLang="ko-KR" dirty="0"/>
-              <a:t>1717 </a:t>
-            </a:r>
-            <a:r>
-              <a:rPr lang="ko-KR" altLang="en-US" dirty="0"/>
-              <a:t>모터 기준 최대 </a:t>
-            </a:r>
-            <a:r>
-              <a:rPr lang="en-US" altLang="ko-KR" dirty="0"/>
-              <a:t>rpm == 14000</a:t>
-            </a:r>
-          </a:p>
-          <a:p>
-            <a:r>
-              <a:rPr lang="en-US" altLang="ko-KR" dirty="0"/>
-              <a:t>14000 [rev/min]</a:t>
-            </a:r>
-            <a:r>
-              <a:rPr lang="ko-KR" altLang="en-US" dirty="0"/>
-              <a:t> </a:t>
-            </a:r>
-            <a:r>
-              <a:rPr lang="en-US" altLang="ko-KR" dirty="0"/>
-              <a:t>*</a:t>
-            </a:r>
-            <a:r>
-              <a:rPr lang="ko-KR" altLang="en-US" dirty="0"/>
-              <a:t> </a:t>
-            </a:r>
-            <a:r>
-              <a:rPr lang="en-US" altLang="ko-KR" dirty="0"/>
-              <a:t>1/60 [min/sec] * 0.0005 [sec/motor interrupt] * encoder </a:t>
-            </a:r>
-            <a:r>
-              <a:rPr lang="en-US" altLang="ko-KR" dirty="0" err="1"/>
-              <a:t>cnt</a:t>
-            </a:r>
-            <a:r>
-              <a:rPr lang="ko-KR" altLang="en-US" dirty="0"/>
-              <a:t> </a:t>
-            </a:r>
-            <a:r>
-              <a:rPr lang="en-US" altLang="ko-KR" dirty="0"/>
-              <a:t>* 4 =  238.933333 [</a:t>
-            </a:r>
-            <a:r>
-              <a:rPr lang="en-US" altLang="ko-KR" dirty="0" err="1"/>
-              <a:t>cnt</a:t>
-            </a:r>
-            <a:r>
-              <a:rPr lang="en-US" altLang="ko-KR" dirty="0"/>
-              <a:t>/motor</a:t>
-            </a:r>
-            <a:r>
-              <a:rPr lang="ko-KR" altLang="en-US" dirty="0"/>
-              <a:t> </a:t>
-            </a:r>
-            <a:r>
-              <a:rPr lang="en-US" altLang="ko-KR" dirty="0"/>
-              <a:t>interrupt]</a:t>
-            </a:r>
-          </a:p>
-          <a:p>
-            <a:r>
-              <a:rPr lang="ko-KR" altLang="en-US" dirty="0"/>
-              <a:t>모터 </a:t>
-            </a:r>
-            <a:r>
-              <a:rPr lang="ko-KR" altLang="en-US" dirty="0" err="1"/>
-              <a:t>인터럽드</a:t>
-            </a:r>
-            <a:r>
-              <a:rPr lang="ko-KR" altLang="en-US" dirty="0"/>
-              <a:t> </a:t>
-            </a:r>
-            <a:r>
-              <a:rPr lang="en-US" altLang="ko-KR" dirty="0"/>
-              <a:t>500us </a:t>
-            </a:r>
-            <a:r>
-              <a:rPr lang="ko-KR" altLang="en-US" dirty="0"/>
-              <a:t>마다 받을 수 있는 최대 </a:t>
-            </a:r>
-            <a:r>
-              <a:rPr lang="en-US" altLang="ko-KR" dirty="0"/>
-              <a:t>238.9333 </a:t>
-            </a:r>
-            <a:r>
-              <a:rPr lang="ko-KR" altLang="en-US" dirty="0"/>
-              <a:t>카운터가 최대라는 것</a:t>
-            </a:r>
-            <a:r>
-              <a:rPr lang="en-US" altLang="ko-KR" dirty="0"/>
-              <a:t>. </a:t>
-            </a:r>
-            <a:r>
-              <a:rPr lang="ko-KR" altLang="en-US" dirty="0"/>
-              <a:t>이 숫자보다 크면 기준은 상관없다</a:t>
-            </a:r>
-            <a:r>
-              <a:rPr lang="en-US" altLang="ko-KR" dirty="0"/>
-              <a:t>.</a:t>
-            </a:r>
-          </a:p>
-          <a:p>
-            <a:r>
-              <a:rPr lang="en-US" altLang="ko-KR" dirty="0"/>
-              <a:t>encoder </a:t>
-            </a:r>
-            <a:r>
-              <a:rPr lang="en-US" altLang="ko-KR" dirty="0" err="1"/>
-              <a:t>cnt</a:t>
-            </a:r>
-            <a:r>
-              <a:rPr lang="ko-KR" altLang="en-US" dirty="0"/>
-              <a:t>에 </a:t>
-            </a:r>
-            <a:r>
-              <a:rPr lang="en-US" altLang="ko-KR" dirty="0"/>
-              <a:t>4</a:t>
-            </a:r>
-            <a:r>
-              <a:rPr lang="ko-KR" altLang="en-US" dirty="0"/>
-              <a:t>를 곱하는 이유는 </a:t>
-            </a:r>
-            <a:r>
-              <a:rPr lang="en-US" altLang="ko-KR" dirty="0" err="1"/>
-              <a:t>qep</a:t>
-            </a:r>
-            <a:r>
-              <a:rPr lang="en-US" altLang="ko-KR" dirty="0"/>
-              <a:t> </a:t>
-            </a:r>
-            <a:r>
-              <a:rPr lang="ko-KR" altLang="en-US" dirty="0"/>
-              <a:t>공부를 할 것</a:t>
-            </a:r>
-            <a:r>
-              <a:rPr lang="en-US" altLang="ko-KR" dirty="0"/>
-              <a:t>.</a:t>
-            </a:r>
+            <a:endParaRPr lang="en-US" altLang="ko-KR" sz="2000"/>
           </a:p>
         </p:txBody>
       </p:sp>
       <p:pic>
         <p:nvPicPr>
-          <p:cNvPr id="7" name="그림 6">
-            <a:extLst>
-              <a:ext uri="{FF2B5EF4-FFF2-40B4-BE49-F238E27FC236}">
-                <a16:creationId xmlns:a16="http://schemas.microsoft.com/office/drawing/2014/main" id="{A6C49963-E767-F56D-4CE2-3072EFE6B2ED}"/>
-              </a:ext>
-            </a:extLst>
-          </p:cNvPr>
+          <p:cNvPr id="8" name="그림 7"/>
           <p:cNvPicPr>
             <a:picLocks noChangeAspect="1"/>
           </p:cNvPicPr>
           <p:nvPr/>
         </p:nvPicPr>
-        <p:blipFill>
+        <p:blipFill rotWithShape="1">
           <a:blip r:embed="rId2"/>
           <a:stretch>
             <a:fillRect/>
@@ -8963,24 +9768,205 @@
         </p:blipFill>
         <p:spPr>
           <a:xfrm>
-            <a:off x="2449234" y="3837214"/>
-            <a:ext cx="7293531" cy="2730462"/>
+            <a:off x="6465886" y="378547"/>
+            <a:ext cx="5271785" cy="6100905"/>
           </a:xfrm>
           <a:prstGeom prst="rect">
             <a:avLst/>
           </a:prstGeom>
         </p:spPr>
       </p:pic>
+      <p:grpSp>
+        <p:nvGrpSpPr>
+          <p:cNvPr id="12" name=""/>
+          <p:cNvGrpSpPr>
+            <a:grpSpLocks/>
+          </p:cNvGrpSpPr>
+          <p:nvPr/>
+        </p:nvGrpSpPr>
+        <p:grpSpPr>
+          <a:xfrm rot="0">
+            <a:off x="5032591" y="208766"/>
+            <a:ext cx="1520609" cy="771525"/>
+            <a:chOff x="5032591" y="208766"/>
+            <a:chExt cx="1520609" cy="771525"/>
+          </a:xfrm>
+        </p:grpSpPr>
+        <p:graphicFrame>
+          <p:nvGraphicFramePr>
+            <p:cNvPr id="10" name="개체 9"/>
+            <p:cNvGraphicFramePr/>
+            <p:nvPr/>
+          </p:nvGraphicFramePr>
+          <p:xfrm>
+            <a:off x="5638800" y="208766"/>
+            <a:ext cx="914400" cy="771525"/>
+          </p:xfrm>
+          <a:graphic>
+            <a:graphicData uri="http://schemas.openxmlformats.org/presentationml/2006/ole">
+              <p:oleObj spid="_x0000_s4101" showAsIcon="1" r:id="rId4" imgW="923925" imgH="781050" progId="">
+                <p:embed/>
+              </p:oleObj>
+            </a:graphicData>
+          </a:graphic>
+        </p:graphicFrame>
+        <p:sp>
+          <p:nvSpPr>
+            <p:cNvPr id="11" name="가로 글상자 10"/>
+            <p:cNvSpPr txBox="1"/>
+            <p:nvPr/>
+          </p:nvSpPr>
+          <p:spPr>
+            <a:xfrm>
+              <a:off x="5032591" y="260959"/>
+              <a:ext cx="678494" cy="360045"/>
+            </a:xfrm>
+            <a:prstGeom prst="rect">
+              <a:avLst/>
+            </a:prstGeom>
+          </p:spPr>
+          <p:txBody>
+            <a:bodyPr wrap="square">
+              <a:spAutoFit/>
+            </a:bodyPr>
+            <a:p>
+              <a:pPr lvl="0">
+                <a:defRPr/>
+              </a:pPr>
+              <a:r>
+                <a:rPr lang="ko-KR" altLang="en-US"/>
+                <a:t>모델</a:t>
+              </a:r>
+              <a:endParaRPr lang="ko-KR" altLang="en-US"/>
+            </a:p>
+          </p:txBody>
+        </p:sp>
+      </p:grpSp>
+      <p:grpSp>
+        <p:nvGrpSpPr>
+          <p:cNvPr id="14" name=""/>
+          <p:cNvGrpSpPr>
+            <a:grpSpLocks/>
+          </p:cNvGrpSpPr>
+          <p:nvPr/>
+        </p:nvGrpSpPr>
+        <p:grpSpPr>
+          <a:xfrm rot="0">
+            <a:off x="4328002" y="1082979"/>
+            <a:ext cx="2225198" cy="771525"/>
+            <a:chOff x="4328002" y="1082979"/>
+            <a:chExt cx="2225198" cy="771525"/>
+          </a:xfrm>
+        </p:grpSpPr>
+        <p:graphicFrame>
+          <p:nvGraphicFramePr>
+            <p:cNvPr id="9" name="개체 8"/>
+            <p:cNvGraphicFramePr/>
+            <p:nvPr/>
+          </p:nvGraphicFramePr>
+          <p:xfrm>
+            <a:off x="5638800" y="1082979"/>
+            <a:ext cx="914400" cy="771525"/>
+          </p:xfrm>
+          <a:graphic>
+            <a:graphicData uri="http://schemas.openxmlformats.org/presentationml/2006/ole">
+              <p:oleObj spid="_x0000_s4102" showAsIcon="1" r:id="rId5" imgW="923925" imgH="781050" progId="">
+                <p:embed/>
+              </p:oleObj>
+            </a:graphicData>
+          </a:graphic>
+        </p:graphicFrame>
+        <p:sp>
+          <p:nvSpPr>
+            <p:cNvPr id="13" name="가로 글상자 12"/>
+            <p:cNvSpPr txBox="1"/>
+            <p:nvPr/>
+          </p:nvSpPr>
+          <p:spPr>
+            <a:xfrm>
+              <a:off x="4328002" y="1122123"/>
+              <a:ext cx="2146389" cy="359393"/>
+            </a:xfrm>
+            <a:prstGeom prst="rect">
+              <a:avLst/>
+            </a:prstGeom>
+          </p:spPr>
+          <p:txBody>
+            <a:bodyPr wrap="square">
+              <a:spAutoFit/>
+            </a:bodyPr>
+            <a:p>
+              <a:pPr marL="0" lvl="0" indent="0" algn="l" defTabSz="914400" rtl="0" eaLnBrk="1" latinLnBrk="1" hangingPunct="1">
+                <a:lnSpc>
+                  <a:spcPct val="100000"/>
+                </a:lnSpc>
+                <a:spcBef>
+                  <a:spcPts val="0"/>
+                </a:spcBef>
+                <a:spcAft>
+                  <a:spcPts val="0"/>
+                </a:spcAft>
+                <a:buNone/>
+                <a:defRPr/>
+              </a:pPr>
+              <a:r>
+                <a:rPr xmlns:mc="http://schemas.openxmlformats.org/markup-compatibility/2006" xmlns:hp="http://schemas.haansoft.com/office/presentation/8.0" kumimoji="0" lang="ko-KR" altLang="en-US" sz="1800" b="0" i="0" u="none" strike="noStrike" kern="1200" cap="none" spc="0" normalizeH="0" baseline="0" mc:Ignorable="hp" hp:hslEmbossed="0">
+                  <a:solidFill>
+                    <a:srgbClr val="000000"/>
+                  </a:solidFill>
+                  <a:latin typeface="맑은 고딕"/>
+                  <a:ea typeface="맑은 고딕"/>
+                  <a:cs typeface="맑은 고딕"/>
+                </a:rPr>
+                <a:t>모델 </a:t>
+              </a:r>
+              <a:r>
+                <a:rPr xmlns:mc="http://schemas.openxmlformats.org/markup-compatibility/2006" xmlns:hp="http://schemas.haansoft.com/office/presentation/8.0" kumimoji="0" lang="en-US" altLang="ko-KR" sz="1800" b="0" i="0" u="none" strike="noStrike" kern="1200" cap="none" spc="0" normalizeH="0" baseline="0" mc:Ignorable="hp" hp:hslEmbossed="0">
+                  <a:solidFill>
+                    <a:srgbClr val="000000"/>
+                  </a:solidFill>
+                  <a:latin typeface="맑은 고딕"/>
+                  <a:ea typeface="맑은 고딕"/>
+                  <a:cs typeface="맑은 고딕"/>
+                </a:rPr>
+                <a:t>+</a:t>
+              </a:r>
+              <a:r>
+                <a:rPr xmlns:mc="http://schemas.openxmlformats.org/markup-compatibility/2006" xmlns:hp="http://schemas.haansoft.com/office/presentation/8.0" kumimoji="0" lang="ko-KR" altLang="en-US" sz="1800" b="0" i="0" u="none" strike="noStrike" kern="1200" cap="none" spc="0" normalizeH="0" baseline="0" mc:Ignorable="hp" hp:hslEmbossed="0">
+                  <a:solidFill>
+                    <a:srgbClr val="000000"/>
+                  </a:solidFill>
+                  <a:latin typeface="맑은 고딕"/>
+                  <a:ea typeface="맑은 고딕"/>
+                  <a:cs typeface="맑은 고딕"/>
+                </a:rPr>
+                <a:t>제어기</a:t>
+              </a:r>
+              <a:endParaRPr xmlns:mc="http://schemas.openxmlformats.org/markup-compatibility/2006" xmlns:hp="http://schemas.haansoft.com/office/presentation/8.0" kumimoji="0" lang="ko-KR" altLang="en-US" sz="1800" b="0" i="0" u="none" strike="noStrike" kern="1200" cap="none" spc="0" normalizeH="0" baseline="0" mc:Ignorable="hp" hp:hslEmbossed="0">
+                <a:solidFill>
+                  <a:srgbClr val="000000"/>
+                </a:solidFill>
+                <a:latin typeface="맑은 고딕"/>
+                <a:ea typeface="맑은 고딕"/>
+                <a:cs typeface="맑은 고딕"/>
+              </a:endParaRPr>
+            </a:p>
+          </p:txBody>
+        </p:sp>
+      </p:grpSp>
     </p:spTree>
-    <p:extLst>
-      <p:ext uri="{BB962C8B-B14F-4D97-AF65-F5344CB8AC3E}">
-        <p14:creationId xmlns:p14="http://schemas.microsoft.com/office/powerpoint/2010/main" val="2708574857"/>
-      </p:ext>
-    </p:extLst>
   </p:cSld>
   <p:clrMapOvr>
     <a:masterClrMapping/>
   </p:clrMapOvr>
+  <mc:AlternateContent xmlns:mc="http://schemas.openxmlformats.org/markup-compatibility/2006">
+    <mc:Choice xmlns:p14="http://schemas.microsoft.com/office/powerpoint/2010/main" Requires="p14">
+      <p:transition xmlns:mc="http://schemas.openxmlformats.org/markup-compatibility/2006" xmlns:p14="http://schemas.microsoft.com/office/powerpoint/2010/main" mc:Ignorable="p14" p14:dur="500"/>
+    </mc:Choice>
+    <mc:Fallback>
+      <p:transition/>
+    </mc:Fallback>
+  </mc:AlternateContent>
 </p:sld>
 </file>
 

</xml_diff>